<commit_message>
Updated Presentation with Saliency Map and CNN info
</commit_message>
<xml_diff>
--- a/project_report_final/Presentation.pptx
+++ b/project_report_final/Presentation.pptx
@@ -11,8 +11,10 @@
     <p:sldId id="259" r:id="rId5"/>
     <p:sldId id="260" r:id="rId6"/>
     <p:sldId id="261" r:id="rId7"/>
-    <p:sldId id="263" r:id="rId8"/>
-    <p:sldId id="264" r:id="rId9"/>
+    <p:sldId id="265" r:id="rId8"/>
+    <p:sldId id="266" r:id="rId9"/>
+    <p:sldId id="263" r:id="rId10"/>
+    <p:sldId id="264" r:id="rId11"/>
   </p:sldIdLst>
   <p:sldSz cx="12192000" cy="6858000"/>
   <p:notesSz cx="6858000" cy="9144000"/>
@@ -487,7 +489,7 @@
             <a:fld id="{B61BEF0D-F0BB-DE4B-95CE-6DB70DBA9567}" type="datetimeFigureOut">
               <a:rPr lang="en-US" smtClean="0"/>
               <a:pPr/>
-              <a:t>4/27/2016</a:t>
+              <a:t>4/28/2016</a:t>
             </a:fld>
             <a:endParaRPr lang="en-US" dirty="0"/>
           </a:p>
@@ -736,7 +738,7 @@
             <a:fld id="{B61BEF0D-F0BB-DE4B-95CE-6DB70DBA9567}" type="datetimeFigureOut">
               <a:rPr lang="en-US" smtClean="0"/>
               <a:pPr/>
-              <a:t>4/27/2016</a:t>
+              <a:t>4/28/2016</a:t>
             </a:fld>
             <a:endParaRPr lang="en-US" dirty="0"/>
           </a:p>
@@ -1124,7 +1126,7 @@
             <a:fld id="{B61BEF0D-F0BB-DE4B-95CE-6DB70DBA9567}" type="datetimeFigureOut">
               <a:rPr lang="en-US" smtClean="0"/>
               <a:pPr/>
-              <a:t>4/27/2016</a:t>
+              <a:t>4/28/2016</a:t>
             </a:fld>
             <a:endParaRPr lang="en-US" dirty="0"/>
           </a:p>
@@ -1355,7 +1357,7 @@
             <a:fld id="{B61BEF0D-F0BB-DE4B-95CE-6DB70DBA9567}" type="datetimeFigureOut">
               <a:rPr lang="en-US" smtClean="0"/>
               <a:pPr/>
-              <a:t>4/27/2016</a:t>
+              <a:t>4/28/2016</a:t>
             </a:fld>
             <a:endParaRPr lang="en-US" dirty="0"/>
           </a:p>
@@ -1848,7 +1850,7 @@
             <a:fld id="{B61BEF0D-F0BB-DE4B-95CE-6DB70DBA9567}" type="datetimeFigureOut">
               <a:rPr lang="en-US" smtClean="0"/>
               <a:pPr/>
-              <a:t>4/27/2016</a:t>
+              <a:t>4/28/2016</a:t>
             </a:fld>
             <a:endParaRPr lang="en-US" dirty="0"/>
           </a:p>
@@ -2160,7 +2162,7 @@
             <a:fld id="{B61BEF0D-F0BB-DE4B-95CE-6DB70DBA9567}" type="datetimeFigureOut">
               <a:rPr lang="en-US" smtClean="0"/>
               <a:pPr/>
-              <a:t>4/27/2016</a:t>
+              <a:t>4/28/2016</a:t>
             </a:fld>
             <a:endParaRPr lang="en-US" dirty="0"/>
           </a:p>
@@ -2553,7 +2555,7 @@
             <a:fld id="{B61BEF0D-F0BB-DE4B-95CE-6DB70DBA9567}" type="datetimeFigureOut">
               <a:rPr lang="en-US" smtClean="0"/>
               <a:pPr/>
-              <a:t>4/27/2016</a:t>
+              <a:t>4/28/2016</a:t>
             </a:fld>
             <a:endParaRPr lang="en-US" dirty="0"/>
           </a:p>
@@ -2673,7 +2675,7 @@
             <a:fld id="{B61BEF0D-F0BB-DE4B-95CE-6DB70DBA9567}" type="datetimeFigureOut">
               <a:rPr lang="en-US" smtClean="0"/>
               <a:pPr/>
-              <a:t>4/27/2016</a:t>
+              <a:t>4/28/2016</a:t>
             </a:fld>
             <a:endParaRPr lang="en-US" dirty="0"/>
           </a:p>
@@ -2770,7 +2772,7 @@
             <a:fld id="{B61BEF0D-F0BB-DE4B-95CE-6DB70DBA9567}" type="datetimeFigureOut">
               <a:rPr lang="en-US" smtClean="0"/>
               <a:pPr/>
-              <a:t>4/27/2016</a:t>
+              <a:t>4/28/2016</a:t>
             </a:fld>
             <a:endParaRPr lang="en-US" dirty="0"/>
           </a:p>
@@ -3072,7 +3074,7 @@
             <a:fld id="{B61BEF0D-F0BB-DE4B-95CE-6DB70DBA9567}" type="datetimeFigureOut">
               <a:rPr lang="en-US" smtClean="0"/>
               <a:pPr/>
-              <a:t>4/27/2016</a:t>
+              <a:t>4/28/2016</a:t>
             </a:fld>
             <a:endParaRPr lang="en-US" dirty="0"/>
           </a:p>
@@ -3339,7 +3341,7 @@
             <a:fld id="{B61BEF0D-F0BB-DE4B-95CE-6DB70DBA9567}" type="datetimeFigureOut">
               <a:rPr lang="en-US" smtClean="0"/>
               <a:pPr/>
-              <a:t>4/27/2016</a:t>
+              <a:t>4/28/2016</a:t>
             </a:fld>
             <a:endParaRPr lang="en-US" dirty="0"/>
           </a:p>
@@ -3759,7 +3761,7 @@
             <a:fld id="{B61BEF0D-F0BB-DE4B-95CE-6DB70DBA9567}" type="datetimeFigureOut">
               <a:rPr lang="en-US" smtClean="0"/>
               <a:pPr/>
-              <a:t>4/27/2016</a:t>
+              <a:t>4/28/2016</a:t>
             </a:fld>
             <a:endParaRPr lang="en-US" dirty="0"/>
           </a:p>
@@ -4372,6 +4374,105 @@
   <p:clrMapOvr>
     <a:masterClrMapping/>
   </p:clrMapOvr>
+  <p:timing>
+    <p:tnLst>
+      <p:par>
+        <p:cTn id="1" dur="indefinite" restart="never" nodeType="tmRoot"/>
+      </p:par>
+    </p:tnLst>
+  </p:timing>
+</p:sld>
+</file>
+
+<file path=ppt/slides/slide10.xml><?xml version="1.0" encoding="utf-8"?>
+<p:sld xmlns:a="http://schemas.openxmlformats.org/drawingml/2006/main" xmlns:r="http://schemas.openxmlformats.org/officeDocument/2006/relationships" xmlns:p="http://schemas.openxmlformats.org/presentationml/2006/main">
+  <p:cSld>
+    <p:spTree>
+      <p:nvGrpSpPr>
+        <p:cNvPr id="1" name=""/>
+        <p:cNvGrpSpPr/>
+        <p:nvPr/>
+      </p:nvGrpSpPr>
+      <p:grpSpPr>
+        <a:xfrm>
+          <a:off x="0" y="0"/>
+          <a:ext cx="0" cy="0"/>
+          <a:chOff x="0" y="0"/>
+          <a:chExt cx="0" cy="0"/>
+        </a:xfrm>
+      </p:grpSpPr>
+      <p:sp>
+        <p:nvSpPr>
+          <p:cNvPr id="2" name="Title 1"/>
+          <p:cNvSpPr>
+            <a:spLocks noGrp="1"/>
+          </p:cNvSpPr>
+          <p:nvPr>
+            <p:ph type="title"/>
+          </p:nvPr>
+        </p:nvSpPr>
+        <p:spPr>
+          <a:xfrm>
+            <a:off x="0" y="0"/>
+            <a:ext cx="12192000" cy="1024759"/>
+          </a:xfrm>
+        </p:spPr>
+        <p:txBody>
+          <a:bodyPr>
+            <a:normAutofit/>
+          </a:bodyPr>
+          <a:lstStyle/>
+          <a:p>
+            <a:pPr algn="ctr"/>
+            <a:r>
+              <a:rPr lang="en-US" sz="4400" i="0" dirty="0" smtClean="0"/>
+              <a:t>Results</a:t>
+            </a:r>
+            <a:endParaRPr lang="en-US" sz="4400" i="0" dirty="0"/>
+          </a:p>
+        </p:txBody>
+      </p:sp>
+      <p:sp>
+        <p:nvSpPr>
+          <p:cNvPr id="3" name="Content Placeholder 2"/>
+          <p:cNvSpPr>
+            <a:spLocks noGrp="1"/>
+          </p:cNvSpPr>
+          <p:nvPr>
+            <p:ph idx="1"/>
+          </p:nvPr>
+        </p:nvSpPr>
+        <p:spPr>
+          <a:xfrm>
+            <a:off x="625366" y="1024758"/>
+            <a:ext cx="10536620" cy="5123793"/>
+          </a:xfrm>
+        </p:spPr>
+        <p:txBody>
+          <a:bodyPr/>
+          <a:lstStyle/>
+          <a:p>
+            <a:endParaRPr lang="en-US" dirty="0"/>
+          </a:p>
+        </p:txBody>
+      </p:sp>
+    </p:spTree>
+    <p:extLst>
+      <p:ext uri="{BB962C8B-B14F-4D97-AF65-F5344CB8AC3E}">
+        <p14:creationId xmlns:p14="http://schemas.microsoft.com/office/powerpoint/2010/main" val="1171463062"/>
+      </p:ext>
+    </p:extLst>
+  </p:cSld>
+  <p:clrMapOvr>
+    <a:masterClrMapping/>
+  </p:clrMapOvr>
+  <p:timing>
+    <p:tnLst>
+      <p:par>
+        <p:cTn id="1" dur="indefinite" restart="never" nodeType="tmRoot"/>
+      </p:par>
+    </p:tnLst>
+  </p:timing>
 </p:sld>
 </file>
 
@@ -4484,6 +4585,43 @@
           </a:p>
         </p:txBody>
       </p:sp>
+      <p:sp>
+        <p:nvSpPr>
+          <p:cNvPr id="5" name="TextBox 4"/>
+          <p:cNvSpPr txBox="1"/>
+          <p:nvPr/>
+        </p:nvSpPr>
+        <p:spPr>
+          <a:xfrm>
+            <a:off x="2525563" y="6268995"/>
+            <a:ext cx="7140866" cy="523220"/>
+          </a:xfrm>
+          <a:prstGeom prst="rect">
+            <a:avLst/>
+          </a:prstGeom>
+          <a:noFill/>
+        </p:spPr>
+        <p:txBody>
+          <a:bodyPr wrap="none" rtlCol="0">
+            <a:spAutoFit/>
+          </a:bodyPr>
+          <a:lstStyle/>
+          <a:p>
+            <a:r>
+              <a:rPr lang="en-US" sz="1400" b="1" i="1" dirty="0"/>
+              <a:t>Online Tracking by Learning Discriminative Saliency Map with Convolutional Neural Network</a:t>
+            </a:r>
+          </a:p>
+          <a:p>
+            <a:pPr algn="ctr"/>
+            <a:r>
+              <a:rPr lang="en-US" sz="1400" dirty="0" smtClean="0"/>
+              <a:t>Hong, et al.</a:t>
+            </a:r>
+            <a:endParaRPr lang="en-US" sz="1400" dirty="0"/>
+          </a:p>
+        </p:txBody>
+      </p:sp>
     </p:spTree>
     <p:extLst>
       <p:ext uri="{BB962C8B-B14F-4D97-AF65-F5344CB8AC3E}">
@@ -4494,6 +4632,13 @@
   <p:clrMapOvr>
     <a:masterClrMapping/>
   </p:clrMapOvr>
+  <p:timing>
+    <p:tnLst>
+      <p:par>
+        <p:cTn id="1" dur="indefinite" restart="never" nodeType="tmRoot"/>
+      </p:par>
+    </p:tnLst>
+  </p:timing>
 </p:sld>
 </file>
 
@@ -4561,7 +4706,7 @@
         <p:spPr>
           <a:xfrm>
             <a:off x="504497" y="3313330"/>
-            <a:ext cx="5596758" cy="1477328"/>
+            <a:ext cx="5596758" cy="923330"/>
           </a:xfrm>
           <a:prstGeom prst="rect">
             <a:avLst/>
@@ -4582,30 +4727,6 @@
               <a:rPr lang="en-US" dirty="0" smtClean="0"/>
               <a:t>120 samples generated from a normal distribution around target of interest at every frame. </a:t>
             </a:r>
-            <a:endParaRPr lang="en-US" dirty="0" smtClean="0"/>
-          </a:p>
-          <a:p>
-            <a:pPr marL="285750" indent="-285750">
-              <a:buFont typeface="Arial" panose="020B0604020202020204" pitchFamily="34" charset="0"/>
-              <a:buChar char="•"/>
-            </a:pPr>
-            <a:r>
-              <a:rPr lang="en-US" dirty="0" smtClean="0">
-                <a:solidFill>
-                  <a:srgbClr val="FF0000"/>
-                </a:solidFill>
-              </a:rPr>
-              <a:t>Forward prop info</a:t>
-            </a:r>
-            <a:endParaRPr lang="en-US" dirty="0" smtClean="0">
-              <a:solidFill>
-                <a:srgbClr val="FF0000"/>
-              </a:solidFill>
-            </a:endParaRPr>
-          </a:p>
-          <a:p>
-            <a:pPr lvl="1"/>
-            <a:endParaRPr lang="en-US" dirty="0" smtClean="0"/>
           </a:p>
           <a:p>
             <a:pPr marL="285750" indent="-285750">
@@ -4649,7 +4770,7 @@
         <p:spPr>
           <a:xfrm>
             <a:off x="6101255" y="3313329"/>
-            <a:ext cx="5549462" cy="369331"/>
+            <a:ext cx="5549462" cy="1754326"/>
           </a:xfrm>
           <a:prstGeom prst="rect">
             <a:avLst/>
@@ -4667,18 +4788,46 @@
               <a:buChar char="•"/>
             </a:pPr>
             <a:r>
-              <a:rPr lang="en-US" dirty="0" smtClean="0">
-                <a:solidFill>
-                  <a:srgbClr val="FF0000"/>
-                </a:solidFill>
-              </a:rPr>
-              <a:t>More about forward prop here if needed</a:t>
-            </a:r>
-            <a:endParaRPr lang="en-US" dirty="0">
-              <a:solidFill>
-                <a:srgbClr val="FF0000"/>
-              </a:solidFill>
-            </a:endParaRPr>
+              <a:rPr lang="en-US" dirty="0" smtClean="0"/>
+              <a:t>Treat pre-trained CNN as black box transformation function:</a:t>
+            </a:r>
+          </a:p>
+          <a:p>
+            <a:pPr lvl="1"/>
+            <a:r>
+              <a:rPr lang="en-US" dirty="0"/>
+              <a:t>	</a:t>
+            </a:r>
+            <a:r>
+              <a:rPr lang="en-US" dirty="0" smtClean="0"/>
+              <a:t>sample features = CNN(samples, ‘first-fc-layer’)</a:t>
+            </a:r>
+            <a:endParaRPr lang="en-US" dirty="0"/>
+          </a:p>
+          <a:p>
+            <a:pPr marL="285750" indent="-285750">
+              <a:buFont typeface="Arial" panose="020B0604020202020204" pitchFamily="34" charset="0"/>
+              <a:buChar char="•"/>
+            </a:pPr>
+            <a:r>
+              <a:rPr lang="en-US" dirty="0" smtClean="0"/>
+              <a:t>Output of first fully-connected (fc) layer is treated as feature vector</a:t>
+            </a:r>
+          </a:p>
+          <a:p>
+            <a:pPr marL="285750" indent="-285750">
+              <a:buFont typeface="Arial" panose="020B0604020202020204" pitchFamily="34" charset="0"/>
+              <a:buChar char="•"/>
+            </a:pPr>
+            <a:r>
+              <a:rPr lang="en-US" dirty="0" smtClean="0"/>
+              <a:t>Used VGG-F in </a:t>
+            </a:r>
+            <a:r>
+              <a:rPr lang="en-US" dirty="0" err="1" smtClean="0"/>
+              <a:t>MatConvNet</a:t>
+            </a:r>
+            <a:endParaRPr lang="en-US" dirty="0" smtClean="0"/>
           </a:p>
         </p:txBody>
       </p:sp>
@@ -4692,6 +4841,13 @@
   <p:clrMapOvr>
     <a:masterClrMapping/>
   </p:clrMapOvr>
+  <p:timing>
+    <p:tnLst>
+      <p:par>
+        <p:cTn id="1" dur="indefinite" restart="never" nodeType="tmRoot"/>
+      </p:par>
+    </p:tnLst>
+  </p:timing>
 </p:sld>
 </file>
 
@@ -4863,7 +5019,6 @@
               <a:rPr lang="en-US" dirty="0" smtClean="0"/>
               <a:t>samples</a:t>
             </a:r>
-            <a:endParaRPr lang="en-US" dirty="0" smtClean="0"/>
           </a:p>
           <a:p>
             <a:pPr marL="742950" lvl="1" indent="-285750">
@@ -4889,11 +5044,22 @@
             </a:pPr>
             <a:r>
               <a:rPr lang="en-US" dirty="0" smtClean="0"/>
-              <a:t>We </a:t>
+              <a:t>We then filter through these positive samples and keep only those dimensions corresponding to positive weights – as these have clearer contributions in the samples classification. All other features are set </a:t>
             </a:r>
             <a:r>
               <a:rPr lang="en-US" dirty="0" smtClean="0"/>
-              <a:t>then filter through these positive samples and keep only those dimensions corresponding to positive weights – as these have clearer contributions in the samples classification. All other features are set to 0.</a:t>
+              <a:t>to </a:t>
+            </a:r>
+            <a:r>
+              <a:rPr lang="en-US" dirty="0" smtClean="0">
+                <a:latin typeface="Arial" panose="020B0604020202020204" pitchFamily="34" charset="0"/>
+                <a:cs typeface="Arial" panose="020B0604020202020204" pitchFamily="34" charset="0"/>
+              </a:rPr>
+              <a:t>0</a:t>
+            </a:r>
+            <a:r>
+              <a:rPr lang="en-US" dirty="0" smtClean="0"/>
+              <a:t>.</a:t>
             </a:r>
             <a:endParaRPr lang="en-US" dirty="0"/>
           </a:p>
@@ -4909,6 +5075,13 @@
   <p:clrMapOvr>
     <a:masterClrMapping/>
   </p:clrMapOvr>
+  <p:timing>
+    <p:tnLst>
+      <p:par>
+        <p:cTn id="1" dur="indefinite" restart="never" nodeType="tmRoot"/>
+      </p:par>
+    </p:tnLst>
+  </p:timing>
 </p:sld>
 </file>
 
@@ -4977,7 +5150,9 @@
           </a:xfrm>
         </p:spPr>
         <p:txBody>
-          <a:bodyPr/>
+          <a:bodyPr>
+            <a:normAutofit fontScale="92500" lnSpcReduction="10000"/>
+          </a:bodyPr>
           <a:lstStyle/>
           <a:p>
             <a:r>
@@ -4985,12 +5160,12 @@
               <a:t>After identifying target-specific features, we </a:t>
             </a:r>
             <a:r>
-              <a:rPr lang="en-US" dirty="0" err="1" smtClean="0"/>
-              <a:t>backpropagate</a:t>
-            </a:r>
-            <a:r>
               <a:rPr lang="en-US" dirty="0" smtClean="0"/>
-              <a:t> those features which correspond most closely with our target </a:t>
+              <a:t>back-propagate </a:t>
+            </a:r>
+            <a:r>
+              <a:rPr lang="en-US" dirty="0" smtClean="0"/>
+              <a:t>those features which correspond most closely with our target </a:t>
             </a:r>
             <a:endParaRPr lang="en-US" dirty="0"/>
           </a:p>
@@ -4998,14 +5173,24 @@
             <a:r>
               <a:rPr lang="en-US" dirty="0" smtClean="0">
                 <a:solidFill>
-                  <a:srgbClr val="FF0000"/>
+                  <a:schemeClr val="tx1"/>
                 </a:solidFill>
               </a:rPr>
-              <a:t>Discuss general saliency map creation</a:t>
+              <a:t>Back-propagation creates class-saliency maps same size as the inputs</a:t>
+            </a:r>
+          </a:p>
+          <a:p>
+            <a:r>
+              <a:rPr lang="en-US" dirty="0" smtClean="0">
+                <a:solidFill>
+                  <a:schemeClr val="tx1"/>
+                </a:solidFill>
+              </a:rPr>
+              <a:t>Large pixel intensity = class-specific pixel</a:t>
             </a:r>
             <a:endParaRPr lang="en-US" dirty="0">
               <a:solidFill>
-                <a:srgbClr val="FF0000"/>
+                <a:schemeClr val="tx1"/>
               </a:solidFill>
             </a:endParaRPr>
           </a:p>
@@ -5044,7 +5229,7 @@
         <p:spPr>
           <a:xfrm>
             <a:off x="693683" y="3515710"/>
-            <a:ext cx="10767846" cy="2585323"/>
+            <a:ext cx="5641214" cy="3139321"/>
           </a:xfrm>
           <a:prstGeom prst="rect">
             <a:avLst/>
@@ -5062,18 +5247,10 @@
               <a:buChar char="•"/>
             </a:pPr>
             <a:r>
-              <a:rPr lang="en-US" dirty="0" smtClean="0">
-                <a:solidFill>
-                  <a:srgbClr val="FF0000"/>
-                </a:solidFill>
-              </a:rPr>
-              <a:t>Discuss target-specific saliency map generation here</a:t>
-            </a:r>
-            <a:endParaRPr lang="en-US" dirty="0" smtClean="0">
-              <a:solidFill>
-                <a:srgbClr val="FF0000"/>
-              </a:solidFill>
-            </a:endParaRPr>
+              <a:rPr lang="en-US" dirty="0" smtClean="0"/>
+              <a:t>Class-saliency maps for each positive sample are aggregated (max magnitude) to create target-specific saliency map</a:t>
+            </a:r>
+            <a:endParaRPr lang="en-US" dirty="0" smtClean="0"/>
           </a:p>
           <a:p>
             <a:endParaRPr lang="en-US" dirty="0"/>
@@ -5101,6 +5278,29 @@
           </a:p>
         </p:txBody>
       </p:sp>
+      <p:pic>
+        <p:nvPicPr>
+          <p:cNvPr id="6" name="Picture 5"/>
+          <p:cNvPicPr>
+            <a:picLocks noChangeAspect="1"/>
+          </p:cNvPicPr>
+          <p:nvPr/>
+        </p:nvPicPr>
+        <p:blipFill rotWithShape="1">
+          <a:blip r:embed="rId3"/>
+          <a:srcRect l="56091" b="20471"/>
+          <a:stretch/>
+        </p:blipFill>
+        <p:spPr>
+          <a:xfrm>
+            <a:off x="7068067" y="3628625"/>
+            <a:ext cx="3080518" cy="2185228"/>
+          </a:xfrm>
+          <a:prstGeom prst="rect">
+            <a:avLst/>
+          </a:prstGeom>
+        </p:spPr>
+      </p:pic>
     </p:spTree>
     <p:extLst>
       <p:ext uri="{BB962C8B-B14F-4D97-AF65-F5344CB8AC3E}">
@@ -5111,6 +5311,13 @@
   <p:clrMapOvr>
     <a:masterClrMapping/>
   </p:clrMapOvr>
+  <p:timing>
+    <p:tnLst>
+      <p:par>
+        <p:cTn id="1" dur="indefinite" restart="never" nodeType="tmRoot"/>
+      </p:par>
+    </p:tnLst>
+  </p:timing>
 </p:sld>
 </file>
 
@@ -5184,25 +5391,11 @@
           <a:p>
             <a:r>
               <a:rPr lang="en-US" dirty="0" smtClean="0"/>
-              <a:t>After having obtained a target-specific saliency map for the current frame, we must develop a generative model</a:t>
-            </a:r>
-          </a:p>
-          <a:p>
-            <a:r>
-              <a:rPr lang="en-US" dirty="0" smtClean="0">
-                <a:solidFill>
-                  <a:srgbClr val="FF0000"/>
-                </a:solidFill>
-              </a:rPr>
-              <a:t>Generative model development </a:t>
-            </a:r>
-            <a:r>
-              <a:rPr lang="en-US" dirty="0" err="1" smtClean="0">
-                <a:solidFill>
-                  <a:srgbClr val="FF0000"/>
-                </a:solidFill>
-              </a:rPr>
-              <a:t>keypoints</a:t>
+              <a:t>After having obtained a target-specific saliency map for the current frame, we must develop a generative </a:t>
+            </a:r>
+            <a:r>
+              <a:rPr lang="en-US" dirty="0" smtClean="0"/>
+              <a:t>model</a:t>
             </a:r>
             <a:endParaRPr lang="en-US" dirty="0">
               <a:solidFill>
@@ -5236,16 +5429,277 @@
           </a:prstGeom>
         </p:spPr>
       </p:pic>
-      <p:sp>
-        <p:nvSpPr>
-          <p:cNvPr id="5" name="TextBox 4"/>
+      <mc:AlternateContent xmlns:mc="http://schemas.openxmlformats.org/markup-compatibility/2006">
+        <mc:Choice xmlns:a14="http://schemas.microsoft.com/office/drawing/2010/main" Requires="a14">
+          <p:sp>
+            <p:nvSpPr>
+              <p:cNvPr id="6" name="TextBox 5"/>
+              <p:cNvSpPr txBox="1"/>
+              <p:nvPr/>
+            </p:nvSpPr>
+            <p:spPr>
+              <a:xfrm>
+                <a:off x="7632356" y="2277762"/>
+                <a:ext cx="2186048" cy="778162"/>
+              </a:xfrm>
+              <a:prstGeom prst="rect">
+                <a:avLst/>
+              </a:prstGeom>
+              <a:noFill/>
+            </p:spPr>
+            <p:txBody>
+              <a:bodyPr wrap="none" lIns="0" tIns="0" rIns="0" bIns="0" rtlCol="0">
+                <a:spAutoFit/>
+              </a:bodyPr>
+              <a:lstStyle/>
+              <a:p>
+                <a14:m>
+                  <m:oMathPara xmlns:m="http://schemas.openxmlformats.org/officeDocument/2006/math">
+                    <m:oMathParaPr>
+                      <m:jc m:val="centerGroup"/>
+                    </m:oMathParaPr>
+                    <m:oMath xmlns:m="http://schemas.openxmlformats.org/officeDocument/2006/math">
+                      <m:sSub>
+                        <m:sSubPr>
+                          <m:ctrlPr>
+                            <a:rPr lang="en-US" b="0" i="1" smtClean="0">
+                              <a:latin typeface="Cambria Math" panose="02040503050406030204" pitchFamily="18" charset="0"/>
+                            </a:rPr>
+                          </m:ctrlPr>
+                        </m:sSubPr>
+                        <m:e>
+                          <m:r>
+                            <a:rPr lang="en-US" b="0" i="1" smtClean="0">
+                              <a:latin typeface="Cambria Math" panose="02040503050406030204" pitchFamily="18" charset="0"/>
+                            </a:rPr>
+                            <m:t>𝐻</m:t>
+                          </m:r>
+                        </m:e>
+                        <m:sub>
+                          <m:r>
+                            <a:rPr lang="en-US" b="0" i="1" smtClean="0">
+                              <a:latin typeface="Cambria Math" panose="02040503050406030204" pitchFamily="18" charset="0"/>
+                            </a:rPr>
+                            <m:t>𝑡</m:t>
+                          </m:r>
+                        </m:sub>
+                      </m:sSub>
+                      <m:r>
+                        <a:rPr lang="en-US" b="0" i="1" smtClean="0">
+                          <a:latin typeface="Cambria Math" panose="02040503050406030204" pitchFamily="18" charset="0"/>
+                        </a:rPr>
+                        <m:t>=</m:t>
+                      </m:r>
+                      <m:f>
+                        <m:fPr>
+                          <m:ctrlPr>
+                            <a:rPr lang="en-US" b="0" i="1" smtClean="0">
+                              <a:latin typeface="Cambria Math" panose="02040503050406030204" pitchFamily="18" charset="0"/>
+                            </a:rPr>
+                          </m:ctrlPr>
+                        </m:fPr>
+                        <m:num>
+                          <m:r>
+                            <a:rPr lang="en-US" b="0" i="1" smtClean="0">
+                              <a:latin typeface="Cambria Math" panose="02040503050406030204" pitchFamily="18" charset="0"/>
+                            </a:rPr>
+                            <m:t>1</m:t>
+                          </m:r>
+                        </m:num>
+                        <m:den>
+                          <m:r>
+                            <a:rPr lang="en-US" b="0" i="1" smtClean="0">
+                              <a:latin typeface="Cambria Math" panose="02040503050406030204" pitchFamily="18" charset="0"/>
+                            </a:rPr>
+                            <m:t>𝑚</m:t>
+                          </m:r>
+                        </m:den>
+                      </m:f>
+                      <m:nary>
+                        <m:naryPr>
+                          <m:chr m:val="∑"/>
+                          <m:ctrlPr>
+                            <a:rPr lang="en-US" b="0" i="1" smtClean="0">
+                              <a:latin typeface="Cambria Math" panose="02040503050406030204" pitchFamily="18" charset="0"/>
+                            </a:rPr>
+                          </m:ctrlPr>
+                        </m:naryPr>
+                        <m:sub>
+                          <m:r>
+                            <a:rPr lang="en-US" b="0" i="1" smtClean="0">
+                              <a:latin typeface="Cambria Math" panose="02040503050406030204" pitchFamily="18" charset="0"/>
+                            </a:rPr>
+                            <m:t>𝑘</m:t>
+                          </m:r>
+                          <m:r>
+                            <a:rPr lang="en-US" b="0" i="1" smtClean="0">
+                              <a:latin typeface="Cambria Math" panose="02040503050406030204" pitchFamily="18" charset="0"/>
+                            </a:rPr>
+                            <m:t>=</m:t>
+                          </m:r>
+                          <m:r>
+                            <a:rPr lang="en-US" b="0" i="1" smtClean="0">
+                              <a:latin typeface="Cambria Math" panose="02040503050406030204" pitchFamily="18" charset="0"/>
+                            </a:rPr>
+                            <m:t>𝑡</m:t>
+                          </m:r>
+                          <m:r>
+                            <a:rPr lang="en-US" b="0" i="1" smtClean="0">
+                              <a:latin typeface="Cambria Math" panose="02040503050406030204" pitchFamily="18" charset="0"/>
+                            </a:rPr>
+                            <m:t>−</m:t>
+                          </m:r>
+                          <m:r>
+                            <a:rPr lang="en-US" b="0" i="1" smtClean="0">
+                              <a:latin typeface="Cambria Math" panose="02040503050406030204" pitchFamily="18" charset="0"/>
+                            </a:rPr>
+                            <m:t>𝑚</m:t>
+                          </m:r>
+                        </m:sub>
+                        <m:sup>
+                          <m:r>
+                            <a:rPr lang="en-US" b="0" i="1" smtClean="0">
+                              <a:latin typeface="Cambria Math" panose="02040503050406030204" pitchFamily="18" charset="0"/>
+                            </a:rPr>
+                            <m:t>𝑡</m:t>
+                          </m:r>
+                          <m:r>
+                            <a:rPr lang="en-US" b="0" i="1" smtClean="0">
+                              <a:latin typeface="Cambria Math" panose="02040503050406030204" pitchFamily="18" charset="0"/>
+                            </a:rPr>
+                            <m:t>−1</m:t>
+                          </m:r>
+                        </m:sup>
+                        <m:e>
+                          <m:sSub>
+                            <m:sSubPr>
+                              <m:ctrlPr>
+                                <a:rPr lang="en-US" b="0" i="1" smtClean="0">
+                                  <a:latin typeface="Cambria Math" panose="02040503050406030204" pitchFamily="18" charset="0"/>
+                                </a:rPr>
+                              </m:ctrlPr>
+                            </m:sSubPr>
+                            <m:e>
+                              <m:r>
+                                <a:rPr lang="en-US" b="0" i="1" smtClean="0">
+                                  <a:latin typeface="Cambria Math" panose="02040503050406030204" pitchFamily="18" charset="0"/>
+                                </a:rPr>
+                                <m:t>𝑀</m:t>
+                              </m:r>
+                            </m:e>
+                            <m:sub>
+                              <m:r>
+                                <a:rPr lang="en-US" b="0" i="1" smtClean="0">
+                                  <a:latin typeface="Cambria Math" panose="02040503050406030204" pitchFamily="18" charset="0"/>
+                                </a:rPr>
+                                <m:t>𝑘</m:t>
+                              </m:r>
+                            </m:sub>
+                          </m:sSub>
+                          <m:r>
+                            <a:rPr lang="en-US" b="0" i="1" smtClean="0">
+                              <a:latin typeface="Cambria Math" panose="02040503050406030204" pitchFamily="18" charset="0"/>
+                            </a:rPr>
+                            <m:t>(</m:t>
+                          </m:r>
+                          <m:sSubSup>
+                            <m:sSubSupPr>
+                              <m:ctrlPr>
+                                <a:rPr lang="en-US" b="0" i="1" smtClean="0">
+                                  <a:latin typeface="Cambria Math" panose="02040503050406030204" pitchFamily="18" charset="0"/>
+                                </a:rPr>
+                              </m:ctrlPr>
+                            </m:sSubSupPr>
+                            <m:e>
+                              <m:r>
+                                <a:rPr lang="en-US" b="0" i="1" smtClean="0">
+                                  <a:latin typeface="Cambria Math" panose="02040503050406030204" pitchFamily="18" charset="0"/>
+                                </a:rPr>
+                                <m:t>𝑥</m:t>
+                              </m:r>
+                            </m:e>
+                            <m:sub>
+                              <m:r>
+                                <a:rPr lang="en-US" b="0" i="1" smtClean="0">
+                                  <a:latin typeface="Cambria Math" panose="02040503050406030204" pitchFamily="18" charset="0"/>
+                                </a:rPr>
+                                <m:t>𝑘</m:t>
+                              </m:r>
+                            </m:sub>
+                            <m:sup>
+                              <m:r>
+                                <a:rPr lang="en-US" b="0" i="1" smtClean="0">
+                                  <a:latin typeface="Cambria Math" panose="02040503050406030204" pitchFamily="18" charset="0"/>
+                                </a:rPr>
+                                <m:t>∗</m:t>
+                              </m:r>
+                            </m:sup>
+                          </m:sSubSup>
+                          <m:r>
+                            <a:rPr lang="en-US" b="0" i="1" smtClean="0">
+                              <a:latin typeface="Cambria Math" panose="02040503050406030204" pitchFamily="18" charset="0"/>
+                            </a:rPr>
+                            <m:t>)</m:t>
+                          </m:r>
+                        </m:e>
+                      </m:nary>
+                    </m:oMath>
+                  </m:oMathPara>
+                </a14:m>
+                <a:endParaRPr lang="en-US" dirty="0"/>
+              </a:p>
+            </p:txBody>
+          </p:sp>
+        </mc:Choice>
+        <mc:Fallback>
+          <p:sp>
+            <p:nvSpPr>
+              <p:cNvPr id="6" name="TextBox 5"/>
+              <p:cNvSpPr txBox="1">
+                <a:spLocks noRot="1" noChangeAspect="1" noMove="1" noResize="1" noEditPoints="1" noAdjustHandles="1" noChangeArrowheads="1" noChangeShapeType="1" noTextEdit="1"/>
+              </p:cNvSpPr>
+              <p:nvPr/>
+            </p:nvSpPr>
+            <p:spPr>
+              <a:xfrm>
+                <a:off x="7632356" y="2277762"/>
+                <a:ext cx="2186048" cy="778162"/>
+              </a:xfrm>
+              <a:prstGeom prst="rect">
+                <a:avLst/>
+              </a:prstGeom>
+              <a:blipFill rotWithShape="0">
+                <a:blip r:embed="rId3"/>
+                <a:stretch>
+                  <a:fillRect/>
+                </a:stretch>
+              </a:blipFill>
+            </p:spPr>
+            <p:txBody>
+              <a:bodyPr/>
+              <a:lstStyle/>
+              <a:p>
+                <a:r>
+                  <a:rPr lang="en-US">
+                    <a:noFill/>
+                  </a:rPr>
+                  <a:t> </a:t>
+                </a:r>
+              </a:p>
+            </p:txBody>
+          </p:sp>
+        </mc:Fallback>
+      </mc:AlternateContent>
+      <p:sp>
+        <p:nvSpPr>
+          <p:cNvPr id="7" name="TextBox 6"/>
           <p:cNvSpPr txBox="1"/>
           <p:nvPr/>
         </p:nvSpPr>
         <p:spPr>
           <a:xfrm>
-            <a:off x="457200" y="3168868"/>
-            <a:ext cx="10972797" cy="2862322"/>
+            <a:off x="6180082" y="2645647"/>
+            <a:ext cx="1040670" cy="523220"/>
           </a:xfrm>
           <a:prstGeom prst="rect">
             <a:avLst/>
@@ -5253,58 +5707,986 @@
           <a:noFill/>
         </p:spPr>
         <p:txBody>
-          <a:bodyPr wrap="square" rtlCol="0">
+          <a:bodyPr wrap="none" rtlCol="0">
             <a:spAutoFit/>
           </a:bodyPr>
           <a:lstStyle/>
           <a:p>
-            <a:pPr marL="285750" indent="-285750">
-              <a:buFont typeface="Arial" panose="020B0604020202020204" pitchFamily="34" charset="0"/>
-              <a:buChar char="•"/>
-            </a:pPr>
-            <a:r>
-              <a:rPr lang="en-US" dirty="0" smtClean="0">
-                <a:solidFill>
-                  <a:srgbClr val="FF0000"/>
-                </a:solidFill>
-              </a:rPr>
-              <a:t>Target posterior calculation here (Possibly mentioning that we abandon the use of our prior)</a:t>
-            </a:r>
-            <a:endParaRPr lang="en-US" dirty="0" smtClean="0">
-              <a:solidFill>
-                <a:srgbClr val="FF0000"/>
-              </a:solidFill>
-            </a:endParaRPr>
-          </a:p>
-          <a:p>
+            <a:pPr algn="r"/>
+            <a:r>
+              <a:rPr lang="en-US" sz="1400" dirty="0" smtClean="0"/>
+              <a:t>Generative </a:t>
+            </a:r>
+            <a:br>
+              <a:rPr lang="en-US" sz="1400" dirty="0" smtClean="0"/>
+            </a:br>
+            <a:r>
+              <a:rPr lang="en-US" sz="1400" dirty="0" smtClean="0"/>
+              <a:t>Model</a:t>
+            </a:r>
+            <a:endParaRPr lang="en-US" sz="1400" dirty="0"/>
+          </a:p>
+        </p:txBody>
+      </p:sp>
+      <p:sp>
+        <p:nvSpPr>
+          <p:cNvPr id="8" name="TextBox 7"/>
+          <p:cNvSpPr txBox="1"/>
+          <p:nvPr/>
+        </p:nvSpPr>
+        <p:spPr>
+          <a:xfrm>
+            <a:off x="10336041" y="2666843"/>
+            <a:ext cx="1747594" cy="738664"/>
+          </a:xfrm>
+          <a:prstGeom prst="rect">
+            <a:avLst/>
+          </a:prstGeom>
+          <a:noFill/>
+        </p:spPr>
+        <p:txBody>
+          <a:bodyPr wrap="none" rtlCol="0">
+            <a:spAutoFit/>
+          </a:bodyPr>
+          <a:lstStyle/>
+          <a:p>
+            <a:r>
+              <a:rPr lang="en-US" sz="1400" dirty="0" smtClean="0"/>
+              <a:t>Class-saliency maps </a:t>
+            </a:r>
+            <a:br>
+              <a:rPr lang="en-US" sz="1400" dirty="0" smtClean="0"/>
+            </a:br>
+            <a:r>
+              <a:rPr lang="en-US" sz="1400" dirty="0" smtClean="0"/>
+              <a:t>surrounding target in</a:t>
+            </a:r>
+            <a:br>
+              <a:rPr lang="en-US" sz="1400" dirty="0" smtClean="0"/>
+            </a:br>
+            <a:r>
+              <a:rPr lang="en-US" sz="1400" dirty="0" smtClean="0"/>
+              <a:t>frame k</a:t>
+            </a:r>
+            <a:endParaRPr lang="en-US" sz="1400" dirty="0"/>
+          </a:p>
+        </p:txBody>
+      </p:sp>
+      <p:cxnSp>
+        <p:nvCxnSpPr>
+          <p:cNvPr id="10" name="Straight Arrow Connector 9"/>
+          <p:cNvCxnSpPr>
+            <a:stCxn id="8" idx="1"/>
+          </p:cNvCxnSpPr>
+          <p:nvPr/>
+        </p:nvCxnSpPr>
+        <p:spPr>
+          <a:xfrm flipH="1" flipV="1">
+            <a:off x="9818404" y="2799536"/>
+            <a:ext cx="517637" cy="236639"/>
+          </a:xfrm>
+          <a:prstGeom prst="straightConnector1">
+            <a:avLst/>
+          </a:prstGeom>
+          <a:ln>
+            <a:solidFill>
+              <a:schemeClr val="tx1"/>
+            </a:solidFill>
+            <a:tailEnd type="triangle"/>
+          </a:ln>
+        </p:spPr>
+        <p:style>
+          <a:lnRef idx="1">
+            <a:schemeClr val="accent1"/>
+          </a:lnRef>
+          <a:fillRef idx="0">
+            <a:schemeClr val="accent1"/>
+          </a:fillRef>
+          <a:effectRef idx="0">
+            <a:schemeClr val="accent1"/>
+          </a:effectRef>
+          <a:fontRef idx="minor">
+            <a:schemeClr val="tx1"/>
+          </a:fontRef>
+        </p:style>
+      </p:cxnSp>
+      <p:cxnSp>
+        <p:nvCxnSpPr>
+          <p:cNvPr id="12" name="Straight Arrow Connector 11"/>
+          <p:cNvCxnSpPr>
+            <a:stCxn id="7" idx="3"/>
+            <a:endCxn id="6" idx="1"/>
+          </p:cNvCxnSpPr>
+          <p:nvPr/>
+        </p:nvCxnSpPr>
+        <p:spPr>
+          <a:xfrm flipV="1">
+            <a:off x="7220752" y="2666843"/>
+            <a:ext cx="411604" cy="240414"/>
+          </a:xfrm>
+          <a:prstGeom prst="straightConnector1">
+            <a:avLst/>
+          </a:prstGeom>
+          <a:ln>
+            <a:solidFill>
+              <a:schemeClr val="tx1"/>
+            </a:solidFill>
+            <a:tailEnd type="triangle"/>
+          </a:ln>
+        </p:spPr>
+        <p:style>
+          <a:lnRef idx="1">
+            <a:schemeClr val="accent1"/>
+          </a:lnRef>
+          <a:fillRef idx="0">
+            <a:schemeClr val="accent1"/>
+          </a:fillRef>
+          <a:effectRef idx="0">
+            <a:schemeClr val="accent1"/>
+          </a:effectRef>
+          <a:fontRef idx="minor">
+            <a:schemeClr val="tx1"/>
+          </a:fontRef>
+        </p:style>
+      </p:cxnSp>
+      <mc:AlternateContent xmlns:mc="http://schemas.openxmlformats.org/markup-compatibility/2006">
+        <mc:Choice xmlns:a14="http://schemas.microsoft.com/office/drawing/2010/main" Requires="a14">
+          <p:sp>
+            <p:nvSpPr>
+              <p:cNvPr id="13" name="TextBox 12"/>
+              <p:cNvSpPr txBox="1"/>
+              <p:nvPr/>
+            </p:nvSpPr>
+            <p:spPr>
+              <a:xfrm>
+                <a:off x="457200" y="3546389"/>
+                <a:ext cx="3511923" cy="276999"/>
+              </a:xfrm>
+              <a:prstGeom prst="rect">
+                <a:avLst/>
+              </a:prstGeom>
+              <a:noFill/>
+            </p:spPr>
+            <p:txBody>
+              <a:bodyPr wrap="none" lIns="0" tIns="0" rIns="0" bIns="0" rtlCol="0">
+                <a:spAutoFit/>
+              </a:bodyPr>
+              <a:lstStyle/>
+              <a:p>
+                <a14:m>
+                  <m:oMathPara xmlns:m="http://schemas.openxmlformats.org/officeDocument/2006/math">
+                    <m:oMathParaPr>
+                      <m:jc m:val="centerGroup"/>
+                    </m:oMathParaPr>
+                    <m:oMath xmlns:m="http://schemas.openxmlformats.org/officeDocument/2006/math">
+                      <m:r>
+                        <a:rPr lang="en-US" b="0" i="1" smtClean="0">
+                          <a:latin typeface="Cambria Math" panose="02040503050406030204" pitchFamily="18" charset="0"/>
+                        </a:rPr>
+                        <m:t>𝑝</m:t>
+                      </m:r>
+                      <m:d>
+                        <m:dPr>
+                          <m:ctrlPr>
+                            <a:rPr lang="en-US" b="0" i="1" smtClean="0">
+                              <a:latin typeface="Cambria Math" panose="02040503050406030204" pitchFamily="18" charset="0"/>
+                            </a:rPr>
+                          </m:ctrlPr>
+                        </m:dPr>
+                        <m:e>
+                          <m:sSub>
+                            <m:sSubPr>
+                              <m:ctrlPr>
+                                <a:rPr lang="en-US" b="0" i="1" smtClean="0">
+                                  <a:latin typeface="Cambria Math" panose="02040503050406030204" pitchFamily="18" charset="0"/>
+                                </a:rPr>
+                              </m:ctrlPr>
+                            </m:sSubPr>
+                            <m:e>
+                              <m:r>
+                                <a:rPr lang="en-US" b="0" i="1" smtClean="0">
+                                  <a:latin typeface="Cambria Math" panose="02040503050406030204" pitchFamily="18" charset="0"/>
+                                </a:rPr>
+                                <m:t>𝑥</m:t>
+                              </m:r>
+                            </m:e>
+                            <m:sub>
+                              <m:r>
+                                <a:rPr lang="en-US" b="0" i="1" smtClean="0">
+                                  <a:latin typeface="Cambria Math" panose="02040503050406030204" pitchFamily="18" charset="0"/>
+                                </a:rPr>
+                                <m:t>𝑡</m:t>
+                              </m:r>
+                            </m:sub>
+                          </m:sSub>
+                        </m:e>
+                        <m:e>
+                          <m:sSub>
+                            <m:sSubPr>
+                              <m:ctrlPr>
+                                <a:rPr lang="en-US" b="0" i="1" smtClean="0">
+                                  <a:latin typeface="Cambria Math" panose="02040503050406030204" pitchFamily="18" charset="0"/>
+                                </a:rPr>
+                              </m:ctrlPr>
+                            </m:sSubPr>
+                            <m:e>
+                              <m:r>
+                                <a:rPr lang="en-US" b="0" i="1" smtClean="0">
+                                  <a:latin typeface="Cambria Math" panose="02040503050406030204" pitchFamily="18" charset="0"/>
+                                </a:rPr>
+                                <m:t>𝑀</m:t>
+                              </m:r>
+                            </m:e>
+                            <m:sub>
+                              <m:r>
+                                <a:rPr lang="en-US" b="0" i="1" smtClean="0">
+                                  <a:latin typeface="Cambria Math" panose="02040503050406030204" pitchFamily="18" charset="0"/>
+                                </a:rPr>
+                                <m:t>1:</m:t>
+                              </m:r>
+                              <m:r>
+                                <a:rPr lang="en-US" b="0" i="1" smtClean="0">
+                                  <a:latin typeface="Cambria Math" panose="02040503050406030204" pitchFamily="18" charset="0"/>
+                                </a:rPr>
+                                <m:t>𝑡</m:t>
+                              </m:r>
+                            </m:sub>
+                          </m:sSub>
+                        </m:e>
+                      </m:d>
+                      <m:r>
+                        <a:rPr lang="en-US" b="0" i="1" smtClean="0">
+                          <a:latin typeface="Cambria Math" panose="02040503050406030204" pitchFamily="18" charset="0"/>
+                        </a:rPr>
+                        <m:t>∝</m:t>
+                      </m:r>
+                      <m:r>
+                        <a:rPr lang="en-US" b="0" i="1" smtClean="0">
+                          <a:latin typeface="Cambria Math" panose="02040503050406030204" pitchFamily="18" charset="0"/>
+                        </a:rPr>
+                        <m:t>𝑝</m:t>
+                      </m:r>
+                      <m:d>
+                        <m:dPr>
+                          <m:ctrlPr>
+                            <a:rPr lang="en-US" b="0" i="1" smtClean="0">
+                              <a:latin typeface="Cambria Math" panose="02040503050406030204" pitchFamily="18" charset="0"/>
+                            </a:rPr>
+                          </m:ctrlPr>
+                        </m:dPr>
+                        <m:e>
+                          <m:sSub>
+                            <m:sSubPr>
+                              <m:ctrlPr>
+                                <a:rPr lang="en-US" b="0" i="1" smtClean="0">
+                                  <a:latin typeface="Cambria Math" panose="02040503050406030204" pitchFamily="18" charset="0"/>
+                                </a:rPr>
+                              </m:ctrlPr>
+                            </m:sSubPr>
+                            <m:e>
+                              <m:r>
+                                <a:rPr lang="en-US" b="0" i="1" smtClean="0">
+                                  <a:latin typeface="Cambria Math" panose="02040503050406030204" pitchFamily="18" charset="0"/>
+                                </a:rPr>
+                                <m:t>𝑀</m:t>
+                              </m:r>
+                            </m:e>
+                            <m:sub>
+                              <m:r>
+                                <a:rPr lang="en-US" b="0" i="1" smtClean="0">
+                                  <a:latin typeface="Cambria Math" panose="02040503050406030204" pitchFamily="18" charset="0"/>
+                                </a:rPr>
+                                <m:t>𝑡</m:t>
+                              </m:r>
+                            </m:sub>
+                          </m:sSub>
+                        </m:e>
+                        <m:e>
+                          <m:sSub>
+                            <m:sSubPr>
+                              <m:ctrlPr>
+                                <a:rPr lang="en-US" b="0" i="1" smtClean="0">
+                                  <a:latin typeface="Cambria Math" panose="02040503050406030204" pitchFamily="18" charset="0"/>
+                                </a:rPr>
+                              </m:ctrlPr>
+                            </m:sSubPr>
+                            <m:e>
+                              <m:r>
+                                <a:rPr lang="en-US" b="0" i="1" smtClean="0">
+                                  <a:latin typeface="Cambria Math" panose="02040503050406030204" pitchFamily="18" charset="0"/>
+                                </a:rPr>
+                                <m:t>𝑥</m:t>
+                              </m:r>
+                            </m:e>
+                            <m:sub>
+                              <m:r>
+                                <a:rPr lang="en-US" b="0" i="1" smtClean="0">
+                                  <a:latin typeface="Cambria Math" panose="02040503050406030204" pitchFamily="18" charset="0"/>
+                                </a:rPr>
+                                <m:t>𝑡</m:t>
+                              </m:r>
+                            </m:sub>
+                          </m:sSub>
+                        </m:e>
+                      </m:d>
+                      <m:r>
+                        <a:rPr lang="en-US" b="0" i="1" smtClean="0">
+                          <a:latin typeface="Cambria Math" panose="02040503050406030204" pitchFamily="18" charset="0"/>
+                        </a:rPr>
+                        <m:t> </m:t>
+                      </m:r>
+                      <m:r>
+                        <a:rPr lang="en-US" b="0" i="1" smtClean="0">
+                          <a:latin typeface="Cambria Math" panose="02040503050406030204" pitchFamily="18" charset="0"/>
+                        </a:rPr>
+                        <m:t>𝑝</m:t>
+                      </m:r>
+                      <m:r>
+                        <a:rPr lang="en-US" b="0" i="1" smtClean="0">
+                          <a:latin typeface="Cambria Math" panose="02040503050406030204" pitchFamily="18" charset="0"/>
+                        </a:rPr>
+                        <m:t>(</m:t>
+                      </m:r>
+                      <m:sSub>
+                        <m:sSubPr>
+                          <m:ctrlPr>
+                            <a:rPr lang="en-US" b="0" i="1" smtClean="0">
+                              <a:latin typeface="Cambria Math" panose="02040503050406030204" pitchFamily="18" charset="0"/>
+                            </a:rPr>
+                          </m:ctrlPr>
+                        </m:sSubPr>
+                        <m:e>
+                          <m:r>
+                            <a:rPr lang="en-US" b="0" i="1" smtClean="0">
+                              <a:latin typeface="Cambria Math" panose="02040503050406030204" pitchFamily="18" charset="0"/>
+                            </a:rPr>
+                            <m:t>𝑥</m:t>
+                          </m:r>
+                        </m:e>
+                        <m:sub>
+                          <m:r>
+                            <a:rPr lang="en-US" b="0" i="1" smtClean="0">
+                              <a:latin typeface="Cambria Math" panose="02040503050406030204" pitchFamily="18" charset="0"/>
+                            </a:rPr>
+                            <m:t>𝑡</m:t>
+                          </m:r>
+                        </m:sub>
+                      </m:sSub>
+                      <m:r>
+                        <a:rPr lang="en-US" b="0" i="1" smtClean="0">
+                          <a:latin typeface="Cambria Math" panose="02040503050406030204" pitchFamily="18" charset="0"/>
+                        </a:rPr>
+                        <m:t>|</m:t>
+                      </m:r>
+                      <m:sSub>
+                        <m:sSubPr>
+                          <m:ctrlPr>
+                            <a:rPr lang="en-US" b="0" i="1" smtClean="0">
+                              <a:latin typeface="Cambria Math" panose="02040503050406030204" pitchFamily="18" charset="0"/>
+                            </a:rPr>
+                          </m:ctrlPr>
+                        </m:sSubPr>
+                        <m:e>
+                          <m:r>
+                            <a:rPr lang="en-US" b="0" i="1" smtClean="0">
+                              <a:latin typeface="Cambria Math" panose="02040503050406030204" pitchFamily="18" charset="0"/>
+                            </a:rPr>
+                            <m:t>𝑀</m:t>
+                          </m:r>
+                        </m:e>
+                        <m:sub>
+                          <m:r>
+                            <a:rPr lang="en-US" b="0" i="1" smtClean="0">
+                              <a:latin typeface="Cambria Math" panose="02040503050406030204" pitchFamily="18" charset="0"/>
+                            </a:rPr>
+                            <m:t>1:</m:t>
+                          </m:r>
+                          <m:r>
+                            <a:rPr lang="en-US" b="0" i="1" smtClean="0">
+                              <a:latin typeface="Cambria Math" panose="02040503050406030204" pitchFamily="18" charset="0"/>
+                            </a:rPr>
+                            <m:t>𝑡</m:t>
+                          </m:r>
+                          <m:r>
+                            <a:rPr lang="en-US" b="0" i="1" smtClean="0">
+                              <a:latin typeface="Cambria Math" panose="02040503050406030204" pitchFamily="18" charset="0"/>
+                            </a:rPr>
+                            <m:t>−1</m:t>
+                          </m:r>
+                        </m:sub>
+                      </m:sSub>
+                      <m:r>
+                        <a:rPr lang="en-US" b="0" i="1" smtClean="0">
+                          <a:latin typeface="Cambria Math" panose="02040503050406030204" pitchFamily="18" charset="0"/>
+                        </a:rPr>
+                        <m:t>)</m:t>
+                      </m:r>
+                    </m:oMath>
+                  </m:oMathPara>
+                </a14:m>
+                <a:endParaRPr lang="en-US" dirty="0"/>
+              </a:p>
+            </p:txBody>
+          </p:sp>
+        </mc:Choice>
+        <mc:Fallback>
+          <p:sp>
+            <p:nvSpPr>
+              <p:cNvPr id="13" name="TextBox 12"/>
+              <p:cNvSpPr txBox="1">
+                <a:spLocks noRot="1" noChangeAspect="1" noMove="1" noResize="1" noEditPoints="1" noAdjustHandles="1" noChangeArrowheads="1" noChangeShapeType="1" noTextEdit="1"/>
+              </p:cNvSpPr>
+              <p:nvPr/>
+            </p:nvSpPr>
+            <p:spPr>
+              <a:xfrm>
+                <a:off x="457200" y="3546389"/>
+                <a:ext cx="3511923" cy="276999"/>
+              </a:xfrm>
+              <a:prstGeom prst="rect">
+                <a:avLst/>
+              </a:prstGeom>
+              <a:blipFill rotWithShape="0">
+                <a:blip r:embed="rId4"/>
+                <a:stretch>
+                  <a:fillRect l="-1215" t="-2222" r="-2257" b="-35556"/>
+                </a:stretch>
+              </a:blipFill>
+            </p:spPr>
+            <p:txBody>
+              <a:bodyPr/>
+              <a:lstStyle/>
+              <a:p>
+                <a:r>
+                  <a:rPr lang="en-US">
+                    <a:noFill/>
+                  </a:rPr>
+                  <a:t> </a:t>
+                </a:r>
+              </a:p>
+            </p:txBody>
+          </p:sp>
+        </mc:Fallback>
+      </mc:AlternateContent>
+      <p:sp>
+        <p:nvSpPr>
+          <p:cNvPr id="16" name="Right Brace 15"/>
+          <p:cNvSpPr/>
+          <p:nvPr/>
+        </p:nvSpPr>
+        <p:spPr>
+          <a:xfrm rot="5400000">
+            <a:off x="810638" y="3469950"/>
+            <a:ext cx="354328" cy="1061207"/>
+          </a:xfrm>
+          <a:prstGeom prst="rightBrace">
+            <a:avLst>
+              <a:gd name="adj1" fmla="val 8333"/>
+              <a:gd name="adj2" fmla="val 53953"/>
+            </a:avLst>
+          </a:prstGeom>
+          <a:ln w="12700">
+            <a:solidFill>
+              <a:schemeClr val="tx1"/>
+            </a:solidFill>
+          </a:ln>
+        </p:spPr>
+        <p:style>
+          <a:lnRef idx="1">
+            <a:schemeClr val="accent1"/>
+          </a:lnRef>
+          <a:fillRef idx="0">
+            <a:schemeClr val="accent1"/>
+          </a:fillRef>
+          <a:effectRef idx="0">
+            <a:schemeClr val="accent1"/>
+          </a:effectRef>
+          <a:fontRef idx="minor">
+            <a:schemeClr val="tx1"/>
+          </a:fontRef>
+        </p:style>
+        <p:txBody>
+          <a:bodyPr rtlCol="0" anchor="ctr"/>
+          <a:lstStyle/>
+          <a:p>
+            <a:pPr algn="ctr"/>
+            <a:endParaRPr lang="en-US"/>
+          </a:p>
+        </p:txBody>
+      </p:sp>
+      <p:sp>
+        <p:nvSpPr>
+          <p:cNvPr id="17" name="Right Brace 16"/>
+          <p:cNvSpPr/>
+          <p:nvPr/>
+        </p:nvSpPr>
+        <p:spPr>
+          <a:xfrm rot="5400000">
+            <a:off x="2045918" y="3595908"/>
+            <a:ext cx="354328" cy="855676"/>
+          </a:xfrm>
+          <a:prstGeom prst="rightBrace">
+            <a:avLst>
+              <a:gd name="adj1" fmla="val 8333"/>
+              <a:gd name="adj2" fmla="val 53953"/>
+            </a:avLst>
+          </a:prstGeom>
+          <a:ln w="12700">
+            <a:solidFill>
+              <a:schemeClr val="tx1"/>
+            </a:solidFill>
+          </a:ln>
+        </p:spPr>
+        <p:style>
+          <a:lnRef idx="1">
+            <a:schemeClr val="accent1"/>
+          </a:lnRef>
+          <a:fillRef idx="0">
+            <a:schemeClr val="accent1"/>
+          </a:fillRef>
+          <a:effectRef idx="0">
+            <a:schemeClr val="accent1"/>
+          </a:effectRef>
+          <a:fontRef idx="minor">
+            <a:schemeClr val="tx1"/>
+          </a:fontRef>
+        </p:style>
+        <p:txBody>
+          <a:bodyPr rtlCol="0" anchor="ctr"/>
+          <a:lstStyle/>
+          <a:p>
+            <a:pPr algn="ctr"/>
+            <a:endParaRPr lang="en-US"/>
+          </a:p>
+        </p:txBody>
+      </p:sp>
+      <p:sp>
+        <p:nvSpPr>
+          <p:cNvPr id="18" name="Right Brace 17"/>
+          <p:cNvSpPr/>
+          <p:nvPr/>
+        </p:nvSpPr>
+        <p:spPr>
+          <a:xfrm rot="5400000">
+            <a:off x="3149394" y="3381183"/>
+            <a:ext cx="354328" cy="1285128"/>
+          </a:xfrm>
+          <a:prstGeom prst="rightBrace">
+            <a:avLst>
+              <a:gd name="adj1" fmla="val 8333"/>
+              <a:gd name="adj2" fmla="val 53953"/>
+            </a:avLst>
+          </a:prstGeom>
+          <a:ln w="12700">
+            <a:solidFill>
+              <a:schemeClr val="tx1"/>
+            </a:solidFill>
+          </a:ln>
+        </p:spPr>
+        <p:style>
+          <a:lnRef idx="1">
+            <a:schemeClr val="accent1"/>
+          </a:lnRef>
+          <a:fillRef idx="0">
+            <a:schemeClr val="accent1"/>
+          </a:fillRef>
+          <a:effectRef idx="0">
+            <a:schemeClr val="accent1"/>
+          </a:effectRef>
+          <a:fontRef idx="minor">
+            <a:schemeClr val="tx1"/>
+          </a:fontRef>
+        </p:style>
+        <p:txBody>
+          <a:bodyPr rtlCol="0" anchor="ctr"/>
+          <a:lstStyle/>
+          <a:p>
+            <a:pPr algn="ctr"/>
+            <a:endParaRPr lang="en-US"/>
+          </a:p>
+        </p:txBody>
+      </p:sp>
+      <p:sp>
+        <p:nvSpPr>
+          <p:cNvPr id="19" name="TextBox 18"/>
+          <p:cNvSpPr txBox="1"/>
+          <p:nvPr/>
+        </p:nvSpPr>
+        <p:spPr>
+          <a:xfrm>
+            <a:off x="424124" y="4123543"/>
+            <a:ext cx="1048685" cy="369332"/>
+          </a:xfrm>
+          <a:prstGeom prst="rect">
+            <a:avLst/>
+          </a:prstGeom>
+          <a:noFill/>
+        </p:spPr>
+        <p:txBody>
+          <a:bodyPr wrap="none" rtlCol="0">
+            <a:spAutoFit/>
+          </a:bodyPr>
+          <a:lstStyle/>
+          <a:p>
+            <a:r>
+              <a:rPr lang="en-US" dirty="0" smtClean="0"/>
+              <a:t>posterior</a:t>
+            </a:r>
             <a:endParaRPr lang="en-US" dirty="0"/>
           </a:p>
-          <a:p>
-            <a:endParaRPr lang="en-US" dirty="0" smtClean="0"/>
-          </a:p>
-          <a:p>
+        </p:txBody>
+      </p:sp>
+      <p:sp>
+        <p:nvSpPr>
+          <p:cNvPr id="20" name="TextBox 19"/>
+          <p:cNvSpPr txBox="1"/>
+          <p:nvPr/>
+        </p:nvSpPr>
+        <p:spPr>
+          <a:xfrm>
+            <a:off x="1635309" y="4123543"/>
+            <a:ext cx="1113125" cy="369332"/>
+          </a:xfrm>
+          <a:prstGeom prst="rect">
+            <a:avLst/>
+          </a:prstGeom>
+          <a:noFill/>
+        </p:spPr>
+        <p:txBody>
+          <a:bodyPr wrap="none" rtlCol="0">
+            <a:spAutoFit/>
+          </a:bodyPr>
+          <a:lstStyle/>
+          <a:p>
+            <a:r>
+              <a:rPr lang="en-US" dirty="0" smtClean="0"/>
+              <a:t>likelihood</a:t>
+            </a:r>
             <a:endParaRPr lang="en-US" dirty="0"/>
           </a:p>
-          <a:p>
-            <a:endParaRPr lang="en-US" dirty="0" smtClean="0"/>
-          </a:p>
-          <a:p>
+        </p:txBody>
+      </p:sp>
+      <p:sp>
+        <p:nvSpPr>
+          <p:cNvPr id="21" name="TextBox 20"/>
+          <p:cNvSpPr txBox="1"/>
+          <p:nvPr/>
+        </p:nvSpPr>
+        <p:spPr>
+          <a:xfrm>
+            <a:off x="2927758" y="4123543"/>
+            <a:ext cx="636713" cy="369332"/>
+          </a:xfrm>
+          <a:prstGeom prst="rect">
+            <a:avLst/>
+          </a:prstGeom>
+          <a:noFill/>
+        </p:spPr>
+        <p:txBody>
+          <a:bodyPr wrap="none" rtlCol="0">
+            <a:spAutoFit/>
+          </a:bodyPr>
+          <a:lstStyle/>
+          <a:p>
+            <a:r>
+              <a:rPr lang="en-US" dirty="0" smtClean="0"/>
+              <a:t>prior</a:t>
+            </a:r>
             <a:endParaRPr lang="en-US" dirty="0"/>
           </a:p>
-          <a:p>
-            <a:endParaRPr lang="en-US" dirty="0" smtClean="0"/>
-          </a:p>
-          <a:p>
+        </p:txBody>
+      </p:sp>
+      <mc:AlternateContent xmlns:mc="http://schemas.openxmlformats.org/markup-compatibility/2006">
+        <mc:Choice xmlns:a14="http://schemas.microsoft.com/office/drawing/2010/main" Requires="a14">
+          <p:sp>
+            <p:nvSpPr>
+              <p:cNvPr id="22" name="TextBox 21"/>
+              <p:cNvSpPr txBox="1"/>
+              <p:nvPr/>
+            </p:nvSpPr>
+            <p:spPr>
+              <a:xfrm>
+                <a:off x="1188507" y="5017085"/>
+                <a:ext cx="1213474" cy="276999"/>
+              </a:xfrm>
+              <a:prstGeom prst="rect">
+                <a:avLst/>
+              </a:prstGeom>
+              <a:noFill/>
+            </p:spPr>
+            <p:txBody>
+              <a:bodyPr wrap="none" lIns="0" tIns="0" rIns="0" bIns="0" rtlCol="0">
+                <a:spAutoFit/>
+              </a:bodyPr>
+              <a:lstStyle/>
+              <a:p>
+                <a14:m>
+                  <m:oMathPara xmlns:m="http://schemas.openxmlformats.org/officeDocument/2006/math">
+                    <m:oMathParaPr>
+                      <m:jc m:val="centerGroup"/>
+                    </m:oMathParaPr>
+                    <m:oMath xmlns:m="http://schemas.openxmlformats.org/officeDocument/2006/math">
+                      <m:sSub>
+                        <m:sSubPr>
+                          <m:ctrlPr>
+                            <a:rPr lang="en-US" b="0" i="1" smtClean="0">
+                              <a:latin typeface="Cambria Math" panose="02040503050406030204" pitchFamily="18" charset="0"/>
+                            </a:rPr>
+                          </m:ctrlPr>
+                        </m:sSubPr>
+                        <m:e>
+                          <m:r>
+                            <a:rPr lang="en-US" b="0" i="1" smtClean="0">
+                              <a:latin typeface="Cambria Math" panose="02040503050406030204" pitchFamily="18" charset="0"/>
+                            </a:rPr>
+                            <m:t>𝐻</m:t>
+                          </m:r>
+                        </m:e>
+                        <m:sub>
+                          <m:r>
+                            <a:rPr lang="en-US" b="0" i="1" smtClean="0">
+                              <a:latin typeface="Cambria Math" panose="02040503050406030204" pitchFamily="18" charset="0"/>
+                            </a:rPr>
+                            <m:t>𝑡</m:t>
+                          </m:r>
+                        </m:sub>
+                      </m:sSub>
+                      <m:r>
+                        <a:rPr lang="en-US" b="0" i="1" smtClean="0">
+                          <a:latin typeface="Cambria Math" panose="02040503050406030204" pitchFamily="18" charset="0"/>
+                        </a:rPr>
+                        <m:t> </m:t>
+                      </m:r>
+                      <m:r>
+                        <a:rPr lang="en-US" b="0" i="1" smtClean="0">
+                          <a:latin typeface="Cambria Math" panose="02040503050406030204" pitchFamily="18" charset="0"/>
+                          <a:ea typeface="Cambria Math" panose="02040503050406030204" pitchFamily="18" charset="0"/>
+                        </a:rPr>
+                        <m:t>⨂</m:t>
+                      </m:r>
+                      <m:sSub>
+                        <m:sSubPr>
+                          <m:ctrlPr>
+                            <a:rPr lang="en-US" b="0" i="1" smtClean="0">
+                              <a:latin typeface="Cambria Math" panose="02040503050406030204" pitchFamily="18" charset="0"/>
+                              <a:ea typeface="Cambria Math" panose="02040503050406030204" pitchFamily="18" charset="0"/>
+                            </a:rPr>
+                          </m:ctrlPr>
+                        </m:sSubPr>
+                        <m:e>
+                          <m:r>
+                            <a:rPr lang="en-US" b="0" i="1" smtClean="0">
+                              <a:latin typeface="Cambria Math" panose="02040503050406030204" pitchFamily="18" charset="0"/>
+                              <a:ea typeface="Cambria Math" panose="02040503050406030204" pitchFamily="18" charset="0"/>
+                            </a:rPr>
+                            <m:t>𝑀</m:t>
+                          </m:r>
+                        </m:e>
+                        <m:sub>
+                          <m:r>
+                            <a:rPr lang="en-US" b="0" i="1" smtClean="0">
+                              <a:latin typeface="Cambria Math" panose="02040503050406030204" pitchFamily="18" charset="0"/>
+                              <a:ea typeface="Cambria Math" panose="02040503050406030204" pitchFamily="18" charset="0"/>
+                            </a:rPr>
+                            <m:t>𝑡</m:t>
+                          </m:r>
+                        </m:sub>
+                      </m:sSub>
+                      <m:d>
+                        <m:dPr>
+                          <m:ctrlPr>
+                            <a:rPr lang="en-US" b="0" i="1" smtClean="0">
+                              <a:latin typeface="Cambria Math" panose="02040503050406030204" pitchFamily="18" charset="0"/>
+                              <a:ea typeface="Cambria Math" panose="02040503050406030204" pitchFamily="18" charset="0"/>
+                            </a:rPr>
+                          </m:ctrlPr>
+                        </m:dPr>
+                        <m:e>
+                          <m:sSub>
+                            <m:sSubPr>
+                              <m:ctrlPr>
+                                <a:rPr lang="en-US" b="0" i="1" smtClean="0">
+                                  <a:latin typeface="Cambria Math" panose="02040503050406030204" pitchFamily="18" charset="0"/>
+                                  <a:ea typeface="Cambria Math" panose="02040503050406030204" pitchFamily="18" charset="0"/>
+                                </a:rPr>
+                              </m:ctrlPr>
+                            </m:sSubPr>
+                            <m:e>
+                              <m:r>
+                                <a:rPr lang="en-US" b="0" i="1" smtClean="0">
+                                  <a:latin typeface="Cambria Math" panose="02040503050406030204" pitchFamily="18" charset="0"/>
+                                  <a:ea typeface="Cambria Math" panose="02040503050406030204" pitchFamily="18" charset="0"/>
+                                </a:rPr>
+                                <m:t>𝑥</m:t>
+                              </m:r>
+                            </m:e>
+                            <m:sub>
+                              <m:r>
+                                <a:rPr lang="en-US" b="0" i="1" smtClean="0">
+                                  <a:latin typeface="Cambria Math" panose="02040503050406030204" pitchFamily="18" charset="0"/>
+                                  <a:ea typeface="Cambria Math" panose="02040503050406030204" pitchFamily="18" charset="0"/>
+                                </a:rPr>
+                                <m:t>𝑡</m:t>
+                              </m:r>
+                            </m:sub>
+                          </m:sSub>
+                        </m:e>
+                      </m:d>
+                    </m:oMath>
+                  </m:oMathPara>
+                </a14:m>
+                <a:endParaRPr lang="en-US" dirty="0"/>
+              </a:p>
+            </p:txBody>
+          </p:sp>
+        </mc:Choice>
+        <mc:Fallback>
+          <p:sp>
+            <p:nvSpPr>
+              <p:cNvPr id="22" name="TextBox 21"/>
+              <p:cNvSpPr txBox="1">
+                <a:spLocks noRot="1" noChangeAspect="1" noMove="1" noResize="1" noEditPoints="1" noAdjustHandles="1" noChangeArrowheads="1" noChangeShapeType="1" noTextEdit="1"/>
+              </p:cNvSpPr>
+              <p:nvPr/>
+            </p:nvSpPr>
+            <p:spPr>
+              <a:xfrm>
+                <a:off x="1188507" y="5017085"/>
+                <a:ext cx="1213474" cy="276999"/>
+              </a:xfrm>
+              <a:prstGeom prst="rect">
+                <a:avLst/>
+              </a:prstGeom>
+              <a:blipFill rotWithShape="0">
+                <a:blip r:embed="rId5"/>
+                <a:stretch>
+                  <a:fillRect l="-4523" b="-20000"/>
+                </a:stretch>
+              </a:blipFill>
+            </p:spPr>
+            <p:txBody>
+              <a:bodyPr/>
+              <a:lstStyle/>
+              <a:p>
+                <a:r>
+                  <a:rPr lang="en-US">
+                    <a:noFill/>
+                  </a:rPr>
+                  <a:t> </a:t>
+                </a:r>
+              </a:p>
+            </p:txBody>
+          </p:sp>
+        </mc:Fallback>
+      </mc:AlternateContent>
+      <p:sp>
+        <p:nvSpPr>
+          <p:cNvPr id="23" name="TextBox 22"/>
+          <p:cNvSpPr txBox="1"/>
+          <p:nvPr/>
+        </p:nvSpPr>
+        <p:spPr>
+          <a:xfrm>
+            <a:off x="2853873" y="4970918"/>
+            <a:ext cx="1600118" cy="369332"/>
+          </a:xfrm>
+          <a:prstGeom prst="rect">
+            <a:avLst/>
+          </a:prstGeom>
+          <a:noFill/>
+        </p:spPr>
+        <p:txBody>
+          <a:bodyPr wrap="none" rtlCol="0">
+            <a:spAutoFit/>
+          </a:bodyPr>
+          <a:lstStyle/>
+          <a:p>
+            <a:r>
+              <a:rPr lang="en-US" dirty="0" smtClean="0"/>
+              <a:t>location-based</a:t>
+            </a:r>
             <a:endParaRPr lang="en-US" dirty="0"/>
           </a:p>
-          <a:p>
-            <a:endParaRPr lang="en-US" dirty="0" smtClean="0"/>
-          </a:p>
-          <a:p>
-            <a:endParaRPr lang="en-US" dirty="0"/>
-          </a:p>
-        </p:txBody>
-      </p:sp>
+        </p:txBody>
+      </p:sp>
+      <p:cxnSp>
+        <p:nvCxnSpPr>
+          <p:cNvPr id="25" name="Straight Arrow Connector 24"/>
+          <p:cNvCxnSpPr>
+            <a:stCxn id="20" idx="2"/>
+            <a:endCxn id="22" idx="0"/>
+          </p:cNvCxnSpPr>
+          <p:nvPr/>
+        </p:nvCxnSpPr>
+        <p:spPr>
+          <a:xfrm flipH="1">
+            <a:off x="1795244" y="4492875"/>
+            <a:ext cx="396628" cy="524210"/>
+          </a:xfrm>
+          <a:prstGeom prst="straightConnector1">
+            <a:avLst/>
+          </a:prstGeom>
+          <a:ln>
+            <a:solidFill>
+              <a:schemeClr val="tx1"/>
+            </a:solidFill>
+            <a:tailEnd type="triangle"/>
+          </a:ln>
+        </p:spPr>
+        <p:style>
+          <a:lnRef idx="1">
+            <a:schemeClr val="accent1"/>
+          </a:lnRef>
+          <a:fillRef idx="0">
+            <a:schemeClr val="accent1"/>
+          </a:fillRef>
+          <a:effectRef idx="0">
+            <a:schemeClr val="accent1"/>
+          </a:effectRef>
+          <a:fontRef idx="minor">
+            <a:schemeClr val="tx1"/>
+          </a:fontRef>
+        </p:style>
+      </p:cxnSp>
+      <p:cxnSp>
+        <p:nvCxnSpPr>
+          <p:cNvPr id="27" name="Straight Arrow Connector 26"/>
+          <p:cNvCxnSpPr>
+            <a:stCxn id="21" idx="2"/>
+            <a:endCxn id="23" idx="0"/>
+          </p:cNvCxnSpPr>
+          <p:nvPr/>
+        </p:nvCxnSpPr>
+        <p:spPr>
+          <a:xfrm>
+            <a:off x="3246115" y="4492875"/>
+            <a:ext cx="407817" cy="478043"/>
+          </a:xfrm>
+          <a:prstGeom prst="straightConnector1">
+            <a:avLst/>
+          </a:prstGeom>
+          <a:ln>
+            <a:solidFill>
+              <a:schemeClr val="tx1"/>
+            </a:solidFill>
+            <a:tailEnd type="triangle"/>
+          </a:ln>
+        </p:spPr>
+        <p:style>
+          <a:lnRef idx="1">
+            <a:schemeClr val="accent1"/>
+          </a:lnRef>
+          <a:fillRef idx="0">
+            <a:schemeClr val="accent1"/>
+          </a:fillRef>
+          <a:effectRef idx="0">
+            <a:schemeClr val="accent1"/>
+          </a:effectRef>
+          <a:fontRef idx="minor">
+            <a:schemeClr val="tx1"/>
+          </a:fontRef>
+        </p:style>
+      </p:cxnSp>
     </p:spTree>
     <p:extLst>
       <p:ext uri="{BB962C8B-B14F-4D97-AF65-F5344CB8AC3E}">
@@ -5315,6 +6697,13 @@
   <p:clrMapOvr>
     <a:masterClrMapping/>
   </p:clrMapOvr>
+  <p:timing>
+    <p:tnLst>
+      <p:par>
+        <p:cTn id="1" dur="indefinite" restart="never" nodeType="tmRoot"/>
+      </p:par>
+    </p:tnLst>
+  </p:timing>
 </p:sld>
 </file>
 
@@ -5360,7 +6749,7 @@
             <a:pPr algn="ctr"/>
             <a:r>
               <a:rPr lang="en-US" sz="4400" i="0" dirty="0" smtClean="0"/>
-              <a:t>SVM Update</a:t>
+              <a:t>Generative Model &amp; Target Posterior</a:t>
             </a:r>
             <a:endParaRPr lang="en-US" sz="4400" i="0" dirty="0"/>
           </a:p>
@@ -5383,34 +6772,20 @@
           </a:xfrm>
         </p:spPr>
         <p:txBody>
-          <a:bodyPr>
-            <a:normAutofit lnSpcReduction="10000"/>
-          </a:bodyPr>
+          <a:bodyPr/>
           <a:lstStyle/>
           <a:p>
             <a:r>
               <a:rPr lang="en-US" dirty="0" smtClean="0"/>
-              <a:t>We now have a new “ground-truth” for the subsequent frame in our video</a:t>
-            </a:r>
-          </a:p>
-          <a:p>
-            <a:r>
-              <a:rPr lang="en-US" dirty="0" smtClean="0">
-                <a:solidFill>
-                  <a:schemeClr val="tx1">
-                    <a:lumMod val="95000"/>
-                    <a:lumOff val="5000"/>
-                  </a:schemeClr>
-                </a:solidFill>
-              </a:rPr>
-              <a:t>Under this assumption, we take the sample which gave the maximum posterior value and declare that it is a positive example of our class</a:t>
+              <a:t>After having obtained a target-specific saliency map for the current frame, we must develop a generative </a:t>
+            </a:r>
+            <a:r>
+              <a:rPr lang="en-US" dirty="0" smtClean="0"/>
+              <a:t>model</a:t>
             </a:r>
             <a:endParaRPr lang="en-US" dirty="0">
               <a:solidFill>
-                <a:schemeClr val="tx1">
-                  <a:lumMod val="95000"/>
-                  <a:lumOff val="5000"/>
-                </a:schemeClr>
+                <a:srgbClr val="FF0000"/>
               </a:solidFill>
             </a:endParaRPr>
           </a:p>
@@ -5440,16 +6815,277 @@
           </a:prstGeom>
         </p:spPr>
       </p:pic>
-      <p:sp>
-        <p:nvSpPr>
-          <p:cNvPr id="5" name="TextBox 4"/>
+      <mc:AlternateContent xmlns:mc="http://schemas.openxmlformats.org/markup-compatibility/2006">
+        <mc:Choice xmlns:a14="http://schemas.microsoft.com/office/drawing/2010/main" Requires="a14">
+          <p:sp>
+            <p:nvSpPr>
+              <p:cNvPr id="6" name="TextBox 5"/>
+              <p:cNvSpPr txBox="1"/>
+              <p:nvPr/>
+            </p:nvSpPr>
+            <p:spPr>
+              <a:xfrm>
+                <a:off x="7632356" y="2277762"/>
+                <a:ext cx="2186048" cy="778162"/>
+              </a:xfrm>
+              <a:prstGeom prst="rect">
+                <a:avLst/>
+              </a:prstGeom>
+              <a:noFill/>
+            </p:spPr>
+            <p:txBody>
+              <a:bodyPr wrap="none" lIns="0" tIns="0" rIns="0" bIns="0" rtlCol="0">
+                <a:spAutoFit/>
+              </a:bodyPr>
+              <a:lstStyle/>
+              <a:p>
+                <a14:m>
+                  <m:oMathPara xmlns:m="http://schemas.openxmlformats.org/officeDocument/2006/math">
+                    <m:oMathParaPr>
+                      <m:jc m:val="centerGroup"/>
+                    </m:oMathParaPr>
+                    <m:oMath xmlns:m="http://schemas.openxmlformats.org/officeDocument/2006/math">
+                      <m:sSub>
+                        <m:sSubPr>
+                          <m:ctrlPr>
+                            <a:rPr lang="en-US" b="0" i="1" smtClean="0">
+                              <a:latin typeface="Cambria Math" panose="02040503050406030204" pitchFamily="18" charset="0"/>
+                            </a:rPr>
+                          </m:ctrlPr>
+                        </m:sSubPr>
+                        <m:e>
+                          <m:r>
+                            <a:rPr lang="en-US" b="0" i="1" smtClean="0">
+                              <a:latin typeface="Cambria Math" panose="02040503050406030204" pitchFamily="18" charset="0"/>
+                            </a:rPr>
+                            <m:t>𝐻</m:t>
+                          </m:r>
+                        </m:e>
+                        <m:sub>
+                          <m:r>
+                            <a:rPr lang="en-US" b="0" i="1" smtClean="0">
+                              <a:latin typeface="Cambria Math" panose="02040503050406030204" pitchFamily="18" charset="0"/>
+                            </a:rPr>
+                            <m:t>𝑡</m:t>
+                          </m:r>
+                        </m:sub>
+                      </m:sSub>
+                      <m:r>
+                        <a:rPr lang="en-US" b="0" i="1" smtClean="0">
+                          <a:latin typeface="Cambria Math" panose="02040503050406030204" pitchFamily="18" charset="0"/>
+                        </a:rPr>
+                        <m:t>=</m:t>
+                      </m:r>
+                      <m:f>
+                        <m:fPr>
+                          <m:ctrlPr>
+                            <a:rPr lang="en-US" b="0" i="1" smtClean="0">
+                              <a:latin typeface="Cambria Math" panose="02040503050406030204" pitchFamily="18" charset="0"/>
+                            </a:rPr>
+                          </m:ctrlPr>
+                        </m:fPr>
+                        <m:num>
+                          <m:r>
+                            <a:rPr lang="en-US" b="0" i="1" smtClean="0">
+                              <a:latin typeface="Cambria Math" panose="02040503050406030204" pitchFamily="18" charset="0"/>
+                            </a:rPr>
+                            <m:t>1</m:t>
+                          </m:r>
+                        </m:num>
+                        <m:den>
+                          <m:r>
+                            <a:rPr lang="en-US" b="0" i="1" smtClean="0">
+                              <a:latin typeface="Cambria Math" panose="02040503050406030204" pitchFamily="18" charset="0"/>
+                            </a:rPr>
+                            <m:t>𝑚</m:t>
+                          </m:r>
+                        </m:den>
+                      </m:f>
+                      <m:nary>
+                        <m:naryPr>
+                          <m:chr m:val="∑"/>
+                          <m:ctrlPr>
+                            <a:rPr lang="en-US" b="0" i="1" smtClean="0">
+                              <a:latin typeface="Cambria Math" panose="02040503050406030204" pitchFamily="18" charset="0"/>
+                            </a:rPr>
+                          </m:ctrlPr>
+                        </m:naryPr>
+                        <m:sub>
+                          <m:r>
+                            <a:rPr lang="en-US" b="0" i="1" smtClean="0">
+                              <a:latin typeface="Cambria Math" panose="02040503050406030204" pitchFamily="18" charset="0"/>
+                            </a:rPr>
+                            <m:t>𝑘</m:t>
+                          </m:r>
+                          <m:r>
+                            <a:rPr lang="en-US" b="0" i="1" smtClean="0">
+                              <a:latin typeface="Cambria Math" panose="02040503050406030204" pitchFamily="18" charset="0"/>
+                            </a:rPr>
+                            <m:t>=</m:t>
+                          </m:r>
+                          <m:r>
+                            <a:rPr lang="en-US" b="0" i="1" smtClean="0">
+                              <a:latin typeface="Cambria Math" panose="02040503050406030204" pitchFamily="18" charset="0"/>
+                            </a:rPr>
+                            <m:t>𝑡</m:t>
+                          </m:r>
+                          <m:r>
+                            <a:rPr lang="en-US" b="0" i="1" smtClean="0">
+                              <a:latin typeface="Cambria Math" panose="02040503050406030204" pitchFamily="18" charset="0"/>
+                            </a:rPr>
+                            <m:t>−</m:t>
+                          </m:r>
+                          <m:r>
+                            <a:rPr lang="en-US" b="0" i="1" smtClean="0">
+                              <a:latin typeface="Cambria Math" panose="02040503050406030204" pitchFamily="18" charset="0"/>
+                            </a:rPr>
+                            <m:t>𝑚</m:t>
+                          </m:r>
+                        </m:sub>
+                        <m:sup>
+                          <m:r>
+                            <a:rPr lang="en-US" b="0" i="1" smtClean="0">
+                              <a:latin typeface="Cambria Math" panose="02040503050406030204" pitchFamily="18" charset="0"/>
+                            </a:rPr>
+                            <m:t>𝑡</m:t>
+                          </m:r>
+                          <m:r>
+                            <a:rPr lang="en-US" b="0" i="1" smtClean="0">
+                              <a:latin typeface="Cambria Math" panose="02040503050406030204" pitchFamily="18" charset="0"/>
+                            </a:rPr>
+                            <m:t>−1</m:t>
+                          </m:r>
+                        </m:sup>
+                        <m:e>
+                          <m:sSub>
+                            <m:sSubPr>
+                              <m:ctrlPr>
+                                <a:rPr lang="en-US" b="0" i="1" smtClean="0">
+                                  <a:latin typeface="Cambria Math" panose="02040503050406030204" pitchFamily="18" charset="0"/>
+                                </a:rPr>
+                              </m:ctrlPr>
+                            </m:sSubPr>
+                            <m:e>
+                              <m:r>
+                                <a:rPr lang="en-US" b="0" i="1" smtClean="0">
+                                  <a:latin typeface="Cambria Math" panose="02040503050406030204" pitchFamily="18" charset="0"/>
+                                </a:rPr>
+                                <m:t>𝑀</m:t>
+                              </m:r>
+                            </m:e>
+                            <m:sub>
+                              <m:r>
+                                <a:rPr lang="en-US" b="0" i="1" smtClean="0">
+                                  <a:latin typeface="Cambria Math" panose="02040503050406030204" pitchFamily="18" charset="0"/>
+                                </a:rPr>
+                                <m:t>𝑘</m:t>
+                              </m:r>
+                            </m:sub>
+                          </m:sSub>
+                          <m:r>
+                            <a:rPr lang="en-US" b="0" i="1" smtClean="0">
+                              <a:latin typeface="Cambria Math" panose="02040503050406030204" pitchFamily="18" charset="0"/>
+                            </a:rPr>
+                            <m:t>(</m:t>
+                          </m:r>
+                          <m:sSubSup>
+                            <m:sSubSupPr>
+                              <m:ctrlPr>
+                                <a:rPr lang="en-US" b="0" i="1" smtClean="0">
+                                  <a:latin typeface="Cambria Math" panose="02040503050406030204" pitchFamily="18" charset="0"/>
+                                </a:rPr>
+                              </m:ctrlPr>
+                            </m:sSubSupPr>
+                            <m:e>
+                              <m:r>
+                                <a:rPr lang="en-US" b="0" i="1" smtClean="0">
+                                  <a:latin typeface="Cambria Math" panose="02040503050406030204" pitchFamily="18" charset="0"/>
+                                </a:rPr>
+                                <m:t>𝑥</m:t>
+                              </m:r>
+                            </m:e>
+                            <m:sub>
+                              <m:r>
+                                <a:rPr lang="en-US" b="0" i="1" smtClean="0">
+                                  <a:latin typeface="Cambria Math" panose="02040503050406030204" pitchFamily="18" charset="0"/>
+                                </a:rPr>
+                                <m:t>𝑘</m:t>
+                              </m:r>
+                            </m:sub>
+                            <m:sup>
+                              <m:r>
+                                <a:rPr lang="en-US" b="0" i="1" smtClean="0">
+                                  <a:latin typeface="Cambria Math" panose="02040503050406030204" pitchFamily="18" charset="0"/>
+                                </a:rPr>
+                                <m:t>∗</m:t>
+                              </m:r>
+                            </m:sup>
+                          </m:sSubSup>
+                          <m:r>
+                            <a:rPr lang="en-US" b="0" i="1" smtClean="0">
+                              <a:latin typeface="Cambria Math" panose="02040503050406030204" pitchFamily="18" charset="0"/>
+                            </a:rPr>
+                            <m:t>)</m:t>
+                          </m:r>
+                        </m:e>
+                      </m:nary>
+                    </m:oMath>
+                  </m:oMathPara>
+                </a14:m>
+                <a:endParaRPr lang="en-US" dirty="0"/>
+              </a:p>
+            </p:txBody>
+          </p:sp>
+        </mc:Choice>
+        <mc:Fallback>
+          <p:sp>
+            <p:nvSpPr>
+              <p:cNvPr id="6" name="TextBox 5"/>
+              <p:cNvSpPr txBox="1">
+                <a:spLocks noRot="1" noChangeAspect="1" noMove="1" noResize="1" noEditPoints="1" noAdjustHandles="1" noChangeArrowheads="1" noChangeShapeType="1" noTextEdit="1"/>
+              </p:cNvSpPr>
+              <p:nvPr/>
+            </p:nvSpPr>
+            <p:spPr>
+              <a:xfrm>
+                <a:off x="7632356" y="2277762"/>
+                <a:ext cx="2186048" cy="778162"/>
+              </a:xfrm>
+              <a:prstGeom prst="rect">
+                <a:avLst/>
+              </a:prstGeom>
+              <a:blipFill rotWithShape="0">
+                <a:blip r:embed="rId3"/>
+                <a:stretch>
+                  <a:fillRect/>
+                </a:stretch>
+              </a:blipFill>
+            </p:spPr>
+            <p:txBody>
+              <a:bodyPr/>
+              <a:lstStyle/>
+              <a:p>
+                <a:r>
+                  <a:rPr lang="en-US">
+                    <a:noFill/>
+                  </a:rPr>
+                  <a:t> </a:t>
+                </a:r>
+              </a:p>
+            </p:txBody>
+          </p:sp>
+        </mc:Fallback>
+      </mc:AlternateContent>
+      <p:sp>
+        <p:nvSpPr>
+          <p:cNvPr id="7" name="TextBox 6"/>
           <p:cNvSpPr txBox="1"/>
           <p:nvPr/>
         </p:nvSpPr>
         <p:spPr>
           <a:xfrm>
-            <a:off x="485600" y="3439314"/>
-            <a:ext cx="10972797" cy="2308324"/>
+            <a:off x="6180082" y="2645647"/>
+            <a:ext cx="1040670" cy="523220"/>
           </a:xfrm>
           <a:prstGeom prst="rect">
             <a:avLst/>
@@ -5457,67 +7093,1073 @@
           <a:noFill/>
         </p:spPr>
         <p:txBody>
-          <a:bodyPr wrap="square" rtlCol="0">
+          <a:bodyPr wrap="none" rtlCol="0">
             <a:spAutoFit/>
           </a:bodyPr>
           <a:lstStyle/>
           <a:p>
-            <a:pPr marL="285750" indent="-285750">
-              <a:buFont typeface="Arial" panose="020B0604020202020204" pitchFamily="34" charset="0"/>
-              <a:buChar char="•"/>
-            </a:pPr>
+            <a:pPr algn="r"/>
+            <a:r>
+              <a:rPr lang="en-US" sz="1400" dirty="0" smtClean="0"/>
+              <a:t>Generative </a:t>
+            </a:r>
+            <a:br>
+              <a:rPr lang="en-US" sz="1400" dirty="0" smtClean="0"/>
+            </a:br>
+            <a:r>
+              <a:rPr lang="en-US" sz="1400" dirty="0" smtClean="0"/>
+              <a:t>Model</a:t>
+            </a:r>
+            <a:endParaRPr lang="en-US" sz="1400" dirty="0"/>
+          </a:p>
+        </p:txBody>
+      </p:sp>
+      <p:sp>
+        <p:nvSpPr>
+          <p:cNvPr id="8" name="TextBox 7"/>
+          <p:cNvSpPr txBox="1"/>
+          <p:nvPr/>
+        </p:nvSpPr>
+        <p:spPr>
+          <a:xfrm>
+            <a:off x="10336041" y="2666843"/>
+            <a:ext cx="1747594" cy="738664"/>
+          </a:xfrm>
+          <a:prstGeom prst="rect">
+            <a:avLst/>
+          </a:prstGeom>
+          <a:noFill/>
+        </p:spPr>
+        <p:txBody>
+          <a:bodyPr wrap="none" rtlCol="0">
+            <a:spAutoFit/>
+          </a:bodyPr>
+          <a:lstStyle/>
+          <a:p>
+            <a:r>
+              <a:rPr lang="en-US" sz="1400" dirty="0" smtClean="0"/>
+              <a:t>Class-saliency maps </a:t>
+            </a:r>
+            <a:br>
+              <a:rPr lang="en-US" sz="1400" dirty="0" smtClean="0"/>
+            </a:br>
+            <a:r>
+              <a:rPr lang="en-US" sz="1400" dirty="0" smtClean="0"/>
+              <a:t>surrounding target in</a:t>
+            </a:r>
+            <a:br>
+              <a:rPr lang="en-US" sz="1400" dirty="0" smtClean="0"/>
+            </a:br>
+            <a:r>
+              <a:rPr lang="en-US" sz="1400" dirty="0" smtClean="0"/>
+              <a:t>frame k</a:t>
+            </a:r>
+            <a:endParaRPr lang="en-US" sz="1400" dirty="0"/>
+          </a:p>
+        </p:txBody>
+      </p:sp>
+      <p:cxnSp>
+        <p:nvCxnSpPr>
+          <p:cNvPr id="10" name="Straight Arrow Connector 9"/>
+          <p:cNvCxnSpPr>
+            <a:stCxn id="8" idx="1"/>
+          </p:cNvCxnSpPr>
+          <p:nvPr/>
+        </p:nvCxnSpPr>
+        <p:spPr>
+          <a:xfrm flipH="1" flipV="1">
+            <a:off x="9818404" y="2799536"/>
+            <a:ext cx="517637" cy="236639"/>
+          </a:xfrm>
+          <a:prstGeom prst="straightConnector1">
+            <a:avLst/>
+          </a:prstGeom>
+          <a:ln>
+            <a:solidFill>
+              <a:schemeClr val="tx1"/>
+            </a:solidFill>
+            <a:tailEnd type="triangle"/>
+          </a:ln>
+        </p:spPr>
+        <p:style>
+          <a:lnRef idx="1">
+            <a:schemeClr val="accent1"/>
+          </a:lnRef>
+          <a:fillRef idx="0">
+            <a:schemeClr val="accent1"/>
+          </a:fillRef>
+          <a:effectRef idx="0">
+            <a:schemeClr val="accent1"/>
+          </a:effectRef>
+          <a:fontRef idx="minor">
+            <a:schemeClr val="tx1"/>
+          </a:fontRef>
+        </p:style>
+      </p:cxnSp>
+      <p:cxnSp>
+        <p:nvCxnSpPr>
+          <p:cNvPr id="12" name="Straight Arrow Connector 11"/>
+          <p:cNvCxnSpPr>
+            <a:stCxn id="7" idx="3"/>
+            <a:endCxn id="6" idx="1"/>
+          </p:cNvCxnSpPr>
+          <p:nvPr/>
+        </p:nvCxnSpPr>
+        <p:spPr>
+          <a:xfrm flipV="1">
+            <a:off x="7220752" y="2666843"/>
+            <a:ext cx="411604" cy="240414"/>
+          </a:xfrm>
+          <a:prstGeom prst="straightConnector1">
+            <a:avLst/>
+          </a:prstGeom>
+          <a:ln>
+            <a:solidFill>
+              <a:schemeClr val="tx1"/>
+            </a:solidFill>
+            <a:tailEnd type="triangle"/>
+          </a:ln>
+        </p:spPr>
+        <p:style>
+          <a:lnRef idx="1">
+            <a:schemeClr val="accent1"/>
+          </a:lnRef>
+          <a:fillRef idx="0">
+            <a:schemeClr val="accent1"/>
+          </a:fillRef>
+          <a:effectRef idx="0">
+            <a:schemeClr val="accent1"/>
+          </a:effectRef>
+          <a:fontRef idx="minor">
+            <a:schemeClr val="tx1"/>
+          </a:fontRef>
+        </p:style>
+      </p:cxnSp>
+      <mc:AlternateContent xmlns:mc="http://schemas.openxmlformats.org/markup-compatibility/2006">
+        <mc:Choice xmlns:a14="http://schemas.microsoft.com/office/drawing/2010/main" Requires="a14">
+          <p:sp>
+            <p:nvSpPr>
+              <p:cNvPr id="13" name="TextBox 12"/>
+              <p:cNvSpPr txBox="1"/>
+              <p:nvPr/>
+            </p:nvSpPr>
+            <p:spPr>
+              <a:xfrm>
+                <a:off x="457200" y="3546389"/>
+                <a:ext cx="3511923" cy="276999"/>
+              </a:xfrm>
+              <a:prstGeom prst="rect">
+                <a:avLst/>
+              </a:prstGeom>
+              <a:noFill/>
+            </p:spPr>
+            <p:txBody>
+              <a:bodyPr wrap="none" lIns="0" tIns="0" rIns="0" bIns="0" rtlCol="0">
+                <a:spAutoFit/>
+              </a:bodyPr>
+              <a:lstStyle/>
+              <a:p>
+                <a14:m>
+                  <m:oMathPara xmlns:m="http://schemas.openxmlformats.org/officeDocument/2006/math">
+                    <m:oMathParaPr>
+                      <m:jc m:val="centerGroup"/>
+                    </m:oMathParaPr>
+                    <m:oMath xmlns:m="http://schemas.openxmlformats.org/officeDocument/2006/math">
+                      <m:r>
+                        <a:rPr lang="en-US" b="0" i="1" smtClean="0">
+                          <a:latin typeface="Cambria Math" panose="02040503050406030204" pitchFamily="18" charset="0"/>
+                        </a:rPr>
+                        <m:t>𝑝</m:t>
+                      </m:r>
+                      <m:d>
+                        <m:dPr>
+                          <m:ctrlPr>
+                            <a:rPr lang="en-US" b="0" i="1" smtClean="0">
+                              <a:latin typeface="Cambria Math" panose="02040503050406030204" pitchFamily="18" charset="0"/>
+                            </a:rPr>
+                          </m:ctrlPr>
+                        </m:dPr>
+                        <m:e>
+                          <m:sSub>
+                            <m:sSubPr>
+                              <m:ctrlPr>
+                                <a:rPr lang="en-US" b="0" i="1" smtClean="0">
+                                  <a:latin typeface="Cambria Math" panose="02040503050406030204" pitchFamily="18" charset="0"/>
+                                </a:rPr>
+                              </m:ctrlPr>
+                            </m:sSubPr>
+                            <m:e>
+                              <m:r>
+                                <a:rPr lang="en-US" b="0" i="1" smtClean="0">
+                                  <a:latin typeface="Cambria Math" panose="02040503050406030204" pitchFamily="18" charset="0"/>
+                                </a:rPr>
+                                <m:t>𝑥</m:t>
+                              </m:r>
+                            </m:e>
+                            <m:sub>
+                              <m:r>
+                                <a:rPr lang="en-US" b="0" i="1" smtClean="0">
+                                  <a:latin typeface="Cambria Math" panose="02040503050406030204" pitchFamily="18" charset="0"/>
+                                </a:rPr>
+                                <m:t>𝑡</m:t>
+                              </m:r>
+                            </m:sub>
+                          </m:sSub>
+                        </m:e>
+                        <m:e>
+                          <m:sSub>
+                            <m:sSubPr>
+                              <m:ctrlPr>
+                                <a:rPr lang="en-US" b="0" i="1" smtClean="0">
+                                  <a:latin typeface="Cambria Math" panose="02040503050406030204" pitchFamily="18" charset="0"/>
+                                </a:rPr>
+                              </m:ctrlPr>
+                            </m:sSubPr>
+                            <m:e>
+                              <m:r>
+                                <a:rPr lang="en-US" b="0" i="1" smtClean="0">
+                                  <a:latin typeface="Cambria Math" panose="02040503050406030204" pitchFamily="18" charset="0"/>
+                                </a:rPr>
+                                <m:t>𝑀</m:t>
+                              </m:r>
+                            </m:e>
+                            <m:sub>
+                              <m:r>
+                                <a:rPr lang="en-US" b="0" i="1" smtClean="0">
+                                  <a:latin typeface="Cambria Math" panose="02040503050406030204" pitchFamily="18" charset="0"/>
+                                </a:rPr>
+                                <m:t>1:</m:t>
+                              </m:r>
+                              <m:r>
+                                <a:rPr lang="en-US" b="0" i="1" smtClean="0">
+                                  <a:latin typeface="Cambria Math" panose="02040503050406030204" pitchFamily="18" charset="0"/>
+                                </a:rPr>
+                                <m:t>𝑡</m:t>
+                              </m:r>
+                            </m:sub>
+                          </m:sSub>
+                        </m:e>
+                      </m:d>
+                      <m:r>
+                        <a:rPr lang="en-US" b="0" i="1" smtClean="0">
+                          <a:latin typeface="Cambria Math" panose="02040503050406030204" pitchFamily="18" charset="0"/>
+                        </a:rPr>
+                        <m:t>∝</m:t>
+                      </m:r>
+                      <m:r>
+                        <a:rPr lang="en-US" b="0" i="1" smtClean="0">
+                          <a:latin typeface="Cambria Math" panose="02040503050406030204" pitchFamily="18" charset="0"/>
+                        </a:rPr>
+                        <m:t>𝑝</m:t>
+                      </m:r>
+                      <m:d>
+                        <m:dPr>
+                          <m:ctrlPr>
+                            <a:rPr lang="en-US" b="0" i="1" smtClean="0">
+                              <a:latin typeface="Cambria Math" panose="02040503050406030204" pitchFamily="18" charset="0"/>
+                            </a:rPr>
+                          </m:ctrlPr>
+                        </m:dPr>
+                        <m:e>
+                          <m:sSub>
+                            <m:sSubPr>
+                              <m:ctrlPr>
+                                <a:rPr lang="en-US" b="0" i="1" smtClean="0">
+                                  <a:latin typeface="Cambria Math" panose="02040503050406030204" pitchFamily="18" charset="0"/>
+                                </a:rPr>
+                              </m:ctrlPr>
+                            </m:sSubPr>
+                            <m:e>
+                              <m:r>
+                                <a:rPr lang="en-US" b="0" i="1" smtClean="0">
+                                  <a:latin typeface="Cambria Math" panose="02040503050406030204" pitchFamily="18" charset="0"/>
+                                </a:rPr>
+                                <m:t>𝑀</m:t>
+                              </m:r>
+                            </m:e>
+                            <m:sub>
+                              <m:r>
+                                <a:rPr lang="en-US" b="0" i="1" smtClean="0">
+                                  <a:latin typeface="Cambria Math" panose="02040503050406030204" pitchFamily="18" charset="0"/>
+                                </a:rPr>
+                                <m:t>𝑡</m:t>
+                              </m:r>
+                            </m:sub>
+                          </m:sSub>
+                        </m:e>
+                        <m:e>
+                          <m:sSub>
+                            <m:sSubPr>
+                              <m:ctrlPr>
+                                <a:rPr lang="en-US" b="0" i="1" smtClean="0">
+                                  <a:latin typeface="Cambria Math" panose="02040503050406030204" pitchFamily="18" charset="0"/>
+                                </a:rPr>
+                              </m:ctrlPr>
+                            </m:sSubPr>
+                            <m:e>
+                              <m:r>
+                                <a:rPr lang="en-US" b="0" i="1" smtClean="0">
+                                  <a:latin typeface="Cambria Math" panose="02040503050406030204" pitchFamily="18" charset="0"/>
+                                </a:rPr>
+                                <m:t>𝑥</m:t>
+                              </m:r>
+                            </m:e>
+                            <m:sub>
+                              <m:r>
+                                <a:rPr lang="en-US" b="0" i="1" smtClean="0">
+                                  <a:latin typeface="Cambria Math" panose="02040503050406030204" pitchFamily="18" charset="0"/>
+                                </a:rPr>
+                                <m:t>𝑡</m:t>
+                              </m:r>
+                            </m:sub>
+                          </m:sSub>
+                        </m:e>
+                      </m:d>
+                      <m:r>
+                        <a:rPr lang="en-US" b="0" i="1" smtClean="0">
+                          <a:latin typeface="Cambria Math" panose="02040503050406030204" pitchFamily="18" charset="0"/>
+                        </a:rPr>
+                        <m:t> </m:t>
+                      </m:r>
+                      <m:r>
+                        <a:rPr lang="en-US" b="0" i="1" smtClean="0">
+                          <a:latin typeface="Cambria Math" panose="02040503050406030204" pitchFamily="18" charset="0"/>
+                        </a:rPr>
+                        <m:t>𝑝</m:t>
+                      </m:r>
+                      <m:r>
+                        <a:rPr lang="en-US" b="0" i="1" smtClean="0">
+                          <a:latin typeface="Cambria Math" panose="02040503050406030204" pitchFamily="18" charset="0"/>
+                        </a:rPr>
+                        <m:t>(</m:t>
+                      </m:r>
+                      <m:sSub>
+                        <m:sSubPr>
+                          <m:ctrlPr>
+                            <a:rPr lang="en-US" b="0" i="1" smtClean="0">
+                              <a:latin typeface="Cambria Math" panose="02040503050406030204" pitchFamily="18" charset="0"/>
+                            </a:rPr>
+                          </m:ctrlPr>
+                        </m:sSubPr>
+                        <m:e>
+                          <m:r>
+                            <a:rPr lang="en-US" b="0" i="1" smtClean="0">
+                              <a:latin typeface="Cambria Math" panose="02040503050406030204" pitchFamily="18" charset="0"/>
+                            </a:rPr>
+                            <m:t>𝑥</m:t>
+                          </m:r>
+                        </m:e>
+                        <m:sub>
+                          <m:r>
+                            <a:rPr lang="en-US" b="0" i="1" smtClean="0">
+                              <a:latin typeface="Cambria Math" panose="02040503050406030204" pitchFamily="18" charset="0"/>
+                            </a:rPr>
+                            <m:t>𝑡</m:t>
+                          </m:r>
+                        </m:sub>
+                      </m:sSub>
+                      <m:r>
+                        <a:rPr lang="en-US" b="0" i="1" smtClean="0">
+                          <a:latin typeface="Cambria Math" panose="02040503050406030204" pitchFamily="18" charset="0"/>
+                        </a:rPr>
+                        <m:t>|</m:t>
+                      </m:r>
+                      <m:sSub>
+                        <m:sSubPr>
+                          <m:ctrlPr>
+                            <a:rPr lang="en-US" b="0" i="1" smtClean="0">
+                              <a:latin typeface="Cambria Math" panose="02040503050406030204" pitchFamily="18" charset="0"/>
+                            </a:rPr>
+                          </m:ctrlPr>
+                        </m:sSubPr>
+                        <m:e>
+                          <m:r>
+                            <a:rPr lang="en-US" b="0" i="1" smtClean="0">
+                              <a:latin typeface="Cambria Math" panose="02040503050406030204" pitchFamily="18" charset="0"/>
+                            </a:rPr>
+                            <m:t>𝑀</m:t>
+                          </m:r>
+                        </m:e>
+                        <m:sub>
+                          <m:r>
+                            <a:rPr lang="en-US" b="0" i="1" smtClean="0">
+                              <a:latin typeface="Cambria Math" panose="02040503050406030204" pitchFamily="18" charset="0"/>
+                            </a:rPr>
+                            <m:t>1:</m:t>
+                          </m:r>
+                          <m:r>
+                            <a:rPr lang="en-US" b="0" i="1" smtClean="0">
+                              <a:latin typeface="Cambria Math" panose="02040503050406030204" pitchFamily="18" charset="0"/>
+                            </a:rPr>
+                            <m:t>𝑡</m:t>
+                          </m:r>
+                          <m:r>
+                            <a:rPr lang="en-US" b="0" i="1" smtClean="0">
+                              <a:latin typeface="Cambria Math" panose="02040503050406030204" pitchFamily="18" charset="0"/>
+                            </a:rPr>
+                            <m:t>−1</m:t>
+                          </m:r>
+                        </m:sub>
+                      </m:sSub>
+                      <m:r>
+                        <a:rPr lang="en-US" b="0" i="1" smtClean="0">
+                          <a:latin typeface="Cambria Math" panose="02040503050406030204" pitchFamily="18" charset="0"/>
+                        </a:rPr>
+                        <m:t>)</m:t>
+                      </m:r>
+                    </m:oMath>
+                  </m:oMathPara>
+                </a14:m>
+                <a:endParaRPr lang="en-US" dirty="0"/>
+              </a:p>
+            </p:txBody>
+          </p:sp>
+        </mc:Choice>
+        <mc:Fallback>
+          <p:sp>
+            <p:nvSpPr>
+              <p:cNvPr id="13" name="TextBox 12"/>
+              <p:cNvSpPr txBox="1">
+                <a:spLocks noRot="1" noChangeAspect="1" noMove="1" noResize="1" noEditPoints="1" noAdjustHandles="1" noChangeArrowheads="1" noChangeShapeType="1" noTextEdit="1"/>
+              </p:cNvSpPr>
+              <p:nvPr/>
+            </p:nvSpPr>
+            <p:spPr>
+              <a:xfrm>
+                <a:off x="457200" y="3546389"/>
+                <a:ext cx="3511923" cy="276999"/>
+              </a:xfrm>
+              <a:prstGeom prst="rect">
+                <a:avLst/>
+              </a:prstGeom>
+              <a:blipFill rotWithShape="0">
+                <a:blip r:embed="rId4"/>
+                <a:stretch>
+                  <a:fillRect l="-1215" t="-2222" r="-2257" b="-35556"/>
+                </a:stretch>
+              </a:blipFill>
+            </p:spPr>
+            <p:txBody>
+              <a:bodyPr/>
+              <a:lstStyle/>
+              <a:p>
+                <a:r>
+                  <a:rPr lang="en-US">
+                    <a:noFill/>
+                  </a:rPr>
+                  <a:t> </a:t>
+                </a:r>
+              </a:p>
+            </p:txBody>
+          </p:sp>
+        </mc:Fallback>
+      </mc:AlternateContent>
+      <p:sp>
+        <p:nvSpPr>
+          <p:cNvPr id="16" name="Right Brace 15"/>
+          <p:cNvSpPr/>
+          <p:nvPr/>
+        </p:nvSpPr>
+        <p:spPr>
+          <a:xfrm rot="5400000">
+            <a:off x="810638" y="3469950"/>
+            <a:ext cx="354328" cy="1061207"/>
+          </a:xfrm>
+          <a:prstGeom prst="rightBrace">
+            <a:avLst>
+              <a:gd name="adj1" fmla="val 8333"/>
+              <a:gd name="adj2" fmla="val 53953"/>
+            </a:avLst>
+          </a:prstGeom>
+          <a:ln w="12700">
+            <a:solidFill>
+              <a:schemeClr val="tx1"/>
+            </a:solidFill>
+          </a:ln>
+        </p:spPr>
+        <p:style>
+          <a:lnRef idx="1">
+            <a:schemeClr val="accent1"/>
+          </a:lnRef>
+          <a:fillRef idx="0">
+            <a:schemeClr val="accent1"/>
+          </a:fillRef>
+          <a:effectRef idx="0">
+            <a:schemeClr val="accent1"/>
+          </a:effectRef>
+          <a:fontRef idx="minor">
+            <a:schemeClr val="tx1"/>
+          </a:fontRef>
+        </p:style>
+        <p:txBody>
+          <a:bodyPr rtlCol="0" anchor="ctr"/>
+          <a:lstStyle/>
+          <a:p>
+            <a:pPr algn="ctr"/>
+            <a:endParaRPr lang="en-US"/>
+          </a:p>
+        </p:txBody>
+      </p:sp>
+      <p:sp>
+        <p:nvSpPr>
+          <p:cNvPr id="17" name="Right Brace 16"/>
+          <p:cNvSpPr/>
+          <p:nvPr/>
+        </p:nvSpPr>
+        <p:spPr>
+          <a:xfrm rot="5400000">
+            <a:off x="2045918" y="3595908"/>
+            <a:ext cx="354328" cy="855676"/>
+          </a:xfrm>
+          <a:prstGeom prst="rightBrace">
+            <a:avLst>
+              <a:gd name="adj1" fmla="val 8333"/>
+              <a:gd name="adj2" fmla="val 53953"/>
+            </a:avLst>
+          </a:prstGeom>
+          <a:ln w="12700">
+            <a:solidFill>
+              <a:schemeClr val="tx1"/>
+            </a:solidFill>
+          </a:ln>
+        </p:spPr>
+        <p:style>
+          <a:lnRef idx="1">
+            <a:schemeClr val="accent1"/>
+          </a:lnRef>
+          <a:fillRef idx="0">
+            <a:schemeClr val="accent1"/>
+          </a:fillRef>
+          <a:effectRef idx="0">
+            <a:schemeClr val="accent1"/>
+          </a:effectRef>
+          <a:fontRef idx="minor">
+            <a:schemeClr val="tx1"/>
+          </a:fontRef>
+        </p:style>
+        <p:txBody>
+          <a:bodyPr rtlCol="0" anchor="ctr"/>
+          <a:lstStyle/>
+          <a:p>
+            <a:pPr algn="ctr"/>
+            <a:endParaRPr lang="en-US"/>
+          </a:p>
+        </p:txBody>
+      </p:sp>
+      <p:sp>
+        <p:nvSpPr>
+          <p:cNvPr id="18" name="Right Brace 17"/>
+          <p:cNvSpPr/>
+          <p:nvPr/>
+        </p:nvSpPr>
+        <p:spPr>
+          <a:xfrm rot="5400000">
+            <a:off x="3149394" y="3381183"/>
+            <a:ext cx="354328" cy="1285128"/>
+          </a:xfrm>
+          <a:prstGeom prst="rightBrace">
+            <a:avLst>
+              <a:gd name="adj1" fmla="val 8333"/>
+              <a:gd name="adj2" fmla="val 53953"/>
+            </a:avLst>
+          </a:prstGeom>
+          <a:ln w="12700">
+            <a:solidFill>
+              <a:schemeClr val="tx1"/>
+            </a:solidFill>
+          </a:ln>
+        </p:spPr>
+        <p:style>
+          <a:lnRef idx="1">
+            <a:schemeClr val="accent1"/>
+          </a:lnRef>
+          <a:fillRef idx="0">
+            <a:schemeClr val="accent1"/>
+          </a:fillRef>
+          <a:effectRef idx="0">
+            <a:schemeClr val="accent1"/>
+          </a:effectRef>
+          <a:fontRef idx="minor">
+            <a:schemeClr val="tx1"/>
+          </a:fontRef>
+        </p:style>
+        <p:txBody>
+          <a:bodyPr rtlCol="0" anchor="ctr"/>
+          <a:lstStyle/>
+          <a:p>
+            <a:pPr algn="ctr"/>
+            <a:endParaRPr lang="en-US"/>
+          </a:p>
+        </p:txBody>
+      </p:sp>
+      <p:sp>
+        <p:nvSpPr>
+          <p:cNvPr id="19" name="TextBox 18"/>
+          <p:cNvSpPr txBox="1"/>
+          <p:nvPr/>
+        </p:nvSpPr>
+        <p:spPr>
+          <a:xfrm>
+            <a:off x="424124" y="4123543"/>
+            <a:ext cx="1048685" cy="369332"/>
+          </a:xfrm>
+          <a:prstGeom prst="rect">
+            <a:avLst/>
+          </a:prstGeom>
+          <a:noFill/>
+        </p:spPr>
+        <p:txBody>
+          <a:bodyPr wrap="none" rtlCol="0">
+            <a:spAutoFit/>
+          </a:bodyPr>
+          <a:lstStyle/>
+          <a:p>
             <a:r>
               <a:rPr lang="en-US" dirty="0" smtClean="0"/>
-              <a:t>Following the SVM initialization steps, we also take 24 negative samples (those with less than a 30% overlap with the positive example) from this frame</a:t>
-            </a:r>
-          </a:p>
-          <a:p>
-            <a:pPr marL="285750" indent="-285750">
-              <a:buFont typeface="Arial" panose="020B0604020202020204" pitchFamily="34" charset="0"/>
-              <a:buChar char="•"/>
-            </a:pPr>
-            <a:endParaRPr lang="en-US" dirty="0" smtClean="0"/>
-          </a:p>
-          <a:p>
-            <a:pPr marL="285750" indent="-285750">
-              <a:buFont typeface="Arial" panose="020B0604020202020204" pitchFamily="34" charset="0"/>
-              <a:buChar char="•"/>
-            </a:pPr>
+              <a:t>posterior</a:t>
+            </a:r>
+            <a:endParaRPr lang="en-US" dirty="0"/>
+          </a:p>
+        </p:txBody>
+      </p:sp>
+      <p:sp>
+        <p:nvSpPr>
+          <p:cNvPr id="20" name="TextBox 19"/>
+          <p:cNvSpPr txBox="1"/>
+          <p:nvPr/>
+        </p:nvSpPr>
+        <p:spPr>
+          <a:xfrm>
+            <a:off x="1635309" y="4123543"/>
+            <a:ext cx="1113125" cy="369332"/>
+          </a:xfrm>
+          <a:prstGeom prst="rect">
+            <a:avLst/>
+          </a:prstGeom>
+          <a:noFill/>
+        </p:spPr>
+        <p:txBody>
+          <a:bodyPr wrap="none" rtlCol="0">
+            <a:spAutoFit/>
+          </a:bodyPr>
+          <a:lstStyle/>
+          <a:p>
             <a:r>
               <a:rPr lang="en-US" dirty="0" smtClean="0"/>
-              <a:t>To help reduce the time requirement per frame we cap the size of our SVM training set to 300, plus twice the number of initial frames used. If 10 initial frames, the SVM training set size is capped at 320, where we always keep the positive examples of the first 20 frames.</a:t>
-            </a:r>
-          </a:p>
-          <a:p>
-            <a:pPr marL="285750" indent="-285750">
-              <a:buFont typeface="Arial" panose="020B0604020202020204" pitchFamily="34" charset="0"/>
-              <a:buChar char="•"/>
-            </a:pPr>
-            <a:endParaRPr lang="en-US" dirty="0" smtClean="0"/>
-          </a:p>
-          <a:p>
-            <a:pPr marL="285750" indent="-285750">
-              <a:buFont typeface="Arial" panose="020B0604020202020204" pitchFamily="34" charset="0"/>
-              <a:buChar char="•"/>
-            </a:pPr>
+              <a:t>likelihood</a:t>
+            </a:r>
+            <a:endParaRPr lang="en-US" dirty="0"/>
+          </a:p>
+        </p:txBody>
+      </p:sp>
+      <p:sp>
+        <p:nvSpPr>
+          <p:cNvPr id="21" name="TextBox 20"/>
+          <p:cNvSpPr txBox="1"/>
+          <p:nvPr/>
+        </p:nvSpPr>
+        <p:spPr>
+          <a:xfrm>
+            <a:off x="2927758" y="4123543"/>
+            <a:ext cx="636713" cy="369332"/>
+          </a:xfrm>
+          <a:prstGeom prst="rect">
+            <a:avLst/>
+          </a:prstGeom>
+          <a:noFill/>
+        </p:spPr>
+        <p:txBody>
+          <a:bodyPr wrap="none" rtlCol="0">
+            <a:spAutoFit/>
+          </a:bodyPr>
+          <a:lstStyle/>
+          <a:p>
             <a:r>
               <a:rPr lang="en-US" dirty="0" smtClean="0"/>
-              <a:t>In an attempt to further reduce computational complexity, we only retrain the SVM every third frame </a:t>
+              <a:t>prior</a:t>
             </a:r>
             <a:endParaRPr lang="en-US" dirty="0"/>
           </a:p>
         </p:txBody>
       </p:sp>
+      <mc:AlternateContent xmlns:mc="http://schemas.openxmlformats.org/markup-compatibility/2006">
+        <mc:Choice xmlns:a14="http://schemas.microsoft.com/office/drawing/2010/main" Requires="a14">
+          <p:sp>
+            <p:nvSpPr>
+              <p:cNvPr id="22" name="TextBox 21"/>
+              <p:cNvSpPr txBox="1"/>
+              <p:nvPr/>
+            </p:nvSpPr>
+            <p:spPr>
+              <a:xfrm>
+                <a:off x="1188507" y="5017085"/>
+                <a:ext cx="1213474" cy="276999"/>
+              </a:xfrm>
+              <a:prstGeom prst="rect">
+                <a:avLst/>
+              </a:prstGeom>
+              <a:noFill/>
+            </p:spPr>
+            <p:txBody>
+              <a:bodyPr wrap="none" lIns="0" tIns="0" rIns="0" bIns="0" rtlCol="0">
+                <a:spAutoFit/>
+              </a:bodyPr>
+              <a:lstStyle/>
+              <a:p>
+                <a14:m>
+                  <m:oMathPara xmlns:m="http://schemas.openxmlformats.org/officeDocument/2006/math">
+                    <m:oMathParaPr>
+                      <m:jc m:val="centerGroup"/>
+                    </m:oMathParaPr>
+                    <m:oMath xmlns:m="http://schemas.openxmlformats.org/officeDocument/2006/math">
+                      <m:sSub>
+                        <m:sSubPr>
+                          <m:ctrlPr>
+                            <a:rPr lang="en-US" b="0" i="1" smtClean="0">
+                              <a:latin typeface="Cambria Math" panose="02040503050406030204" pitchFamily="18" charset="0"/>
+                            </a:rPr>
+                          </m:ctrlPr>
+                        </m:sSubPr>
+                        <m:e>
+                          <m:r>
+                            <a:rPr lang="en-US" b="0" i="1" smtClean="0">
+                              <a:latin typeface="Cambria Math" panose="02040503050406030204" pitchFamily="18" charset="0"/>
+                            </a:rPr>
+                            <m:t>𝐻</m:t>
+                          </m:r>
+                        </m:e>
+                        <m:sub>
+                          <m:r>
+                            <a:rPr lang="en-US" b="0" i="1" smtClean="0">
+                              <a:latin typeface="Cambria Math" panose="02040503050406030204" pitchFamily="18" charset="0"/>
+                            </a:rPr>
+                            <m:t>𝑡</m:t>
+                          </m:r>
+                        </m:sub>
+                      </m:sSub>
+                      <m:r>
+                        <a:rPr lang="en-US" b="0" i="1" smtClean="0">
+                          <a:latin typeface="Cambria Math" panose="02040503050406030204" pitchFamily="18" charset="0"/>
+                        </a:rPr>
+                        <m:t> </m:t>
+                      </m:r>
+                      <m:r>
+                        <a:rPr lang="en-US" b="0" i="1" smtClean="0">
+                          <a:latin typeface="Cambria Math" panose="02040503050406030204" pitchFamily="18" charset="0"/>
+                          <a:ea typeface="Cambria Math" panose="02040503050406030204" pitchFamily="18" charset="0"/>
+                        </a:rPr>
+                        <m:t>⨂</m:t>
+                      </m:r>
+                      <m:sSub>
+                        <m:sSubPr>
+                          <m:ctrlPr>
+                            <a:rPr lang="en-US" b="0" i="1" smtClean="0">
+                              <a:latin typeface="Cambria Math" panose="02040503050406030204" pitchFamily="18" charset="0"/>
+                              <a:ea typeface="Cambria Math" panose="02040503050406030204" pitchFamily="18" charset="0"/>
+                            </a:rPr>
+                          </m:ctrlPr>
+                        </m:sSubPr>
+                        <m:e>
+                          <m:r>
+                            <a:rPr lang="en-US" b="0" i="1" smtClean="0">
+                              <a:latin typeface="Cambria Math" panose="02040503050406030204" pitchFamily="18" charset="0"/>
+                              <a:ea typeface="Cambria Math" panose="02040503050406030204" pitchFamily="18" charset="0"/>
+                            </a:rPr>
+                            <m:t>𝑀</m:t>
+                          </m:r>
+                        </m:e>
+                        <m:sub>
+                          <m:r>
+                            <a:rPr lang="en-US" b="0" i="1" smtClean="0">
+                              <a:latin typeface="Cambria Math" panose="02040503050406030204" pitchFamily="18" charset="0"/>
+                              <a:ea typeface="Cambria Math" panose="02040503050406030204" pitchFamily="18" charset="0"/>
+                            </a:rPr>
+                            <m:t>𝑡</m:t>
+                          </m:r>
+                        </m:sub>
+                      </m:sSub>
+                      <m:d>
+                        <m:dPr>
+                          <m:ctrlPr>
+                            <a:rPr lang="en-US" b="0" i="1" smtClean="0">
+                              <a:latin typeface="Cambria Math" panose="02040503050406030204" pitchFamily="18" charset="0"/>
+                              <a:ea typeface="Cambria Math" panose="02040503050406030204" pitchFamily="18" charset="0"/>
+                            </a:rPr>
+                          </m:ctrlPr>
+                        </m:dPr>
+                        <m:e>
+                          <m:sSub>
+                            <m:sSubPr>
+                              <m:ctrlPr>
+                                <a:rPr lang="en-US" b="0" i="1" smtClean="0">
+                                  <a:latin typeface="Cambria Math" panose="02040503050406030204" pitchFamily="18" charset="0"/>
+                                  <a:ea typeface="Cambria Math" panose="02040503050406030204" pitchFamily="18" charset="0"/>
+                                </a:rPr>
+                              </m:ctrlPr>
+                            </m:sSubPr>
+                            <m:e>
+                              <m:r>
+                                <a:rPr lang="en-US" b="0" i="1" smtClean="0">
+                                  <a:latin typeface="Cambria Math" panose="02040503050406030204" pitchFamily="18" charset="0"/>
+                                  <a:ea typeface="Cambria Math" panose="02040503050406030204" pitchFamily="18" charset="0"/>
+                                </a:rPr>
+                                <m:t>𝑥</m:t>
+                              </m:r>
+                            </m:e>
+                            <m:sub>
+                              <m:r>
+                                <a:rPr lang="en-US" b="0" i="1" smtClean="0">
+                                  <a:latin typeface="Cambria Math" panose="02040503050406030204" pitchFamily="18" charset="0"/>
+                                  <a:ea typeface="Cambria Math" panose="02040503050406030204" pitchFamily="18" charset="0"/>
+                                </a:rPr>
+                                <m:t>𝑡</m:t>
+                              </m:r>
+                            </m:sub>
+                          </m:sSub>
+                        </m:e>
+                      </m:d>
+                    </m:oMath>
+                  </m:oMathPara>
+                </a14:m>
+                <a:endParaRPr lang="en-US" dirty="0"/>
+              </a:p>
+            </p:txBody>
+          </p:sp>
+        </mc:Choice>
+        <mc:Fallback>
+          <p:sp>
+            <p:nvSpPr>
+              <p:cNvPr id="22" name="TextBox 21"/>
+              <p:cNvSpPr txBox="1">
+                <a:spLocks noRot="1" noChangeAspect="1" noMove="1" noResize="1" noEditPoints="1" noAdjustHandles="1" noChangeArrowheads="1" noChangeShapeType="1" noTextEdit="1"/>
+              </p:cNvSpPr>
+              <p:nvPr/>
+            </p:nvSpPr>
+            <p:spPr>
+              <a:xfrm>
+                <a:off x="1188507" y="5017085"/>
+                <a:ext cx="1213474" cy="276999"/>
+              </a:xfrm>
+              <a:prstGeom prst="rect">
+                <a:avLst/>
+              </a:prstGeom>
+              <a:blipFill rotWithShape="0">
+                <a:blip r:embed="rId5"/>
+                <a:stretch>
+                  <a:fillRect l="-4523" b="-20000"/>
+                </a:stretch>
+              </a:blipFill>
+            </p:spPr>
+            <p:txBody>
+              <a:bodyPr/>
+              <a:lstStyle/>
+              <a:p>
+                <a:r>
+                  <a:rPr lang="en-US">
+                    <a:noFill/>
+                  </a:rPr>
+                  <a:t> </a:t>
+                </a:r>
+              </a:p>
+            </p:txBody>
+          </p:sp>
+        </mc:Fallback>
+      </mc:AlternateContent>
+      <p:sp>
+        <p:nvSpPr>
+          <p:cNvPr id="23" name="TextBox 22"/>
+          <p:cNvSpPr txBox="1"/>
+          <p:nvPr/>
+        </p:nvSpPr>
+        <p:spPr>
+          <a:xfrm>
+            <a:off x="2853873" y="4970918"/>
+            <a:ext cx="1600118" cy="369332"/>
+          </a:xfrm>
+          <a:prstGeom prst="rect">
+            <a:avLst/>
+          </a:prstGeom>
+          <a:noFill/>
+        </p:spPr>
+        <p:txBody>
+          <a:bodyPr wrap="none" rtlCol="0">
+            <a:spAutoFit/>
+          </a:bodyPr>
+          <a:lstStyle/>
+          <a:p>
+            <a:r>
+              <a:rPr lang="en-US" dirty="0" smtClean="0"/>
+              <a:t>location-based</a:t>
+            </a:r>
+            <a:endParaRPr lang="en-US" dirty="0"/>
+          </a:p>
+        </p:txBody>
+      </p:sp>
+      <p:cxnSp>
+        <p:nvCxnSpPr>
+          <p:cNvPr id="25" name="Straight Arrow Connector 24"/>
+          <p:cNvCxnSpPr>
+            <a:stCxn id="20" idx="2"/>
+            <a:endCxn id="22" idx="0"/>
+          </p:cNvCxnSpPr>
+          <p:nvPr/>
+        </p:nvCxnSpPr>
+        <p:spPr>
+          <a:xfrm flipH="1">
+            <a:off x="1795244" y="4492875"/>
+            <a:ext cx="396628" cy="524210"/>
+          </a:xfrm>
+          <a:prstGeom prst="straightConnector1">
+            <a:avLst/>
+          </a:prstGeom>
+          <a:ln>
+            <a:solidFill>
+              <a:schemeClr val="tx1"/>
+            </a:solidFill>
+            <a:tailEnd type="triangle"/>
+          </a:ln>
+        </p:spPr>
+        <p:style>
+          <a:lnRef idx="1">
+            <a:schemeClr val="accent1"/>
+          </a:lnRef>
+          <a:fillRef idx="0">
+            <a:schemeClr val="accent1"/>
+          </a:fillRef>
+          <a:effectRef idx="0">
+            <a:schemeClr val="accent1"/>
+          </a:effectRef>
+          <a:fontRef idx="minor">
+            <a:schemeClr val="tx1"/>
+          </a:fontRef>
+        </p:style>
+      </p:cxnSp>
+      <p:cxnSp>
+        <p:nvCxnSpPr>
+          <p:cNvPr id="27" name="Straight Arrow Connector 26"/>
+          <p:cNvCxnSpPr>
+            <a:stCxn id="21" idx="2"/>
+            <a:endCxn id="23" idx="0"/>
+          </p:cNvCxnSpPr>
+          <p:nvPr/>
+        </p:nvCxnSpPr>
+        <p:spPr>
+          <a:xfrm>
+            <a:off x="3246115" y="4492875"/>
+            <a:ext cx="407817" cy="478043"/>
+          </a:xfrm>
+          <a:prstGeom prst="straightConnector1">
+            <a:avLst/>
+          </a:prstGeom>
+          <a:ln>
+            <a:solidFill>
+              <a:schemeClr val="tx1"/>
+            </a:solidFill>
+            <a:tailEnd type="triangle"/>
+          </a:ln>
+        </p:spPr>
+        <p:style>
+          <a:lnRef idx="1">
+            <a:schemeClr val="accent1"/>
+          </a:lnRef>
+          <a:fillRef idx="0">
+            <a:schemeClr val="accent1"/>
+          </a:fillRef>
+          <a:effectRef idx="0">
+            <a:schemeClr val="accent1"/>
+          </a:effectRef>
+          <a:fontRef idx="minor">
+            <a:schemeClr val="tx1"/>
+          </a:fontRef>
+        </p:style>
+      </p:cxnSp>
+      <p:cxnSp>
+        <p:nvCxnSpPr>
+          <p:cNvPr id="11" name="Straight Connector 10"/>
+          <p:cNvCxnSpPr/>
+          <p:nvPr/>
+        </p:nvCxnSpPr>
+        <p:spPr>
+          <a:xfrm>
+            <a:off x="2853873" y="3405507"/>
+            <a:ext cx="1525180" cy="2215117"/>
+          </a:xfrm>
+          <a:prstGeom prst="line">
+            <a:avLst/>
+          </a:prstGeom>
+          <a:ln w="38100">
+            <a:solidFill>
+              <a:srgbClr val="FF0000"/>
+            </a:solidFill>
+          </a:ln>
+        </p:spPr>
+        <p:style>
+          <a:lnRef idx="1">
+            <a:schemeClr val="accent1"/>
+          </a:lnRef>
+          <a:fillRef idx="0">
+            <a:schemeClr val="accent1"/>
+          </a:fillRef>
+          <a:effectRef idx="0">
+            <a:schemeClr val="accent1"/>
+          </a:effectRef>
+          <a:fontRef idx="minor">
+            <a:schemeClr val="tx1"/>
+          </a:fontRef>
+        </p:style>
+      </p:cxnSp>
+      <p:cxnSp>
+        <p:nvCxnSpPr>
+          <p:cNvPr id="24" name="Straight Connector 23"/>
+          <p:cNvCxnSpPr/>
+          <p:nvPr/>
+        </p:nvCxnSpPr>
+        <p:spPr>
+          <a:xfrm flipH="1">
+            <a:off x="2709509" y="3385316"/>
+            <a:ext cx="1631441" cy="2235308"/>
+          </a:xfrm>
+          <a:prstGeom prst="line">
+            <a:avLst/>
+          </a:prstGeom>
+          <a:ln w="38100">
+            <a:solidFill>
+              <a:srgbClr val="FF0000"/>
+            </a:solidFill>
+          </a:ln>
+        </p:spPr>
+        <p:style>
+          <a:lnRef idx="1">
+            <a:schemeClr val="accent1"/>
+          </a:lnRef>
+          <a:fillRef idx="0">
+            <a:schemeClr val="accent1"/>
+          </a:fillRef>
+          <a:effectRef idx="0">
+            <a:schemeClr val="accent1"/>
+          </a:effectRef>
+          <a:fontRef idx="minor">
+            <a:schemeClr val="tx1"/>
+          </a:fontRef>
+        </p:style>
+      </p:cxnSp>
     </p:spTree>
     <p:extLst>
       <p:ext uri="{BB962C8B-B14F-4D97-AF65-F5344CB8AC3E}">
-        <p14:creationId xmlns:p14="http://schemas.microsoft.com/office/powerpoint/2010/main" val="2730786607"/>
+        <p14:creationId xmlns:p14="http://schemas.microsoft.com/office/powerpoint/2010/main" val="1663353811"/>
       </p:ext>
     </p:extLst>
   </p:cSld>
   <p:clrMapOvr>
     <a:masterClrMapping/>
   </p:clrMapOvr>
+  <p:timing>
+    <p:tnLst>
+      <p:par>
+        <p:cTn id="1" dur="indefinite" restart="never" nodeType="tmRoot"/>
+      </p:par>
+    </p:tnLst>
+  </p:timing>
 </p:sld>
 </file>
 
@@ -5551,7 +8193,7 @@
         <p:spPr>
           <a:xfrm>
             <a:off x="0" y="0"/>
-            <a:ext cx="12192000" cy="1024759"/>
+            <a:ext cx="12192000" cy="880434"/>
           </a:xfrm>
         </p:spPr>
         <p:txBody>
@@ -5563,7 +8205,7 @@
             <a:pPr algn="ctr"/>
             <a:r>
               <a:rPr lang="en-US" sz="4400" i="0" dirty="0" smtClean="0"/>
-              <a:t>Results</a:t>
+              <a:t>Generative Model &amp; Target Posterior</a:t>
             </a:r>
             <a:endParaRPr lang="en-US" sz="4400" i="0" dirty="0"/>
           </a:p>
@@ -5581,28 +8223,1302 @@
         </p:nvSpPr>
         <p:spPr>
           <a:xfrm>
-            <a:off x="625366" y="1024758"/>
-            <a:ext cx="10536620" cy="5123793"/>
+            <a:off x="6180082" y="1008993"/>
+            <a:ext cx="5249915" cy="2159876"/>
           </a:xfrm>
         </p:spPr>
         <p:txBody>
           <a:bodyPr/>
           <a:lstStyle/>
           <a:p>
+            <a:r>
+              <a:rPr lang="en-US" dirty="0" smtClean="0"/>
+              <a:t>After having obtained a target-specific saliency map for the current frame, we must develop a generative </a:t>
+            </a:r>
+            <a:r>
+              <a:rPr lang="en-US" dirty="0" smtClean="0"/>
+              <a:t>model</a:t>
+            </a:r>
+            <a:endParaRPr lang="en-US" dirty="0">
+              <a:solidFill>
+                <a:srgbClr val="FF0000"/>
+              </a:solidFill>
+            </a:endParaRPr>
+          </a:p>
+        </p:txBody>
+      </p:sp>
+      <p:pic>
+        <p:nvPicPr>
+          <p:cNvPr id="4" name="Picture 3"/>
+          <p:cNvPicPr>
+            <a:picLocks noChangeAspect="1"/>
+          </p:cNvPicPr>
+          <p:nvPr/>
+        </p:nvPicPr>
+        <p:blipFill>
+          <a:blip r:embed="rId2"/>
+          <a:stretch>
+            <a:fillRect/>
+          </a:stretch>
+        </p:blipFill>
+        <p:spPr>
+          <a:xfrm>
+            <a:off x="457200" y="1008991"/>
+            <a:ext cx="5514799" cy="2159877"/>
+          </a:xfrm>
+          <a:prstGeom prst="rect">
+            <a:avLst/>
+          </a:prstGeom>
+        </p:spPr>
+      </p:pic>
+      <mc:AlternateContent xmlns:mc="http://schemas.openxmlformats.org/markup-compatibility/2006">
+        <mc:Choice xmlns:a14="http://schemas.microsoft.com/office/drawing/2010/main" Requires="a14">
+          <p:sp>
+            <p:nvSpPr>
+              <p:cNvPr id="6" name="TextBox 5"/>
+              <p:cNvSpPr txBox="1"/>
+              <p:nvPr/>
+            </p:nvSpPr>
+            <p:spPr>
+              <a:xfrm>
+                <a:off x="7632356" y="2277762"/>
+                <a:ext cx="2186048" cy="778162"/>
+              </a:xfrm>
+              <a:prstGeom prst="rect">
+                <a:avLst/>
+              </a:prstGeom>
+              <a:noFill/>
+            </p:spPr>
+            <p:txBody>
+              <a:bodyPr wrap="none" lIns="0" tIns="0" rIns="0" bIns="0" rtlCol="0">
+                <a:spAutoFit/>
+              </a:bodyPr>
+              <a:lstStyle/>
+              <a:p>
+                <a14:m>
+                  <m:oMathPara xmlns:m="http://schemas.openxmlformats.org/officeDocument/2006/math">
+                    <m:oMathParaPr>
+                      <m:jc m:val="centerGroup"/>
+                    </m:oMathParaPr>
+                    <m:oMath xmlns:m="http://schemas.openxmlformats.org/officeDocument/2006/math">
+                      <m:sSub>
+                        <m:sSubPr>
+                          <m:ctrlPr>
+                            <a:rPr lang="en-US" b="0" i="1" smtClean="0">
+                              <a:latin typeface="Cambria Math" panose="02040503050406030204" pitchFamily="18" charset="0"/>
+                            </a:rPr>
+                          </m:ctrlPr>
+                        </m:sSubPr>
+                        <m:e>
+                          <m:r>
+                            <a:rPr lang="en-US" b="0" i="1" smtClean="0">
+                              <a:latin typeface="Cambria Math" panose="02040503050406030204" pitchFamily="18" charset="0"/>
+                            </a:rPr>
+                            <m:t>𝐻</m:t>
+                          </m:r>
+                        </m:e>
+                        <m:sub>
+                          <m:r>
+                            <a:rPr lang="en-US" b="0" i="1" smtClean="0">
+                              <a:latin typeface="Cambria Math" panose="02040503050406030204" pitchFamily="18" charset="0"/>
+                            </a:rPr>
+                            <m:t>𝑡</m:t>
+                          </m:r>
+                        </m:sub>
+                      </m:sSub>
+                      <m:r>
+                        <a:rPr lang="en-US" b="0" i="1" smtClean="0">
+                          <a:latin typeface="Cambria Math" panose="02040503050406030204" pitchFamily="18" charset="0"/>
+                        </a:rPr>
+                        <m:t>=</m:t>
+                      </m:r>
+                      <m:f>
+                        <m:fPr>
+                          <m:ctrlPr>
+                            <a:rPr lang="en-US" b="0" i="1" smtClean="0">
+                              <a:latin typeface="Cambria Math" panose="02040503050406030204" pitchFamily="18" charset="0"/>
+                            </a:rPr>
+                          </m:ctrlPr>
+                        </m:fPr>
+                        <m:num>
+                          <m:r>
+                            <a:rPr lang="en-US" b="0" i="1" smtClean="0">
+                              <a:latin typeface="Cambria Math" panose="02040503050406030204" pitchFamily="18" charset="0"/>
+                            </a:rPr>
+                            <m:t>1</m:t>
+                          </m:r>
+                        </m:num>
+                        <m:den>
+                          <m:r>
+                            <a:rPr lang="en-US" b="0" i="1" smtClean="0">
+                              <a:latin typeface="Cambria Math" panose="02040503050406030204" pitchFamily="18" charset="0"/>
+                            </a:rPr>
+                            <m:t>𝑚</m:t>
+                          </m:r>
+                        </m:den>
+                      </m:f>
+                      <m:nary>
+                        <m:naryPr>
+                          <m:chr m:val="∑"/>
+                          <m:ctrlPr>
+                            <a:rPr lang="en-US" b="0" i="1" smtClean="0">
+                              <a:latin typeface="Cambria Math" panose="02040503050406030204" pitchFamily="18" charset="0"/>
+                            </a:rPr>
+                          </m:ctrlPr>
+                        </m:naryPr>
+                        <m:sub>
+                          <m:r>
+                            <a:rPr lang="en-US" b="0" i="1" smtClean="0">
+                              <a:latin typeface="Cambria Math" panose="02040503050406030204" pitchFamily="18" charset="0"/>
+                            </a:rPr>
+                            <m:t>𝑘</m:t>
+                          </m:r>
+                          <m:r>
+                            <a:rPr lang="en-US" b="0" i="1" smtClean="0">
+                              <a:latin typeface="Cambria Math" panose="02040503050406030204" pitchFamily="18" charset="0"/>
+                            </a:rPr>
+                            <m:t>=</m:t>
+                          </m:r>
+                          <m:r>
+                            <a:rPr lang="en-US" b="0" i="1" smtClean="0">
+                              <a:latin typeface="Cambria Math" panose="02040503050406030204" pitchFamily="18" charset="0"/>
+                            </a:rPr>
+                            <m:t>𝑡</m:t>
+                          </m:r>
+                          <m:r>
+                            <a:rPr lang="en-US" b="0" i="1" smtClean="0">
+                              <a:latin typeface="Cambria Math" panose="02040503050406030204" pitchFamily="18" charset="0"/>
+                            </a:rPr>
+                            <m:t>−</m:t>
+                          </m:r>
+                          <m:r>
+                            <a:rPr lang="en-US" b="0" i="1" smtClean="0">
+                              <a:latin typeface="Cambria Math" panose="02040503050406030204" pitchFamily="18" charset="0"/>
+                            </a:rPr>
+                            <m:t>𝑚</m:t>
+                          </m:r>
+                        </m:sub>
+                        <m:sup>
+                          <m:r>
+                            <a:rPr lang="en-US" b="0" i="1" smtClean="0">
+                              <a:latin typeface="Cambria Math" panose="02040503050406030204" pitchFamily="18" charset="0"/>
+                            </a:rPr>
+                            <m:t>𝑡</m:t>
+                          </m:r>
+                          <m:r>
+                            <a:rPr lang="en-US" b="0" i="1" smtClean="0">
+                              <a:latin typeface="Cambria Math" panose="02040503050406030204" pitchFamily="18" charset="0"/>
+                            </a:rPr>
+                            <m:t>−1</m:t>
+                          </m:r>
+                        </m:sup>
+                        <m:e>
+                          <m:sSub>
+                            <m:sSubPr>
+                              <m:ctrlPr>
+                                <a:rPr lang="en-US" b="0" i="1" smtClean="0">
+                                  <a:latin typeface="Cambria Math" panose="02040503050406030204" pitchFamily="18" charset="0"/>
+                                </a:rPr>
+                              </m:ctrlPr>
+                            </m:sSubPr>
+                            <m:e>
+                              <m:r>
+                                <a:rPr lang="en-US" b="0" i="1" smtClean="0">
+                                  <a:latin typeface="Cambria Math" panose="02040503050406030204" pitchFamily="18" charset="0"/>
+                                </a:rPr>
+                                <m:t>𝑀</m:t>
+                              </m:r>
+                            </m:e>
+                            <m:sub>
+                              <m:r>
+                                <a:rPr lang="en-US" b="0" i="1" smtClean="0">
+                                  <a:latin typeface="Cambria Math" panose="02040503050406030204" pitchFamily="18" charset="0"/>
+                                </a:rPr>
+                                <m:t>𝑘</m:t>
+                              </m:r>
+                            </m:sub>
+                          </m:sSub>
+                          <m:r>
+                            <a:rPr lang="en-US" b="0" i="1" smtClean="0">
+                              <a:latin typeface="Cambria Math" panose="02040503050406030204" pitchFamily="18" charset="0"/>
+                            </a:rPr>
+                            <m:t>(</m:t>
+                          </m:r>
+                          <m:sSubSup>
+                            <m:sSubSupPr>
+                              <m:ctrlPr>
+                                <a:rPr lang="en-US" b="0" i="1" smtClean="0">
+                                  <a:latin typeface="Cambria Math" panose="02040503050406030204" pitchFamily="18" charset="0"/>
+                                </a:rPr>
+                              </m:ctrlPr>
+                            </m:sSubSupPr>
+                            <m:e>
+                              <m:r>
+                                <a:rPr lang="en-US" b="0" i="1" smtClean="0">
+                                  <a:latin typeface="Cambria Math" panose="02040503050406030204" pitchFamily="18" charset="0"/>
+                                </a:rPr>
+                                <m:t>𝑥</m:t>
+                              </m:r>
+                            </m:e>
+                            <m:sub>
+                              <m:r>
+                                <a:rPr lang="en-US" b="0" i="1" smtClean="0">
+                                  <a:latin typeface="Cambria Math" panose="02040503050406030204" pitchFamily="18" charset="0"/>
+                                </a:rPr>
+                                <m:t>𝑘</m:t>
+                              </m:r>
+                            </m:sub>
+                            <m:sup>
+                              <m:r>
+                                <a:rPr lang="en-US" b="0" i="1" smtClean="0">
+                                  <a:latin typeface="Cambria Math" panose="02040503050406030204" pitchFamily="18" charset="0"/>
+                                </a:rPr>
+                                <m:t>∗</m:t>
+                              </m:r>
+                            </m:sup>
+                          </m:sSubSup>
+                          <m:r>
+                            <a:rPr lang="en-US" b="0" i="1" smtClean="0">
+                              <a:latin typeface="Cambria Math" panose="02040503050406030204" pitchFamily="18" charset="0"/>
+                            </a:rPr>
+                            <m:t>)</m:t>
+                          </m:r>
+                        </m:e>
+                      </m:nary>
+                    </m:oMath>
+                  </m:oMathPara>
+                </a14:m>
+                <a:endParaRPr lang="en-US" dirty="0"/>
+              </a:p>
+            </p:txBody>
+          </p:sp>
+        </mc:Choice>
+        <mc:Fallback>
+          <p:sp>
+            <p:nvSpPr>
+              <p:cNvPr id="6" name="TextBox 5"/>
+              <p:cNvSpPr txBox="1">
+                <a:spLocks noRot="1" noChangeAspect="1" noMove="1" noResize="1" noEditPoints="1" noAdjustHandles="1" noChangeArrowheads="1" noChangeShapeType="1" noTextEdit="1"/>
+              </p:cNvSpPr>
+              <p:nvPr/>
+            </p:nvSpPr>
+            <p:spPr>
+              <a:xfrm>
+                <a:off x="7632356" y="2277762"/>
+                <a:ext cx="2186048" cy="778162"/>
+              </a:xfrm>
+              <a:prstGeom prst="rect">
+                <a:avLst/>
+              </a:prstGeom>
+              <a:blipFill rotWithShape="0">
+                <a:blip r:embed="rId3"/>
+                <a:stretch>
+                  <a:fillRect/>
+                </a:stretch>
+              </a:blipFill>
+            </p:spPr>
+            <p:txBody>
+              <a:bodyPr/>
+              <a:lstStyle/>
+              <a:p>
+                <a:r>
+                  <a:rPr lang="en-US">
+                    <a:noFill/>
+                  </a:rPr>
+                  <a:t> </a:t>
+                </a:r>
+              </a:p>
+            </p:txBody>
+          </p:sp>
+        </mc:Fallback>
+      </mc:AlternateContent>
+      <p:sp>
+        <p:nvSpPr>
+          <p:cNvPr id="7" name="TextBox 6"/>
+          <p:cNvSpPr txBox="1"/>
+          <p:nvPr/>
+        </p:nvSpPr>
+        <p:spPr>
+          <a:xfrm>
+            <a:off x="6180082" y="2645647"/>
+            <a:ext cx="1040670" cy="523220"/>
+          </a:xfrm>
+          <a:prstGeom prst="rect">
+            <a:avLst/>
+          </a:prstGeom>
+          <a:noFill/>
+        </p:spPr>
+        <p:txBody>
+          <a:bodyPr wrap="none" rtlCol="0">
+            <a:spAutoFit/>
+          </a:bodyPr>
+          <a:lstStyle/>
+          <a:p>
+            <a:pPr algn="r"/>
+            <a:r>
+              <a:rPr lang="en-US" sz="1400" dirty="0" smtClean="0"/>
+              <a:t>Generative </a:t>
+            </a:r>
+            <a:br>
+              <a:rPr lang="en-US" sz="1400" dirty="0" smtClean="0"/>
+            </a:br>
+            <a:r>
+              <a:rPr lang="en-US" sz="1400" dirty="0" smtClean="0"/>
+              <a:t>Model</a:t>
+            </a:r>
+            <a:endParaRPr lang="en-US" sz="1400" dirty="0"/>
+          </a:p>
+        </p:txBody>
+      </p:sp>
+      <p:sp>
+        <p:nvSpPr>
+          <p:cNvPr id="8" name="TextBox 7"/>
+          <p:cNvSpPr txBox="1"/>
+          <p:nvPr/>
+        </p:nvSpPr>
+        <p:spPr>
+          <a:xfrm>
+            <a:off x="10336041" y="2666843"/>
+            <a:ext cx="1747594" cy="738664"/>
+          </a:xfrm>
+          <a:prstGeom prst="rect">
+            <a:avLst/>
+          </a:prstGeom>
+          <a:noFill/>
+        </p:spPr>
+        <p:txBody>
+          <a:bodyPr wrap="none" rtlCol="0">
+            <a:spAutoFit/>
+          </a:bodyPr>
+          <a:lstStyle/>
+          <a:p>
+            <a:r>
+              <a:rPr lang="en-US" sz="1400" dirty="0" smtClean="0"/>
+              <a:t>Class-saliency maps </a:t>
+            </a:r>
+            <a:br>
+              <a:rPr lang="en-US" sz="1400" dirty="0" smtClean="0"/>
+            </a:br>
+            <a:r>
+              <a:rPr lang="en-US" sz="1400" dirty="0" smtClean="0"/>
+              <a:t>surrounding target in</a:t>
+            </a:r>
+            <a:br>
+              <a:rPr lang="en-US" sz="1400" dirty="0" smtClean="0"/>
+            </a:br>
+            <a:r>
+              <a:rPr lang="en-US" sz="1400" dirty="0" smtClean="0"/>
+              <a:t>frame k</a:t>
+            </a:r>
+            <a:endParaRPr lang="en-US" sz="1400" dirty="0"/>
+          </a:p>
+        </p:txBody>
+      </p:sp>
+      <p:cxnSp>
+        <p:nvCxnSpPr>
+          <p:cNvPr id="10" name="Straight Arrow Connector 9"/>
+          <p:cNvCxnSpPr>
+            <a:stCxn id="8" idx="1"/>
+          </p:cNvCxnSpPr>
+          <p:nvPr/>
+        </p:nvCxnSpPr>
+        <p:spPr>
+          <a:xfrm flipH="1" flipV="1">
+            <a:off x="9818404" y="2799536"/>
+            <a:ext cx="517637" cy="236639"/>
+          </a:xfrm>
+          <a:prstGeom prst="straightConnector1">
+            <a:avLst/>
+          </a:prstGeom>
+          <a:ln>
+            <a:solidFill>
+              <a:schemeClr val="tx1"/>
+            </a:solidFill>
+            <a:tailEnd type="triangle"/>
+          </a:ln>
+        </p:spPr>
+        <p:style>
+          <a:lnRef idx="1">
+            <a:schemeClr val="accent1"/>
+          </a:lnRef>
+          <a:fillRef idx="0">
+            <a:schemeClr val="accent1"/>
+          </a:fillRef>
+          <a:effectRef idx="0">
+            <a:schemeClr val="accent1"/>
+          </a:effectRef>
+          <a:fontRef idx="minor">
+            <a:schemeClr val="tx1"/>
+          </a:fontRef>
+        </p:style>
+      </p:cxnSp>
+      <p:cxnSp>
+        <p:nvCxnSpPr>
+          <p:cNvPr id="12" name="Straight Arrow Connector 11"/>
+          <p:cNvCxnSpPr>
+            <a:stCxn id="7" idx="3"/>
+            <a:endCxn id="6" idx="1"/>
+          </p:cNvCxnSpPr>
+          <p:nvPr/>
+        </p:nvCxnSpPr>
+        <p:spPr>
+          <a:xfrm flipV="1">
+            <a:off x="7220752" y="2666843"/>
+            <a:ext cx="411604" cy="240414"/>
+          </a:xfrm>
+          <a:prstGeom prst="straightConnector1">
+            <a:avLst/>
+          </a:prstGeom>
+          <a:ln>
+            <a:solidFill>
+              <a:schemeClr val="tx1"/>
+            </a:solidFill>
+            <a:tailEnd type="triangle"/>
+          </a:ln>
+        </p:spPr>
+        <p:style>
+          <a:lnRef idx="1">
+            <a:schemeClr val="accent1"/>
+          </a:lnRef>
+          <a:fillRef idx="0">
+            <a:schemeClr val="accent1"/>
+          </a:fillRef>
+          <a:effectRef idx="0">
+            <a:schemeClr val="accent1"/>
+          </a:effectRef>
+          <a:fontRef idx="minor">
+            <a:schemeClr val="tx1"/>
+          </a:fontRef>
+        </p:style>
+      </p:cxnSp>
+      <mc:AlternateContent xmlns:mc="http://schemas.openxmlformats.org/markup-compatibility/2006">
+        <mc:Choice xmlns:a14="http://schemas.microsoft.com/office/drawing/2010/main" Requires="a14">
+          <p:sp>
+            <p:nvSpPr>
+              <p:cNvPr id="13" name="TextBox 12"/>
+              <p:cNvSpPr txBox="1"/>
+              <p:nvPr/>
+            </p:nvSpPr>
+            <p:spPr>
+              <a:xfrm>
+                <a:off x="457200" y="3546389"/>
+                <a:ext cx="2226122" cy="276999"/>
+              </a:xfrm>
+              <a:prstGeom prst="rect">
+                <a:avLst/>
+              </a:prstGeom>
+              <a:noFill/>
+            </p:spPr>
+            <p:txBody>
+              <a:bodyPr wrap="none" lIns="0" tIns="0" rIns="0" bIns="0" rtlCol="0">
+                <a:spAutoFit/>
+              </a:bodyPr>
+              <a:lstStyle/>
+              <a:p>
+                <a14:m>
+                  <m:oMathPara xmlns:m="http://schemas.openxmlformats.org/officeDocument/2006/math">
+                    <m:oMathParaPr>
+                      <m:jc m:val="centerGroup"/>
+                    </m:oMathParaPr>
+                    <m:oMath xmlns:m="http://schemas.openxmlformats.org/officeDocument/2006/math">
+                      <m:r>
+                        <a:rPr lang="en-US" b="0" i="1" smtClean="0">
+                          <a:latin typeface="Cambria Math" panose="02040503050406030204" pitchFamily="18" charset="0"/>
+                        </a:rPr>
+                        <m:t>𝑝</m:t>
+                      </m:r>
+                      <m:d>
+                        <m:dPr>
+                          <m:ctrlPr>
+                            <a:rPr lang="en-US" b="0" i="1" smtClean="0">
+                              <a:latin typeface="Cambria Math" panose="02040503050406030204" pitchFamily="18" charset="0"/>
+                            </a:rPr>
+                          </m:ctrlPr>
+                        </m:dPr>
+                        <m:e>
+                          <m:sSub>
+                            <m:sSubPr>
+                              <m:ctrlPr>
+                                <a:rPr lang="en-US" b="0" i="1" smtClean="0">
+                                  <a:latin typeface="Cambria Math" panose="02040503050406030204" pitchFamily="18" charset="0"/>
+                                </a:rPr>
+                              </m:ctrlPr>
+                            </m:sSubPr>
+                            <m:e>
+                              <m:r>
+                                <a:rPr lang="en-US" b="0" i="1" smtClean="0">
+                                  <a:latin typeface="Cambria Math" panose="02040503050406030204" pitchFamily="18" charset="0"/>
+                                </a:rPr>
+                                <m:t>𝑥</m:t>
+                              </m:r>
+                            </m:e>
+                            <m:sub>
+                              <m:r>
+                                <a:rPr lang="en-US" b="0" i="1" smtClean="0">
+                                  <a:latin typeface="Cambria Math" panose="02040503050406030204" pitchFamily="18" charset="0"/>
+                                </a:rPr>
+                                <m:t>𝑡</m:t>
+                              </m:r>
+                            </m:sub>
+                          </m:sSub>
+                        </m:e>
+                        <m:e>
+                          <m:sSub>
+                            <m:sSubPr>
+                              <m:ctrlPr>
+                                <a:rPr lang="en-US" b="0" i="1" smtClean="0">
+                                  <a:latin typeface="Cambria Math" panose="02040503050406030204" pitchFamily="18" charset="0"/>
+                                </a:rPr>
+                              </m:ctrlPr>
+                            </m:sSubPr>
+                            <m:e>
+                              <m:r>
+                                <a:rPr lang="en-US" b="0" i="1" smtClean="0">
+                                  <a:latin typeface="Cambria Math" panose="02040503050406030204" pitchFamily="18" charset="0"/>
+                                </a:rPr>
+                                <m:t>𝑀</m:t>
+                              </m:r>
+                            </m:e>
+                            <m:sub>
+                              <m:r>
+                                <a:rPr lang="en-US" b="0" i="1" smtClean="0">
+                                  <a:latin typeface="Cambria Math" panose="02040503050406030204" pitchFamily="18" charset="0"/>
+                                </a:rPr>
+                                <m:t>1:</m:t>
+                              </m:r>
+                              <m:r>
+                                <a:rPr lang="en-US" b="0" i="1" smtClean="0">
+                                  <a:latin typeface="Cambria Math" panose="02040503050406030204" pitchFamily="18" charset="0"/>
+                                </a:rPr>
+                                <m:t>𝑡</m:t>
+                              </m:r>
+                            </m:sub>
+                          </m:sSub>
+                        </m:e>
+                      </m:d>
+                      <m:r>
+                        <a:rPr lang="en-US" b="0" i="1" smtClean="0">
+                          <a:latin typeface="Cambria Math" panose="02040503050406030204" pitchFamily="18" charset="0"/>
+                        </a:rPr>
+                        <m:t>∝</m:t>
+                      </m:r>
+                      <m:r>
+                        <a:rPr lang="en-US" b="0" i="1" smtClean="0">
+                          <a:latin typeface="Cambria Math" panose="02040503050406030204" pitchFamily="18" charset="0"/>
+                        </a:rPr>
+                        <m:t>𝑝</m:t>
+                      </m:r>
+                      <m:d>
+                        <m:dPr>
+                          <m:ctrlPr>
+                            <a:rPr lang="en-US" b="0" i="1" smtClean="0">
+                              <a:latin typeface="Cambria Math" panose="02040503050406030204" pitchFamily="18" charset="0"/>
+                            </a:rPr>
+                          </m:ctrlPr>
+                        </m:dPr>
+                        <m:e>
+                          <m:sSub>
+                            <m:sSubPr>
+                              <m:ctrlPr>
+                                <a:rPr lang="en-US" b="0" i="1" smtClean="0">
+                                  <a:latin typeface="Cambria Math" panose="02040503050406030204" pitchFamily="18" charset="0"/>
+                                </a:rPr>
+                              </m:ctrlPr>
+                            </m:sSubPr>
+                            <m:e>
+                              <m:r>
+                                <a:rPr lang="en-US" b="0" i="1" smtClean="0">
+                                  <a:latin typeface="Cambria Math" panose="02040503050406030204" pitchFamily="18" charset="0"/>
+                                </a:rPr>
+                                <m:t>𝑀</m:t>
+                              </m:r>
+                            </m:e>
+                            <m:sub>
+                              <m:r>
+                                <a:rPr lang="en-US" b="0" i="1" smtClean="0">
+                                  <a:latin typeface="Cambria Math" panose="02040503050406030204" pitchFamily="18" charset="0"/>
+                                </a:rPr>
+                                <m:t>𝑡</m:t>
+                              </m:r>
+                            </m:sub>
+                          </m:sSub>
+                        </m:e>
+                        <m:e>
+                          <m:sSub>
+                            <m:sSubPr>
+                              <m:ctrlPr>
+                                <a:rPr lang="en-US" b="0" i="1" smtClean="0">
+                                  <a:latin typeface="Cambria Math" panose="02040503050406030204" pitchFamily="18" charset="0"/>
+                                </a:rPr>
+                              </m:ctrlPr>
+                            </m:sSubPr>
+                            <m:e>
+                              <m:r>
+                                <a:rPr lang="en-US" b="0" i="1" smtClean="0">
+                                  <a:latin typeface="Cambria Math" panose="02040503050406030204" pitchFamily="18" charset="0"/>
+                                </a:rPr>
+                                <m:t>𝑥</m:t>
+                              </m:r>
+                            </m:e>
+                            <m:sub>
+                              <m:r>
+                                <a:rPr lang="en-US" b="0" i="1" smtClean="0">
+                                  <a:latin typeface="Cambria Math" panose="02040503050406030204" pitchFamily="18" charset="0"/>
+                                </a:rPr>
+                                <m:t>𝑡</m:t>
+                              </m:r>
+                            </m:sub>
+                          </m:sSub>
+                        </m:e>
+                      </m:d>
+                    </m:oMath>
+                  </m:oMathPara>
+                </a14:m>
+                <a:endParaRPr lang="en-US" dirty="0"/>
+              </a:p>
+            </p:txBody>
+          </p:sp>
+        </mc:Choice>
+        <mc:Fallback>
+          <p:sp>
+            <p:nvSpPr>
+              <p:cNvPr id="13" name="TextBox 12"/>
+              <p:cNvSpPr txBox="1">
+                <a:spLocks noRot="1" noChangeAspect="1" noMove="1" noResize="1" noEditPoints="1" noAdjustHandles="1" noChangeArrowheads="1" noChangeShapeType="1" noTextEdit="1"/>
+              </p:cNvSpPr>
+              <p:nvPr/>
+            </p:nvSpPr>
+            <p:spPr>
+              <a:xfrm>
+                <a:off x="457200" y="3546389"/>
+                <a:ext cx="2226122" cy="276999"/>
+              </a:xfrm>
+              <a:prstGeom prst="rect">
+                <a:avLst/>
+              </a:prstGeom>
+              <a:blipFill rotWithShape="0">
+                <a:blip r:embed="rId4"/>
+                <a:stretch>
+                  <a:fillRect l="-2192" b="-26667"/>
+                </a:stretch>
+              </a:blipFill>
+            </p:spPr>
+            <p:txBody>
+              <a:bodyPr/>
+              <a:lstStyle/>
+              <a:p>
+                <a:r>
+                  <a:rPr lang="en-US">
+                    <a:noFill/>
+                  </a:rPr>
+                  <a:t> </a:t>
+                </a:r>
+              </a:p>
+            </p:txBody>
+          </p:sp>
+        </mc:Fallback>
+      </mc:AlternateContent>
+      <p:sp>
+        <p:nvSpPr>
+          <p:cNvPr id="16" name="Right Brace 15"/>
+          <p:cNvSpPr/>
+          <p:nvPr/>
+        </p:nvSpPr>
+        <p:spPr>
+          <a:xfrm rot="5400000">
+            <a:off x="810638" y="3469950"/>
+            <a:ext cx="354328" cy="1061207"/>
+          </a:xfrm>
+          <a:prstGeom prst="rightBrace">
+            <a:avLst>
+              <a:gd name="adj1" fmla="val 8333"/>
+              <a:gd name="adj2" fmla="val 53953"/>
+            </a:avLst>
+          </a:prstGeom>
+          <a:ln w="12700">
+            <a:solidFill>
+              <a:schemeClr val="tx1"/>
+            </a:solidFill>
+          </a:ln>
+        </p:spPr>
+        <p:style>
+          <a:lnRef idx="1">
+            <a:schemeClr val="accent1"/>
+          </a:lnRef>
+          <a:fillRef idx="0">
+            <a:schemeClr val="accent1"/>
+          </a:fillRef>
+          <a:effectRef idx="0">
+            <a:schemeClr val="accent1"/>
+          </a:effectRef>
+          <a:fontRef idx="minor">
+            <a:schemeClr val="tx1"/>
+          </a:fontRef>
+        </p:style>
+        <p:txBody>
+          <a:bodyPr rtlCol="0" anchor="ctr"/>
+          <a:lstStyle/>
+          <a:p>
+            <a:pPr algn="ctr"/>
+            <a:endParaRPr lang="en-US"/>
+          </a:p>
+        </p:txBody>
+      </p:sp>
+      <p:sp>
+        <p:nvSpPr>
+          <p:cNvPr id="17" name="Right Brace 16"/>
+          <p:cNvSpPr/>
+          <p:nvPr/>
+        </p:nvSpPr>
+        <p:spPr>
+          <a:xfrm rot="5400000">
+            <a:off x="2045918" y="3595908"/>
+            <a:ext cx="354328" cy="855676"/>
+          </a:xfrm>
+          <a:prstGeom prst="rightBrace">
+            <a:avLst>
+              <a:gd name="adj1" fmla="val 8333"/>
+              <a:gd name="adj2" fmla="val 53953"/>
+            </a:avLst>
+          </a:prstGeom>
+          <a:ln w="12700">
+            <a:solidFill>
+              <a:schemeClr val="tx1"/>
+            </a:solidFill>
+          </a:ln>
+        </p:spPr>
+        <p:style>
+          <a:lnRef idx="1">
+            <a:schemeClr val="accent1"/>
+          </a:lnRef>
+          <a:fillRef idx="0">
+            <a:schemeClr val="accent1"/>
+          </a:fillRef>
+          <a:effectRef idx="0">
+            <a:schemeClr val="accent1"/>
+          </a:effectRef>
+          <a:fontRef idx="minor">
+            <a:schemeClr val="tx1"/>
+          </a:fontRef>
+        </p:style>
+        <p:txBody>
+          <a:bodyPr rtlCol="0" anchor="ctr"/>
+          <a:lstStyle/>
+          <a:p>
+            <a:pPr algn="ctr"/>
+            <a:endParaRPr lang="en-US"/>
+          </a:p>
+        </p:txBody>
+      </p:sp>
+      <p:sp>
+        <p:nvSpPr>
+          <p:cNvPr id="19" name="TextBox 18"/>
+          <p:cNvSpPr txBox="1"/>
+          <p:nvPr/>
+        </p:nvSpPr>
+        <p:spPr>
+          <a:xfrm>
+            <a:off x="424124" y="4123543"/>
+            <a:ext cx="1048685" cy="369332"/>
+          </a:xfrm>
+          <a:prstGeom prst="rect">
+            <a:avLst/>
+          </a:prstGeom>
+          <a:noFill/>
+        </p:spPr>
+        <p:txBody>
+          <a:bodyPr wrap="none" rtlCol="0">
+            <a:spAutoFit/>
+          </a:bodyPr>
+          <a:lstStyle/>
+          <a:p>
+            <a:r>
+              <a:rPr lang="en-US" dirty="0" smtClean="0"/>
+              <a:t>posterior</a:t>
+            </a:r>
             <a:endParaRPr lang="en-US" dirty="0"/>
           </a:p>
         </p:txBody>
       </p:sp>
+      <p:sp>
+        <p:nvSpPr>
+          <p:cNvPr id="20" name="TextBox 19"/>
+          <p:cNvSpPr txBox="1"/>
+          <p:nvPr/>
+        </p:nvSpPr>
+        <p:spPr>
+          <a:xfrm>
+            <a:off x="1635309" y="4123543"/>
+            <a:ext cx="1113125" cy="369332"/>
+          </a:xfrm>
+          <a:prstGeom prst="rect">
+            <a:avLst/>
+          </a:prstGeom>
+          <a:noFill/>
+        </p:spPr>
+        <p:txBody>
+          <a:bodyPr wrap="none" rtlCol="0">
+            <a:spAutoFit/>
+          </a:bodyPr>
+          <a:lstStyle/>
+          <a:p>
+            <a:r>
+              <a:rPr lang="en-US" dirty="0" smtClean="0"/>
+              <a:t>likelihood</a:t>
+            </a:r>
+            <a:endParaRPr lang="en-US" dirty="0"/>
+          </a:p>
+        </p:txBody>
+      </p:sp>
+      <mc:AlternateContent xmlns:mc="http://schemas.openxmlformats.org/markup-compatibility/2006">
+        <mc:Choice xmlns:a14="http://schemas.microsoft.com/office/drawing/2010/main" Requires="a14">
+          <p:sp>
+            <p:nvSpPr>
+              <p:cNvPr id="22" name="TextBox 21"/>
+              <p:cNvSpPr txBox="1"/>
+              <p:nvPr/>
+            </p:nvSpPr>
+            <p:spPr>
+              <a:xfrm>
+                <a:off x="1188507" y="5017085"/>
+                <a:ext cx="1213474" cy="276999"/>
+              </a:xfrm>
+              <a:prstGeom prst="rect">
+                <a:avLst/>
+              </a:prstGeom>
+              <a:noFill/>
+            </p:spPr>
+            <p:txBody>
+              <a:bodyPr wrap="none" lIns="0" tIns="0" rIns="0" bIns="0" rtlCol="0">
+                <a:spAutoFit/>
+              </a:bodyPr>
+              <a:lstStyle/>
+              <a:p>
+                <a14:m>
+                  <m:oMathPara xmlns:m="http://schemas.openxmlformats.org/officeDocument/2006/math">
+                    <m:oMathParaPr>
+                      <m:jc m:val="centerGroup"/>
+                    </m:oMathParaPr>
+                    <m:oMath xmlns:m="http://schemas.openxmlformats.org/officeDocument/2006/math">
+                      <m:sSub>
+                        <m:sSubPr>
+                          <m:ctrlPr>
+                            <a:rPr lang="en-US" b="0" i="1" smtClean="0">
+                              <a:latin typeface="Cambria Math" panose="02040503050406030204" pitchFamily="18" charset="0"/>
+                            </a:rPr>
+                          </m:ctrlPr>
+                        </m:sSubPr>
+                        <m:e>
+                          <m:r>
+                            <a:rPr lang="en-US" b="0" i="1" smtClean="0">
+                              <a:latin typeface="Cambria Math" panose="02040503050406030204" pitchFamily="18" charset="0"/>
+                            </a:rPr>
+                            <m:t>𝐻</m:t>
+                          </m:r>
+                        </m:e>
+                        <m:sub>
+                          <m:r>
+                            <a:rPr lang="en-US" b="0" i="1" smtClean="0">
+                              <a:latin typeface="Cambria Math" panose="02040503050406030204" pitchFamily="18" charset="0"/>
+                            </a:rPr>
+                            <m:t>𝑡</m:t>
+                          </m:r>
+                        </m:sub>
+                      </m:sSub>
+                      <m:r>
+                        <a:rPr lang="en-US" b="0" i="1" smtClean="0">
+                          <a:latin typeface="Cambria Math" panose="02040503050406030204" pitchFamily="18" charset="0"/>
+                        </a:rPr>
+                        <m:t> </m:t>
+                      </m:r>
+                      <m:r>
+                        <a:rPr lang="en-US" b="0" i="1" smtClean="0">
+                          <a:latin typeface="Cambria Math" panose="02040503050406030204" pitchFamily="18" charset="0"/>
+                          <a:ea typeface="Cambria Math" panose="02040503050406030204" pitchFamily="18" charset="0"/>
+                        </a:rPr>
+                        <m:t>⨂</m:t>
+                      </m:r>
+                      <m:sSub>
+                        <m:sSubPr>
+                          <m:ctrlPr>
+                            <a:rPr lang="en-US" b="0" i="1" smtClean="0">
+                              <a:latin typeface="Cambria Math" panose="02040503050406030204" pitchFamily="18" charset="0"/>
+                              <a:ea typeface="Cambria Math" panose="02040503050406030204" pitchFamily="18" charset="0"/>
+                            </a:rPr>
+                          </m:ctrlPr>
+                        </m:sSubPr>
+                        <m:e>
+                          <m:r>
+                            <a:rPr lang="en-US" b="0" i="1" smtClean="0">
+                              <a:latin typeface="Cambria Math" panose="02040503050406030204" pitchFamily="18" charset="0"/>
+                              <a:ea typeface="Cambria Math" panose="02040503050406030204" pitchFamily="18" charset="0"/>
+                            </a:rPr>
+                            <m:t>𝑀</m:t>
+                          </m:r>
+                        </m:e>
+                        <m:sub>
+                          <m:r>
+                            <a:rPr lang="en-US" b="0" i="1" smtClean="0">
+                              <a:latin typeface="Cambria Math" panose="02040503050406030204" pitchFamily="18" charset="0"/>
+                              <a:ea typeface="Cambria Math" panose="02040503050406030204" pitchFamily="18" charset="0"/>
+                            </a:rPr>
+                            <m:t>𝑡</m:t>
+                          </m:r>
+                        </m:sub>
+                      </m:sSub>
+                      <m:d>
+                        <m:dPr>
+                          <m:ctrlPr>
+                            <a:rPr lang="en-US" b="0" i="1" smtClean="0">
+                              <a:latin typeface="Cambria Math" panose="02040503050406030204" pitchFamily="18" charset="0"/>
+                              <a:ea typeface="Cambria Math" panose="02040503050406030204" pitchFamily="18" charset="0"/>
+                            </a:rPr>
+                          </m:ctrlPr>
+                        </m:dPr>
+                        <m:e>
+                          <m:sSub>
+                            <m:sSubPr>
+                              <m:ctrlPr>
+                                <a:rPr lang="en-US" b="0" i="1" smtClean="0">
+                                  <a:latin typeface="Cambria Math" panose="02040503050406030204" pitchFamily="18" charset="0"/>
+                                  <a:ea typeface="Cambria Math" panose="02040503050406030204" pitchFamily="18" charset="0"/>
+                                </a:rPr>
+                              </m:ctrlPr>
+                            </m:sSubPr>
+                            <m:e>
+                              <m:r>
+                                <a:rPr lang="en-US" b="0" i="1" smtClean="0">
+                                  <a:latin typeface="Cambria Math" panose="02040503050406030204" pitchFamily="18" charset="0"/>
+                                  <a:ea typeface="Cambria Math" panose="02040503050406030204" pitchFamily="18" charset="0"/>
+                                </a:rPr>
+                                <m:t>𝑥</m:t>
+                              </m:r>
+                            </m:e>
+                            <m:sub>
+                              <m:r>
+                                <a:rPr lang="en-US" b="0" i="1" smtClean="0">
+                                  <a:latin typeface="Cambria Math" panose="02040503050406030204" pitchFamily="18" charset="0"/>
+                                  <a:ea typeface="Cambria Math" panose="02040503050406030204" pitchFamily="18" charset="0"/>
+                                </a:rPr>
+                                <m:t>𝑡</m:t>
+                              </m:r>
+                            </m:sub>
+                          </m:sSub>
+                        </m:e>
+                      </m:d>
+                    </m:oMath>
+                  </m:oMathPara>
+                </a14:m>
+                <a:endParaRPr lang="en-US" dirty="0"/>
+              </a:p>
+            </p:txBody>
+          </p:sp>
+        </mc:Choice>
+        <mc:Fallback>
+          <p:sp>
+            <p:nvSpPr>
+              <p:cNvPr id="22" name="TextBox 21"/>
+              <p:cNvSpPr txBox="1">
+                <a:spLocks noRot="1" noChangeAspect="1" noMove="1" noResize="1" noEditPoints="1" noAdjustHandles="1" noChangeArrowheads="1" noChangeShapeType="1" noTextEdit="1"/>
+              </p:cNvSpPr>
+              <p:nvPr/>
+            </p:nvSpPr>
+            <p:spPr>
+              <a:xfrm>
+                <a:off x="1188507" y="5017085"/>
+                <a:ext cx="1213474" cy="276999"/>
+              </a:xfrm>
+              <a:prstGeom prst="rect">
+                <a:avLst/>
+              </a:prstGeom>
+              <a:blipFill rotWithShape="0">
+                <a:blip r:embed="rId5"/>
+                <a:stretch>
+                  <a:fillRect l="-4523" b="-20000"/>
+                </a:stretch>
+              </a:blipFill>
+            </p:spPr>
+            <p:txBody>
+              <a:bodyPr/>
+              <a:lstStyle/>
+              <a:p>
+                <a:r>
+                  <a:rPr lang="en-US">
+                    <a:noFill/>
+                  </a:rPr>
+                  <a:t> </a:t>
+                </a:r>
+              </a:p>
+            </p:txBody>
+          </p:sp>
+        </mc:Fallback>
+      </mc:AlternateContent>
+      <p:cxnSp>
+        <p:nvCxnSpPr>
+          <p:cNvPr id="25" name="Straight Arrow Connector 24"/>
+          <p:cNvCxnSpPr>
+            <a:stCxn id="20" idx="2"/>
+            <a:endCxn id="22" idx="0"/>
+          </p:cNvCxnSpPr>
+          <p:nvPr/>
+        </p:nvCxnSpPr>
+        <p:spPr>
+          <a:xfrm flipH="1">
+            <a:off x="1795244" y="4492875"/>
+            <a:ext cx="396628" cy="524210"/>
+          </a:xfrm>
+          <a:prstGeom prst="straightConnector1">
+            <a:avLst/>
+          </a:prstGeom>
+          <a:ln>
+            <a:solidFill>
+              <a:schemeClr val="tx1"/>
+            </a:solidFill>
+            <a:tailEnd type="triangle"/>
+          </a:ln>
+        </p:spPr>
+        <p:style>
+          <a:lnRef idx="1">
+            <a:schemeClr val="accent1"/>
+          </a:lnRef>
+          <a:fillRef idx="0">
+            <a:schemeClr val="accent1"/>
+          </a:fillRef>
+          <a:effectRef idx="0">
+            <a:schemeClr val="accent1"/>
+          </a:effectRef>
+          <a:fontRef idx="minor">
+            <a:schemeClr val="tx1"/>
+          </a:fontRef>
+        </p:style>
+      </p:cxnSp>
     </p:spTree>
     <p:extLst>
       <p:ext uri="{BB962C8B-B14F-4D97-AF65-F5344CB8AC3E}">
-        <p14:creationId xmlns:p14="http://schemas.microsoft.com/office/powerpoint/2010/main" val="1171463062"/>
+        <p14:creationId xmlns:p14="http://schemas.microsoft.com/office/powerpoint/2010/main" val="3164872781"/>
       </p:ext>
     </p:extLst>
   </p:cSld>
   <p:clrMapOvr>
     <a:masterClrMapping/>
   </p:clrMapOvr>
+  <p:timing>
+    <p:tnLst>
+      <p:par>
+        <p:cTn id="1" dur="indefinite" restart="never" nodeType="tmRoot"/>
+      </p:par>
+    </p:tnLst>
+  </p:timing>
+</p:sld>
+</file>
+
+<file path=ppt/slides/slide9.xml><?xml version="1.0" encoding="utf-8"?>
+<p:sld xmlns:a="http://schemas.openxmlformats.org/drawingml/2006/main" xmlns:r="http://schemas.openxmlformats.org/officeDocument/2006/relationships" xmlns:p="http://schemas.openxmlformats.org/presentationml/2006/main">
+  <p:cSld>
+    <p:spTree>
+      <p:nvGrpSpPr>
+        <p:cNvPr id="1" name=""/>
+        <p:cNvGrpSpPr/>
+        <p:nvPr/>
+      </p:nvGrpSpPr>
+      <p:grpSpPr>
+        <a:xfrm>
+          <a:off x="0" y="0"/>
+          <a:ext cx="0" cy="0"/>
+          <a:chOff x="0" y="0"/>
+          <a:chExt cx="0" cy="0"/>
+        </a:xfrm>
+      </p:grpSpPr>
+      <p:sp>
+        <p:nvSpPr>
+          <p:cNvPr id="2" name="Title 1"/>
+          <p:cNvSpPr>
+            <a:spLocks noGrp="1"/>
+          </p:cNvSpPr>
+          <p:nvPr>
+            <p:ph type="title"/>
+          </p:nvPr>
+        </p:nvSpPr>
+        <p:spPr>
+          <a:xfrm>
+            <a:off x="0" y="0"/>
+            <a:ext cx="12192000" cy="880434"/>
+          </a:xfrm>
+        </p:spPr>
+        <p:txBody>
+          <a:bodyPr>
+            <a:normAutofit/>
+          </a:bodyPr>
+          <a:lstStyle/>
+          <a:p>
+            <a:pPr algn="ctr"/>
+            <a:r>
+              <a:rPr lang="en-US" sz="4400" i="0" dirty="0" smtClean="0"/>
+              <a:t>SVM Update</a:t>
+            </a:r>
+            <a:endParaRPr lang="en-US" sz="4400" i="0" dirty="0"/>
+          </a:p>
+        </p:txBody>
+      </p:sp>
+      <p:sp>
+        <p:nvSpPr>
+          <p:cNvPr id="3" name="Content Placeholder 2"/>
+          <p:cNvSpPr>
+            <a:spLocks noGrp="1"/>
+          </p:cNvSpPr>
+          <p:nvPr>
+            <p:ph idx="1"/>
+          </p:nvPr>
+        </p:nvSpPr>
+        <p:spPr>
+          <a:xfrm>
+            <a:off x="6180082" y="1008993"/>
+            <a:ext cx="5249915" cy="2159876"/>
+          </a:xfrm>
+        </p:spPr>
+        <p:txBody>
+          <a:bodyPr>
+            <a:normAutofit lnSpcReduction="10000"/>
+          </a:bodyPr>
+          <a:lstStyle/>
+          <a:p>
+            <a:r>
+              <a:rPr lang="en-US" dirty="0" smtClean="0"/>
+              <a:t>We now have a new “ground-truth” for the subsequent frame in our video</a:t>
+            </a:r>
+          </a:p>
+          <a:p>
+            <a:r>
+              <a:rPr lang="en-US" dirty="0" smtClean="0">
+                <a:solidFill>
+                  <a:schemeClr val="tx1">
+                    <a:lumMod val="95000"/>
+                    <a:lumOff val="5000"/>
+                  </a:schemeClr>
+                </a:solidFill>
+              </a:rPr>
+              <a:t>Under this assumption, we take the sample which gave the maximum posterior value and declare that it is a positive example of our class</a:t>
+            </a:r>
+            <a:endParaRPr lang="en-US" dirty="0">
+              <a:solidFill>
+                <a:schemeClr val="tx1">
+                  <a:lumMod val="95000"/>
+                  <a:lumOff val="5000"/>
+                </a:schemeClr>
+              </a:solidFill>
+            </a:endParaRPr>
+          </a:p>
+        </p:txBody>
+      </p:sp>
+      <p:pic>
+        <p:nvPicPr>
+          <p:cNvPr id="4" name="Picture 3"/>
+          <p:cNvPicPr>
+            <a:picLocks noChangeAspect="1"/>
+          </p:cNvPicPr>
+          <p:nvPr/>
+        </p:nvPicPr>
+        <p:blipFill>
+          <a:blip r:embed="rId2"/>
+          <a:stretch>
+            <a:fillRect/>
+          </a:stretch>
+        </p:blipFill>
+        <p:spPr>
+          <a:xfrm>
+            <a:off x="457200" y="1008991"/>
+            <a:ext cx="5514799" cy="2159877"/>
+          </a:xfrm>
+          <a:prstGeom prst="rect">
+            <a:avLst/>
+          </a:prstGeom>
+        </p:spPr>
+      </p:pic>
+      <p:sp>
+        <p:nvSpPr>
+          <p:cNvPr id="5" name="TextBox 4"/>
+          <p:cNvSpPr txBox="1"/>
+          <p:nvPr/>
+        </p:nvSpPr>
+        <p:spPr>
+          <a:xfrm>
+            <a:off x="485600" y="3439314"/>
+            <a:ext cx="10972797" cy="2308324"/>
+          </a:xfrm>
+          <a:prstGeom prst="rect">
+            <a:avLst/>
+          </a:prstGeom>
+          <a:noFill/>
+        </p:spPr>
+        <p:txBody>
+          <a:bodyPr wrap="square" rtlCol="0">
+            <a:spAutoFit/>
+          </a:bodyPr>
+          <a:lstStyle/>
+          <a:p>
+            <a:pPr marL="285750" indent="-285750">
+              <a:buFont typeface="Arial" panose="020B0604020202020204" pitchFamily="34" charset="0"/>
+              <a:buChar char="•"/>
+            </a:pPr>
+            <a:r>
+              <a:rPr lang="en-US" dirty="0" smtClean="0"/>
+              <a:t>Following the SVM initialization steps, we also take 24 negative samples (those with less than a 30% overlap with the positive example) from this frame</a:t>
+            </a:r>
+          </a:p>
+          <a:p>
+            <a:pPr marL="285750" indent="-285750">
+              <a:buFont typeface="Arial" panose="020B0604020202020204" pitchFamily="34" charset="0"/>
+              <a:buChar char="•"/>
+            </a:pPr>
+            <a:endParaRPr lang="en-US" dirty="0" smtClean="0"/>
+          </a:p>
+          <a:p>
+            <a:pPr marL="285750" indent="-285750">
+              <a:buFont typeface="Arial" panose="020B0604020202020204" pitchFamily="34" charset="0"/>
+              <a:buChar char="•"/>
+            </a:pPr>
+            <a:r>
+              <a:rPr lang="en-US" dirty="0" smtClean="0"/>
+              <a:t>To help reduce the time requirement per frame we cap the size of our SVM training set to 300, plus twice the number of initial frames used. If 10 initial frames, the SVM training set size is capped at 320, where we always keep the positive examples of the first 20 frames.</a:t>
+            </a:r>
+          </a:p>
+          <a:p>
+            <a:pPr marL="285750" indent="-285750">
+              <a:buFont typeface="Arial" panose="020B0604020202020204" pitchFamily="34" charset="0"/>
+              <a:buChar char="•"/>
+            </a:pPr>
+            <a:endParaRPr lang="en-US" dirty="0" smtClean="0"/>
+          </a:p>
+          <a:p>
+            <a:pPr marL="285750" indent="-285750">
+              <a:buFont typeface="Arial" panose="020B0604020202020204" pitchFamily="34" charset="0"/>
+              <a:buChar char="•"/>
+            </a:pPr>
+            <a:r>
+              <a:rPr lang="en-US" dirty="0" smtClean="0"/>
+              <a:t>In an attempt to further reduce computational complexity, we only retrain the SVM every third frame </a:t>
+            </a:r>
+            <a:endParaRPr lang="en-US" dirty="0"/>
+          </a:p>
+        </p:txBody>
+      </p:sp>
+    </p:spTree>
+    <p:extLst>
+      <p:ext uri="{BB962C8B-B14F-4D97-AF65-F5344CB8AC3E}">
+        <p14:creationId xmlns:p14="http://schemas.microsoft.com/office/powerpoint/2010/main" val="2730786607"/>
+      </p:ext>
+    </p:extLst>
+  </p:cSld>
+  <p:clrMapOvr>
+    <a:masterClrMapping/>
+  </p:clrMapOvr>
+  <p:timing>
+    <p:tnLst>
+      <p:par>
+        <p:cTn id="1" dur="indefinite" restart="never" nodeType="tmRoot"/>
+      </p:par>
+    </p:tnLst>
+  </p:timing>
 </p:sld>
 </file>
 

</xml_diff>

<commit_message>
Added Saliency Map to presentation
</commit_message>
<xml_diff>
--- a/project_report_final/Presentation.pptx
+++ b/project_report_final/Presentation.pptx
@@ -4432,30 +4432,156 @@
           </a:p>
         </p:txBody>
       </p:sp>
-      <p:sp>
-        <p:nvSpPr>
-          <p:cNvPr id="3" name="Content Placeholder 2"/>
-          <p:cNvSpPr>
-            <a:spLocks noGrp="1"/>
-          </p:cNvSpPr>
-          <p:nvPr>
-            <p:ph idx="1"/>
-          </p:nvPr>
-        </p:nvSpPr>
+      <p:pic>
+        <p:nvPicPr>
+          <p:cNvPr id="4" name="Picture 3"/>
+          <p:cNvPicPr>
+            <a:picLocks noChangeAspect="1"/>
+          </p:cNvPicPr>
+          <p:nvPr/>
+        </p:nvPicPr>
+        <p:blipFill>
+          <a:blip r:embed="rId2">
+            <a:extLst>
+              <a:ext uri="{28A0092B-C50C-407E-A947-70E740481C1C}">
+                <a14:useLocalDpi xmlns:a14="http://schemas.microsoft.com/office/drawing/2010/main" val="0"/>
+              </a:ext>
+            </a:extLst>
+          </a:blip>
+          <a:stretch>
+            <a:fillRect/>
+          </a:stretch>
+        </p:blipFill>
         <p:spPr>
           <a:xfrm>
-            <a:off x="625366" y="1024758"/>
-            <a:ext cx="10536620" cy="5123793"/>
-          </a:xfrm>
-        </p:spPr>
-        <p:txBody>
-          <a:bodyPr/>
-          <a:lstStyle/>
-          <a:p>
-            <a:endParaRPr lang="en-US" dirty="0"/>
-          </a:p>
-        </p:txBody>
-      </p:sp>
+            <a:off x="4122694" y="1373584"/>
+            <a:ext cx="1597663" cy="1600199"/>
+          </a:xfrm>
+          <a:prstGeom prst="rect">
+            <a:avLst/>
+          </a:prstGeom>
+        </p:spPr>
+      </p:pic>
+      <p:pic>
+        <p:nvPicPr>
+          <p:cNvPr id="5" name="Picture 4"/>
+          <p:cNvPicPr>
+            <a:picLocks noChangeAspect="1"/>
+          </p:cNvPicPr>
+          <p:nvPr/>
+        </p:nvPicPr>
+        <p:blipFill>
+          <a:blip r:embed="rId3">
+            <a:extLst>
+              <a:ext uri="{28A0092B-C50C-407E-A947-70E740481C1C}">
+                <a14:useLocalDpi xmlns:a14="http://schemas.microsoft.com/office/drawing/2010/main" val="0"/>
+              </a:ext>
+            </a:extLst>
+          </a:blip>
+          <a:stretch>
+            <a:fillRect/>
+          </a:stretch>
+        </p:blipFill>
+        <p:spPr>
+          <a:xfrm>
+            <a:off x="6033873" y="1373584"/>
+            <a:ext cx="1600199" cy="1600199"/>
+          </a:xfrm>
+          <a:prstGeom prst="rect">
+            <a:avLst/>
+          </a:prstGeom>
+        </p:spPr>
+      </p:pic>
+      <p:pic>
+        <p:nvPicPr>
+          <p:cNvPr id="6" name="Picture 5"/>
+          <p:cNvPicPr>
+            <a:picLocks noChangeAspect="1"/>
+          </p:cNvPicPr>
+          <p:nvPr/>
+        </p:nvPicPr>
+        <p:blipFill>
+          <a:blip r:embed="rId4">
+            <a:extLst>
+              <a:ext uri="{28A0092B-C50C-407E-A947-70E740481C1C}">
+                <a14:useLocalDpi xmlns:a14="http://schemas.microsoft.com/office/drawing/2010/main" val="0"/>
+              </a:ext>
+            </a:extLst>
+          </a:blip>
+          <a:stretch>
+            <a:fillRect/>
+          </a:stretch>
+        </p:blipFill>
+        <p:spPr>
+          <a:xfrm>
+            <a:off x="4743091" y="3326163"/>
+            <a:ext cx="3390315" cy="1903710"/>
+          </a:xfrm>
+          <a:prstGeom prst="rect">
+            <a:avLst/>
+          </a:prstGeom>
+        </p:spPr>
+      </p:pic>
+      <p:pic>
+        <p:nvPicPr>
+          <p:cNvPr id="7" name="Picture 6"/>
+          <p:cNvPicPr>
+            <a:picLocks noChangeAspect="1"/>
+          </p:cNvPicPr>
+          <p:nvPr/>
+        </p:nvPicPr>
+        <p:blipFill>
+          <a:blip r:embed="rId5">
+            <a:extLst>
+              <a:ext uri="{28A0092B-C50C-407E-A947-70E740481C1C}">
+                <a14:useLocalDpi xmlns:a14="http://schemas.microsoft.com/office/drawing/2010/main" val="0"/>
+              </a:ext>
+            </a:extLst>
+          </a:blip>
+          <a:stretch>
+            <a:fillRect/>
+          </a:stretch>
+        </p:blipFill>
+        <p:spPr>
+          <a:xfrm>
+            <a:off x="8819206" y="3023287"/>
+            <a:ext cx="2965112" cy="2313062"/>
+          </a:xfrm>
+          <a:prstGeom prst="rect">
+            <a:avLst/>
+          </a:prstGeom>
+        </p:spPr>
+      </p:pic>
+      <p:pic>
+        <p:nvPicPr>
+          <p:cNvPr id="8" name="Picture 7"/>
+          <p:cNvPicPr>
+            <a:picLocks noChangeAspect="1"/>
+          </p:cNvPicPr>
+          <p:nvPr/>
+        </p:nvPicPr>
+        <p:blipFill>
+          <a:blip r:embed="rId6">
+            <a:extLst>
+              <a:ext uri="{28A0092B-C50C-407E-A947-70E740481C1C}">
+                <a14:useLocalDpi xmlns:a14="http://schemas.microsoft.com/office/drawing/2010/main" val="0"/>
+              </a:ext>
+            </a:extLst>
+          </a:blip>
+          <a:stretch>
+            <a:fillRect/>
+          </a:stretch>
+        </p:blipFill>
+        <p:spPr>
+          <a:xfrm>
+            <a:off x="1010018" y="3324385"/>
+            <a:ext cx="3411706" cy="1930448"/>
+          </a:xfrm>
+          <a:prstGeom prst="rect">
+            <a:avLst/>
+          </a:prstGeom>
+        </p:spPr>
+      </p:pic>
     </p:spTree>
     <p:extLst>
       <p:ext uri="{BB962C8B-B14F-4D97-AF65-F5344CB8AC3E}">
@@ -5044,11 +5170,7 @@
             </a:pPr>
             <a:r>
               <a:rPr lang="en-US" dirty="0" smtClean="0"/>
-              <a:t>We then filter through these positive samples and keep only those dimensions corresponding to positive weights – as these have clearer contributions in the samples classification. All other features are set </a:t>
-            </a:r>
-            <a:r>
-              <a:rPr lang="en-US" dirty="0" smtClean="0"/>
-              <a:t>to </a:t>
+              <a:t>We then filter through these positive samples and keep only those dimensions corresponding to positive weights – as these have clearer contributions in the samples classification. All other features are set to </a:t>
             </a:r>
             <a:r>
               <a:rPr lang="en-US" dirty="0" smtClean="0">
@@ -5157,15 +5279,7 @@
           <a:p>
             <a:r>
               <a:rPr lang="en-US" dirty="0" smtClean="0"/>
-              <a:t>After identifying target-specific features, we </a:t>
-            </a:r>
-            <a:r>
-              <a:rPr lang="en-US" dirty="0" smtClean="0"/>
-              <a:t>back-propagate </a:t>
-            </a:r>
-            <a:r>
-              <a:rPr lang="en-US" dirty="0" smtClean="0"/>
-              <a:t>those features which correspond most closely with our target </a:t>
+              <a:t>After identifying target-specific features, we back-propagate those features which correspond most closely with our target </a:t>
             </a:r>
             <a:endParaRPr lang="en-US" dirty="0"/>
           </a:p>
@@ -5250,7 +5364,6 @@
               <a:rPr lang="en-US" dirty="0" smtClean="0"/>
               <a:t>Class-saliency maps for each positive sample are aggregated (max magnitude) to create target-specific saliency map</a:t>
             </a:r>
-            <a:endParaRPr lang="en-US" dirty="0" smtClean="0"/>
           </a:p>
           <a:p>
             <a:endParaRPr lang="en-US" dirty="0"/>
@@ -5391,11 +5504,7 @@
           <a:p>
             <a:r>
               <a:rPr lang="en-US" dirty="0" smtClean="0"/>
-              <a:t>After having obtained a target-specific saliency map for the current frame, we must develop a generative </a:t>
-            </a:r>
-            <a:r>
-              <a:rPr lang="en-US" dirty="0" smtClean="0"/>
-              <a:t>model</a:t>
+              <a:t>After having obtained a target-specific saliency map for the current frame, we must develop a generative model</a:t>
             </a:r>
             <a:endParaRPr lang="en-US" dirty="0">
               <a:solidFill>
@@ -5429,8 +5538,8 @@
           </a:prstGeom>
         </p:spPr>
       </p:pic>
-      <mc:AlternateContent xmlns:mc="http://schemas.openxmlformats.org/markup-compatibility/2006">
-        <mc:Choice xmlns:a14="http://schemas.microsoft.com/office/drawing/2010/main" Requires="a14">
+      <mc:AlternateContent xmlns:mc="http://schemas.openxmlformats.org/markup-compatibility/2006" xmlns:a14="http://schemas.microsoft.com/office/drawing/2010/main">
+        <mc:Choice Requires="a14">
           <p:sp>
             <p:nvSpPr>
               <p:cNvPr id="6" name="TextBox 5"/>
@@ -5453,6 +5562,7 @@
               </a:bodyPr>
               <a:lstStyle/>
               <a:p>
+                <a:pPr/>
                 <a14:m>
                   <m:oMathPara xmlns:m="http://schemas.openxmlformats.org/officeDocument/2006/math">
                     <m:oMathParaPr>
@@ -5651,7 +5761,7 @@
             </p:txBody>
           </p:sp>
         </mc:Choice>
-        <mc:Fallback>
+        <mc:Fallback xmlns="">
           <p:sp>
             <p:nvSpPr>
               <p:cNvPr id="6" name="TextBox 5"/>
@@ -5849,8 +5959,8 @@
           </a:fontRef>
         </p:style>
       </p:cxnSp>
-      <mc:AlternateContent xmlns:mc="http://schemas.openxmlformats.org/markup-compatibility/2006">
-        <mc:Choice xmlns:a14="http://schemas.microsoft.com/office/drawing/2010/main" Requires="a14">
+      <mc:AlternateContent xmlns:mc="http://schemas.openxmlformats.org/markup-compatibility/2006" xmlns:a14="http://schemas.microsoft.com/office/drawing/2010/main">
+        <mc:Choice Requires="a14">
           <p:sp>
             <p:nvSpPr>
               <p:cNvPr id="13" name="TextBox 12"/>
@@ -5873,6 +5983,7 @@
               </a:bodyPr>
               <a:lstStyle/>
               <a:p>
+                <a:pPr/>
                 <a14:m>
                   <m:oMathPara xmlns:m="http://schemas.openxmlformats.org/officeDocument/2006/math">
                     <m:oMathParaPr>
@@ -6129,7 +6240,7 @@
             </p:txBody>
           </p:sp>
         </mc:Choice>
-        <mc:Fallback>
+        <mc:Fallback xmlns="">
           <p:sp>
             <p:nvSpPr>
               <p:cNvPr id="13" name="TextBox 12"/>
@@ -6396,8 +6507,8 @@
           </a:p>
         </p:txBody>
       </p:sp>
-      <mc:AlternateContent xmlns:mc="http://schemas.openxmlformats.org/markup-compatibility/2006">
-        <mc:Choice xmlns:a14="http://schemas.microsoft.com/office/drawing/2010/main" Requires="a14">
+      <mc:AlternateContent xmlns:mc="http://schemas.openxmlformats.org/markup-compatibility/2006" xmlns:a14="http://schemas.microsoft.com/office/drawing/2010/main">
+        <mc:Choice Requires="a14">
           <p:sp>
             <p:nvSpPr>
               <p:cNvPr id="22" name="TextBox 21"/>
@@ -6420,6 +6531,7 @@
               </a:bodyPr>
               <a:lstStyle/>
               <a:p>
+                <a:pPr/>
                 <a14:m>
                   <m:oMathPara xmlns:m="http://schemas.openxmlformats.org/officeDocument/2006/math">
                     <m:oMathParaPr>
@@ -6540,7 +6652,7 @@
             </p:txBody>
           </p:sp>
         </mc:Choice>
-        <mc:Fallback>
+        <mc:Fallback xmlns="">
           <p:sp>
             <p:nvSpPr>
               <p:cNvPr id="22" name="TextBox 21"/>
@@ -6777,11 +6889,7 @@
           <a:p>
             <a:r>
               <a:rPr lang="en-US" dirty="0" smtClean="0"/>
-              <a:t>After having obtained a target-specific saliency map for the current frame, we must develop a generative </a:t>
-            </a:r>
-            <a:r>
-              <a:rPr lang="en-US" dirty="0" smtClean="0"/>
-              <a:t>model</a:t>
+              <a:t>After having obtained a target-specific saliency map for the current frame, we must develop a generative model</a:t>
             </a:r>
             <a:endParaRPr lang="en-US" dirty="0">
               <a:solidFill>
@@ -6815,8 +6923,8 @@
           </a:prstGeom>
         </p:spPr>
       </p:pic>
-      <mc:AlternateContent xmlns:mc="http://schemas.openxmlformats.org/markup-compatibility/2006">
-        <mc:Choice xmlns:a14="http://schemas.microsoft.com/office/drawing/2010/main" Requires="a14">
+      <mc:AlternateContent xmlns:mc="http://schemas.openxmlformats.org/markup-compatibility/2006" xmlns:a14="http://schemas.microsoft.com/office/drawing/2010/main">
+        <mc:Choice Requires="a14">
           <p:sp>
             <p:nvSpPr>
               <p:cNvPr id="6" name="TextBox 5"/>
@@ -6839,6 +6947,7 @@
               </a:bodyPr>
               <a:lstStyle/>
               <a:p>
+                <a:pPr/>
                 <a14:m>
                   <m:oMathPara xmlns:m="http://schemas.openxmlformats.org/officeDocument/2006/math">
                     <m:oMathParaPr>
@@ -7037,7 +7146,7 @@
             </p:txBody>
           </p:sp>
         </mc:Choice>
-        <mc:Fallback>
+        <mc:Fallback xmlns="">
           <p:sp>
             <p:nvSpPr>
               <p:cNvPr id="6" name="TextBox 5"/>
@@ -7235,8 +7344,8 @@
           </a:fontRef>
         </p:style>
       </p:cxnSp>
-      <mc:AlternateContent xmlns:mc="http://schemas.openxmlformats.org/markup-compatibility/2006">
-        <mc:Choice xmlns:a14="http://schemas.microsoft.com/office/drawing/2010/main" Requires="a14">
+      <mc:AlternateContent xmlns:mc="http://schemas.openxmlformats.org/markup-compatibility/2006" xmlns:a14="http://schemas.microsoft.com/office/drawing/2010/main">
+        <mc:Choice Requires="a14">
           <p:sp>
             <p:nvSpPr>
               <p:cNvPr id="13" name="TextBox 12"/>
@@ -7259,6 +7368,7 @@
               </a:bodyPr>
               <a:lstStyle/>
               <a:p>
+                <a:pPr/>
                 <a14:m>
                   <m:oMathPara xmlns:m="http://schemas.openxmlformats.org/officeDocument/2006/math">
                     <m:oMathParaPr>
@@ -7515,7 +7625,7 @@
             </p:txBody>
           </p:sp>
         </mc:Choice>
-        <mc:Fallback>
+        <mc:Fallback xmlns="">
           <p:sp>
             <p:nvSpPr>
               <p:cNvPr id="13" name="TextBox 12"/>
@@ -7782,8 +7892,8 @@
           </a:p>
         </p:txBody>
       </p:sp>
-      <mc:AlternateContent xmlns:mc="http://schemas.openxmlformats.org/markup-compatibility/2006">
-        <mc:Choice xmlns:a14="http://schemas.microsoft.com/office/drawing/2010/main" Requires="a14">
+      <mc:AlternateContent xmlns:mc="http://schemas.openxmlformats.org/markup-compatibility/2006" xmlns:a14="http://schemas.microsoft.com/office/drawing/2010/main">
+        <mc:Choice Requires="a14">
           <p:sp>
             <p:nvSpPr>
               <p:cNvPr id="22" name="TextBox 21"/>
@@ -7806,6 +7916,7 @@
               </a:bodyPr>
               <a:lstStyle/>
               <a:p>
+                <a:pPr/>
                 <a14:m>
                   <m:oMathPara xmlns:m="http://schemas.openxmlformats.org/officeDocument/2006/math">
                     <m:oMathParaPr>
@@ -7926,7 +8037,7 @@
             </p:txBody>
           </p:sp>
         </mc:Choice>
-        <mc:Fallback>
+        <mc:Fallback xmlns="">
           <p:sp>
             <p:nvSpPr>
               <p:cNvPr id="22" name="TextBox 21"/>
@@ -8233,11 +8344,7 @@
           <a:p>
             <a:r>
               <a:rPr lang="en-US" dirty="0" smtClean="0"/>
-              <a:t>After having obtained a target-specific saliency map for the current frame, we must develop a generative </a:t>
-            </a:r>
-            <a:r>
-              <a:rPr lang="en-US" dirty="0" smtClean="0"/>
-              <a:t>model</a:t>
+              <a:t>After having obtained a target-specific saliency map for the current frame, we must develop a generative model</a:t>
             </a:r>
             <a:endParaRPr lang="en-US" dirty="0">
               <a:solidFill>
@@ -8271,8 +8378,8 @@
           </a:prstGeom>
         </p:spPr>
       </p:pic>
-      <mc:AlternateContent xmlns:mc="http://schemas.openxmlformats.org/markup-compatibility/2006">
-        <mc:Choice xmlns:a14="http://schemas.microsoft.com/office/drawing/2010/main" Requires="a14">
+      <mc:AlternateContent xmlns:mc="http://schemas.openxmlformats.org/markup-compatibility/2006" xmlns:a14="http://schemas.microsoft.com/office/drawing/2010/main">
+        <mc:Choice Requires="a14">
           <p:sp>
             <p:nvSpPr>
               <p:cNvPr id="6" name="TextBox 5"/>
@@ -8295,6 +8402,7 @@
               </a:bodyPr>
               <a:lstStyle/>
               <a:p>
+                <a:pPr/>
                 <a14:m>
                   <m:oMathPara xmlns:m="http://schemas.openxmlformats.org/officeDocument/2006/math">
                     <m:oMathParaPr>
@@ -8493,7 +8601,7 @@
             </p:txBody>
           </p:sp>
         </mc:Choice>
-        <mc:Fallback>
+        <mc:Fallback xmlns="">
           <p:sp>
             <p:nvSpPr>
               <p:cNvPr id="6" name="TextBox 5"/>
@@ -8691,8 +8799,8 @@
           </a:fontRef>
         </p:style>
       </p:cxnSp>
-      <mc:AlternateContent xmlns:mc="http://schemas.openxmlformats.org/markup-compatibility/2006">
-        <mc:Choice xmlns:a14="http://schemas.microsoft.com/office/drawing/2010/main" Requires="a14">
+      <mc:AlternateContent xmlns:mc="http://schemas.openxmlformats.org/markup-compatibility/2006" xmlns:a14="http://schemas.microsoft.com/office/drawing/2010/main">
+        <mc:Choice Requires="a14">
           <p:sp>
             <p:nvSpPr>
               <p:cNvPr id="13" name="TextBox 12"/>
@@ -8715,6 +8823,7 @@
               </a:bodyPr>
               <a:lstStyle/>
               <a:p>
+                <a:pPr/>
                 <a14:m>
                   <m:oMathPara xmlns:m="http://schemas.openxmlformats.org/officeDocument/2006/math">
                     <m:oMathParaPr>
@@ -8879,7 +8988,7 @@
             </p:txBody>
           </p:sp>
         </mc:Choice>
-        <mc:Fallback>
+        <mc:Fallback xmlns="">
           <p:sp>
             <p:nvSpPr>
               <p:cNvPr id="13" name="TextBox 12"/>
@@ -9070,8 +9179,8 @@
           </a:p>
         </p:txBody>
       </p:sp>
-      <mc:AlternateContent xmlns:mc="http://schemas.openxmlformats.org/markup-compatibility/2006">
-        <mc:Choice xmlns:a14="http://schemas.microsoft.com/office/drawing/2010/main" Requires="a14">
+      <mc:AlternateContent xmlns:mc="http://schemas.openxmlformats.org/markup-compatibility/2006" xmlns:a14="http://schemas.microsoft.com/office/drawing/2010/main">
+        <mc:Choice Requires="a14">
           <p:sp>
             <p:nvSpPr>
               <p:cNvPr id="22" name="TextBox 21"/>
@@ -9094,6 +9203,7 @@
               </a:bodyPr>
               <a:lstStyle/>
               <a:p>
+                <a:pPr/>
                 <a14:m>
                   <m:oMathPara xmlns:m="http://schemas.openxmlformats.org/officeDocument/2006/math">
                     <m:oMathParaPr>
@@ -9214,7 +9324,7 @@
             </p:txBody>
           </p:sp>
         </mc:Choice>
-        <mc:Fallback>
+        <mc:Fallback xmlns="">
           <p:sp>
             <p:nvSpPr>
               <p:cNvPr id="22" name="TextBox 21"/>

</xml_diff>